<commit_message>
More presentation stuff, added lots of result images
</commit_message>
<xml_diff>
--- a/michael-activecont.pptx
+++ b/michael-activecont.pptx
@@ -17,8 +17,12 @@
     <p:sldId id="269" r:id="rId11"/>
     <p:sldId id="271" r:id="rId12"/>
     <p:sldId id="272" r:id="rId13"/>
-    <p:sldId id="258" r:id="rId14"/>
-    <p:sldId id="268" r:id="rId15"/>
+    <p:sldId id="273" r:id="rId14"/>
+    <p:sldId id="274" r:id="rId15"/>
+    <p:sldId id="275" r:id="rId16"/>
+    <p:sldId id="276" r:id="rId17"/>
+    <p:sldId id="258" r:id="rId18"/>
+    <p:sldId id="268" r:id="rId19"/>
   </p:sldIdLst>
   <p:sldSz cx="9144000" cy="6858000" type="screen4x3"/>
   <p:notesSz cx="6858000" cy="9144000"/>
@@ -301,6 +305,7 @@
           <a:p>
             <a:fld id="{95BA9808-D7C6-4089-A934-D002E447D2F3}" type="datetimeFigureOut">
               <a:rPr lang="en-GB" smtClean="0"/>
+              <a:pPr/>
               <a:t>19/02/2012</a:t>
             </a:fld>
             <a:endParaRPr lang="en-GB"/>
@@ -343,6 +348,7 @@
           <a:p>
             <a:fld id="{D220E276-3BC7-4442-93B8-D44EE954ABEB}" type="slidenum">
               <a:rPr lang="en-GB" smtClean="0"/>
+              <a:pPr/>
               <a:t>‹#›</a:t>
             </a:fld>
             <a:endParaRPr lang="en-GB"/>
@@ -466,6 +472,7 @@
           <a:p>
             <a:fld id="{95BA9808-D7C6-4089-A934-D002E447D2F3}" type="datetimeFigureOut">
               <a:rPr lang="en-GB" smtClean="0"/>
+              <a:pPr/>
               <a:t>19/02/2012</a:t>
             </a:fld>
             <a:endParaRPr lang="en-GB"/>
@@ -508,6 +515,7 @@
           <a:p>
             <a:fld id="{D220E276-3BC7-4442-93B8-D44EE954ABEB}" type="slidenum">
               <a:rPr lang="en-GB" smtClean="0"/>
+              <a:pPr/>
               <a:t>‹#›</a:t>
             </a:fld>
             <a:endParaRPr lang="en-GB"/>
@@ -641,6 +649,7 @@
           <a:p>
             <a:fld id="{95BA9808-D7C6-4089-A934-D002E447D2F3}" type="datetimeFigureOut">
               <a:rPr lang="en-GB" smtClean="0"/>
+              <a:pPr/>
               <a:t>19/02/2012</a:t>
             </a:fld>
             <a:endParaRPr lang="en-GB"/>
@@ -683,6 +692,7 @@
           <a:p>
             <a:fld id="{D220E276-3BC7-4442-93B8-D44EE954ABEB}" type="slidenum">
               <a:rPr lang="en-GB" smtClean="0"/>
+              <a:pPr/>
               <a:t>‹#›</a:t>
             </a:fld>
             <a:endParaRPr lang="en-GB"/>
@@ -806,6 +816,7 @@
           <a:p>
             <a:fld id="{95BA9808-D7C6-4089-A934-D002E447D2F3}" type="datetimeFigureOut">
               <a:rPr lang="en-GB" smtClean="0"/>
+              <a:pPr/>
               <a:t>19/02/2012</a:t>
             </a:fld>
             <a:endParaRPr lang="en-GB"/>
@@ -848,6 +859,7 @@
           <a:p>
             <a:fld id="{D220E276-3BC7-4442-93B8-D44EE954ABEB}" type="slidenum">
               <a:rPr lang="en-GB" smtClean="0"/>
+              <a:pPr/>
               <a:t>‹#›</a:t>
             </a:fld>
             <a:endParaRPr lang="en-GB"/>
@@ -1047,6 +1059,7 @@
           <a:p>
             <a:fld id="{95BA9808-D7C6-4089-A934-D002E447D2F3}" type="datetimeFigureOut">
               <a:rPr lang="en-GB" smtClean="0"/>
+              <a:pPr/>
               <a:t>19/02/2012</a:t>
             </a:fld>
             <a:endParaRPr lang="en-GB"/>
@@ -1089,6 +1102,7 @@
           <a:p>
             <a:fld id="{D220E276-3BC7-4442-93B8-D44EE954ABEB}" type="slidenum">
               <a:rPr lang="en-GB" smtClean="0"/>
+              <a:pPr/>
               <a:t>‹#›</a:t>
             </a:fld>
             <a:endParaRPr lang="en-GB"/>
@@ -1330,6 +1344,7 @@
           <a:p>
             <a:fld id="{95BA9808-D7C6-4089-A934-D002E447D2F3}" type="datetimeFigureOut">
               <a:rPr lang="en-GB" smtClean="0"/>
+              <a:pPr/>
               <a:t>19/02/2012</a:t>
             </a:fld>
             <a:endParaRPr lang="en-GB"/>
@@ -1372,6 +1387,7 @@
           <a:p>
             <a:fld id="{D220E276-3BC7-4442-93B8-D44EE954ABEB}" type="slidenum">
               <a:rPr lang="en-GB" smtClean="0"/>
+              <a:pPr/>
               <a:t>‹#›</a:t>
             </a:fld>
             <a:endParaRPr lang="en-GB"/>
@@ -1747,6 +1763,7 @@
           <a:p>
             <a:fld id="{95BA9808-D7C6-4089-A934-D002E447D2F3}" type="datetimeFigureOut">
               <a:rPr lang="en-GB" smtClean="0"/>
+              <a:pPr/>
               <a:t>19/02/2012</a:t>
             </a:fld>
             <a:endParaRPr lang="en-GB"/>
@@ -1789,6 +1806,7 @@
           <a:p>
             <a:fld id="{D220E276-3BC7-4442-93B8-D44EE954ABEB}" type="slidenum">
               <a:rPr lang="en-GB" smtClean="0"/>
+              <a:pPr/>
               <a:t>‹#›</a:t>
             </a:fld>
             <a:endParaRPr lang="en-GB"/>
@@ -1860,6 +1878,7 @@
           <a:p>
             <a:fld id="{95BA9808-D7C6-4089-A934-D002E447D2F3}" type="datetimeFigureOut">
               <a:rPr lang="en-GB" smtClean="0"/>
+              <a:pPr/>
               <a:t>19/02/2012</a:t>
             </a:fld>
             <a:endParaRPr lang="en-GB"/>
@@ -1902,6 +1921,7 @@
           <a:p>
             <a:fld id="{D220E276-3BC7-4442-93B8-D44EE954ABEB}" type="slidenum">
               <a:rPr lang="en-GB" smtClean="0"/>
+              <a:pPr/>
               <a:t>‹#›</a:t>
             </a:fld>
             <a:endParaRPr lang="en-GB"/>
@@ -1950,6 +1970,7 @@
           <a:p>
             <a:fld id="{95BA9808-D7C6-4089-A934-D002E447D2F3}" type="datetimeFigureOut">
               <a:rPr lang="en-GB" smtClean="0"/>
+              <a:pPr/>
               <a:t>19/02/2012</a:t>
             </a:fld>
             <a:endParaRPr lang="en-GB"/>
@@ -1992,6 +2013,7 @@
           <a:p>
             <a:fld id="{D220E276-3BC7-4442-93B8-D44EE954ABEB}" type="slidenum">
               <a:rPr lang="en-GB" smtClean="0"/>
+              <a:pPr/>
               <a:t>‹#›</a:t>
             </a:fld>
             <a:endParaRPr lang="en-GB"/>
@@ -2222,6 +2244,7 @@
           <a:p>
             <a:fld id="{95BA9808-D7C6-4089-A934-D002E447D2F3}" type="datetimeFigureOut">
               <a:rPr lang="en-GB" smtClean="0"/>
+              <a:pPr/>
               <a:t>19/02/2012</a:t>
             </a:fld>
             <a:endParaRPr lang="en-GB"/>
@@ -2264,6 +2287,7 @@
           <a:p>
             <a:fld id="{D220E276-3BC7-4442-93B8-D44EE954ABEB}" type="slidenum">
               <a:rPr lang="en-GB" smtClean="0"/>
+              <a:pPr/>
               <a:t>‹#›</a:t>
             </a:fld>
             <a:endParaRPr lang="en-GB"/>
@@ -2470,6 +2494,7 @@
           <a:p>
             <a:fld id="{95BA9808-D7C6-4089-A934-D002E447D2F3}" type="datetimeFigureOut">
               <a:rPr lang="en-GB" smtClean="0"/>
+              <a:pPr/>
               <a:t>19/02/2012</a:t>
             </a:fld>
             <a:endParaRPr lang="en-GB"/>
@@ -2512,6 +2537,7 @@
           <a:p>
             <a:fld id="{D220E276-3BC7-4442-93B8-D44EE954ABEB}" type="slidenum">
               <a:rPr lang="en-GB" smtClean="0"/>
+              <a:pPr/>
               <a:t>‹#›</a:t>
             </a:fld>
             <a:endParaRPr lang="en-GB"/>
@@ -2678,6 +2704,7 @@
           <a:p>
             <a:fld id="{95BA9808-D7C6-4089-A934-D002E447D2F3}" type="datetimeFigureOut">
               <a:rPr lang="en-GB" smtClean="0"/>
+              <a:pPr/>
               <a:t>19/02/2012</a:t>
             </a:fld>
             <a:endParaRPr lang="en-GB"/>
@@ -2756,6 +2783,7 @@
           <a:p>
             <a:fld id="{D220E276-3BC7-4442-93B8-D44EE954ABEB}" type="slidenum">
               <a:rPr lang="en-GB" smtClean="0"/>
+              <a:pPr/>
               <a:t>‹#›</a:t>
             </a:fld>
             <a:endParaRPr lang="en-GB"/>
@@ -3599,21 +3627,157 @@
           </a:p>
         </p:txBody>
       </p:sp>
-      <p:sp>
-        <p:nvSpPr>
-          <p:cNvPr id="3" name="Content Placeholder 2"/>
-          <p:cNvSpPr>
-            <a:spLocks noGrp="1"/>
-          </p:cNvSpPr>
-          <p:nvPr>
-            <p:ph idx="1"/>
-          </p:nvPr>
-        </p:nvSpPr>
-        <p:spPr/>
-        <p:txBody>
-          <a:bodyPr/>
-          <a:lstStyle/>
-          <a:p>
+      <p:pic>
+        <p:nvPicPr>
+          <p:cNvPr id="1026" name="Picture 2" descr="C:\Users\ames\Documents\activecontnoedge\test-images\coral-snake.jpg"/>
+          <p:cNvPicPr>
+            <a:picLocks noChangeAspect="1" noChangeArrowheads="1"/>
+          </p:cNvPicPr>
+          <p:nvPr/>
+        </p:nvPicPr>
+        <p:blipFill>
+          <a:blip r:embed="rId2" cstate="print"/>
+          <a:srcRect/>
+          <a:stretch>
+            <a:fillRect/>
+          </a:stretch>
+        </p:blipFill>
+        <p:spPr bwMode="auto">
+          <a:xfrm>
+            <a:off x="827584" y="2276872"/>
+            <a:ext cx="3132832" cy="2349624"/>
+          </a:xfrm>
+          <a:prstGeom prst="rect">
+            <a:avLst/>
+          </a:prstGeom>
+          <a:noFill/>
+        </p:spPr>
+      </p:pic>
+      <p:pic>
+        <p:nvPicPr>
+          <p:cNvPr id="1027" name="Picture 3" descr="C:\Users\ames\Documents\activecontnoedge\figures\coal_snake_mu_50000_n_50_cont.png"/>
+          <p:cNvPicPr>
+            <a:picLocks noChangeAspect="1" noChangeArrowheads="1"/>
+          </p:cNvPicPr>
+          <p:nvPr/>
+        </p:nvPicPr>
+        <p:blipFill>
+          <a:blip r:embed="rId3" cstate="print"/>
+          <a:srcRect/>
+          <a:stretch>
+            <a:fillRect/>
+          </a:stretch>
+        </p:blipFill>
+        <p:spPr bwMode="auto">
+          <a:xfrm>
+            <a:off x="4860032" y="1268760"/>
+            <a:ext cx="3456384" cy="2608119"/>
+          </a:xfrm>
+          <a:prstGeom prst="rect">
+            <a:avLst/>
+          </a:prstGeom>
+          <a:noFill/>
+        </p:spPr>
+      </p:pic>
+      <p:pic>
+        <p:nvPicPr>
+          <p:cNvPr id="1028" name="Picture 4" descr="C:\Users\ames\Documents\activecontnoedge\figures\coal_snake_mu_50000_n_50_thresh.png"/>
+          <p:cNvPicPr>
+            <a:picLocks noChangeAspect="1" noChangeArrowheads="1"/>
+          </p:cNvPicPr>
+          <p:nvPr/>
+        </p:nvPicPr>
+        <p:blipFill>
+          <a:blip r:embed="rId4" cstate="print"/>
+          <a:srcRect/>
+          <a:stretch>
+            <a:fillRect/>
+          </a:stretch>
+        </p:blipFill>
+        <p:spPr bwMode="auto">
+          <a:xfrm>
+            <a:off x="4860032" y="3701201"/>
+            <a:ext cx="3456384" cy="2608119"/>
+          </a:xfrm>
+          <a:prstGeom prst="rect">
+            <a:avLst/>
+          </a:prstGeom>
+          <a:noFill/>
+        </p:spPr>
+      </p:pic>
+      <p:cxnSp>
+        <p:nvCxnSpPr>
+          <p:cNvPr id="8" name="Straight Arrow Connector 7"/>
+          <p:cNvCxnSpPr/>
+          <p:nvPr/>
+        </p:nvCxnSpPr>
+        <p:spPr>
+          <a:xfrm>
+            <a:off x="4139952" y="3501008"/>
+            <a:ext cx="792088" cy="0"/>
+          </a:xfrm>
+          <a:prstGeom prst="straightConnector1">
+            <a:avLst/>
+          </a:prstGeom>
+          <a:ln w="57150">
+            <a:solidFill>
+              <a:schemeClr val="tx1"/>
+            </a:solidFill>
+            <a:tailEnd type="arrow"/>
+          </a:ln>
+        </p:spPr>
+        <p:style>
+          <a:lnRef idx="1">
+            <a:schemeClr val="accent1"/>
+          </a:lnRef>
+          <a:fillRef idx="0">
+            <a:schemeClr val="accent1"/>
+          </a:fillRef>
+          <a:effectRef idx="0">
+            <a:schemeClr val="accent1"/>
+          </a:effectRef>
+          <a:fontRef idx="minor">
+            <a:schemeClr val="tx1"/>
+          </a:fontRef>
+        </p:style>
+      </p:cxnSp>
+      <p:sp>
+        <p:nvSpPr>
+          <p:cNvPr id="10" name="Rectangle 9"/>
+          <p:cNvSpPr/>
+          <p:nvPr/>
+        </p:nvSpPr>
+        <p:spPr>
+          <a:xfrm>
+            <a:off x="1230814" y="4869160"/>
+            <a:ext cx="2405082" cy="369332"/>
+          </a:xfrm>
+          <a:prstGeom prst="rect">
+            <a:avLst/>
+          </a:prstGeom>
+        </p:spPr>
+        <p:txBody>
+          <a:bodyPr wrap="none">
+            <a:spAutoFit/>
+          </a:bodyPr>
+          <a:lstStyle/>
+          <a:p>
+            <a:r>
+              <a:rPr lang="en-GB" dirty="0" smtClean="0"/>
+              <a:t>50 iterations, </a:t>
+            </a:r>
+            <a:r>
+              <a:rPr lang="el-GR" dirty="0" smtClean="0"/>
+              <a:t>μ</a:t>
+            </a:r>
+            <a:r>
+              <a:rPr lang="en-GB" dirty="0" smtClean="0"/>
+              <a:t> = </a:t>
+            </a:r>
+            <a:r>
+              <a:rPr lang="en-GB" dirty="0" smtClean="0"/>
+              <a:t>50000</a:t>
+            </a:r>
             <a:endParaRPr lang="en-GB" dirty="0"/>
           </a:p>
         </p:txBody>
@@ -3623,6 +3787,13 @@
   <p:clrMapOvr>
     <a:masterClrMapping/>
   </p:clrMapOvr>
+  <p:timing>
+    <p:tnLst>
+      <p:par>
+        <p:cTn id="1" dur="indefinite" restart="never" nodeType="tmRoot"/>
+      </p:par>
+    </p:tnLst>
+  </p:timing>
 </p:sld>
 </file>
 
@@ -3660,37 +3831,179 @@
           <a:p>
             <a:r>
               <a:rPr lang="en-GB" dirty="0" smtClean="0"/>
-              <a:t>Extensions</a:t>
+              <a:t>Results – </a:t>
+            </a:r>
+            <a:r>
+              <a:rPr lang="en-GB" dirty="0" smtClean="0"/>
+              <a:t>Changing </a:t>
+            </a:r>
+            <a:r>
+              <a:rPr lang="el-GR" dirty="0" smtClean="0"/>
+              <a:t>μ</a:t>
+            </a:r>
+            <a:r>
+              <a:rPr lang="en-GB" dirty="0" smtClean="0"/>
+              <a:t> </a:t>
             </a:r>
             <a:endParaRPr lang="en-GB" dirty="0"/>
           </a:p>
         </p:txBody>
       </p:sp>
-      <p:sp>
-        <p:nvSpPr>
-          <p:cNvPr id="3" name="Content Placeholder 2"/>
-          <p:cNvSpPr>
-            <a:spLocks noGrp="1"/>
-          </p:cNvSpPr>
-          <p:nvPr>
-            <p:ph idx="1"/>
-          </p:nvPr>
-        </p:nvSpPr>
-        <p:spPr/>
-        <p:txBody>
-          <a:bodyPr/>
+      <p:pic>
+        <p:nvPicPr>
+          <p:cNvPr id="2050" name="Picture 2" descr="C:\Users\ames\Documents\activecontnoedge\figures\europe_night_specs_mu_15000_n_100_contour.png"/>
+          <p:cNvPicPr>
+            <a:picLocks noChangeAspect="1" noChangeArrowheads="1"/>
+          </p:cNvPicPr>
+          <p:nvPr/>
+        </p:nvPicPr>
+        <p:blipFill>
+          <a:blip r:embed="rId2" cstate="print"/>
+          <a:srcRect/>
+          <a:stretch>
+            <a:fillRect/>
+          </a:stretch>
+        </p:blipFill>
+        <p:spPr bwMode="auto">
+          <a:xfrm>
+            <a:off x="4211960" y="3140968"/>
+            <a:ext cx="4298430" cy="3243511"/>
+          </a:xfrm>
+          <a:prstGeom prst="rect">
+            <a:avLst/>
+          </a:prstGeom>
+          <a:noFill/>
+        </p:spPr>
+      </p:pic>
+      <p:pic>
+        <p:nvPicPr>
+          <p:cNvPr id="2052" name="Picture 4" descr="C:\Users\ames\Documents\activecontnoedge\figures\europe_night_specs_mu_1_n_100_contour.png"/>
+          <p:cNvPicPr>
+            <a:picLocks noChangeAspect="1" noChangeArrowheads="1"/>
+          </p:cNvPicPr>
+          <p:nvPr/>
+        </p:nvPicPr>
+        <p:blipFill>
+          <a:blip r:embed="rId3" cstate="print"/>
+          <a:srcRect/>
+          <a:stretch>
+            <a:fillRect/>
+          </a:stretch>
+        </p:blipFill>
+        <p:spPr bwMode="auto">
+          <a:xfrm>
+            <a:off x="179512" y="3113092"/>
+            <a:ext cx="4298430" cy="3243511"/>
+          </a:xfrm>
+          <a:prstGeom prst="rect">
+            <a:avLst/>
+          </a:prstGeom>
+          <a:noFill/>
+        </p:spPr>
+      </p:pic>
+      <p:pic>
+        <p:nvPicPr>
+          <p:cNvPr id="2051" name="Picture 3" descr="C:\Users\ames\Documents\activecontnoedge\test-images\europe_night-specks.jpg"/>
+          <p:cNvPicPr>
+            <a:picLocks noChangeAspect="1" noChangeArrowheads="1"/>
+          </p:cNvPicPr>
+          <p:nvPr/>
+        </p:nvPicPr>
+        <p:blipFill>
+          <a:blip r:embed="rId4" cstate="print"/>
+          <a:srcRect/>
+          <a:stretch>
+            <a:fillRect/>
+          </a:stretch>
+        </p:blipFill>
+        <p:spPr bwMode="auto">
+          <a:xfrm>
+            <a:off x="3074144" y="1291084"/>
+            <a:ext cx="2794000" cy="1993900"/>
+          </a:xfrm>
+          <a:prstGeom prst="rect">
+            <a:avLst/>
+          </a:prstGeom>
+          <a:noFill/>
+        </p:spPr>
+      </p:pic>
+      <p:sp>
+        <p:nvSpPr>
+          <p:cNvPr id="10" name="Rectangle 9"/>
+          <p:cNvSpPr/>
+          <p:nvPr/>
+        </p:nvSpPr>
+        <p:spPr>
+          <a:xfrm>
+            <a:off x="5148064" y="6218728"/>
+            <a:ext cx="2522101" cy="369332"/>
+          </a:xfrm>
+          <a:prstGeom prst="rect">
+            <a:avLst/>
+          </a:prstGeom>
+        </p:spPr>
+        <p:txBody>
+          <a:bodyPr wrap="none">
+            <a:spAutoFit/>
+          </a:bodyPr>
           <a:lstStyle/>
           <a:p>
             <a:r>
               <a:rPr lang="en-GB" dirty="0" smtClean="0"/>
-              <a:t>Solve time dependant PDE</a:t>
-            </a:r>
-          </a:p>
-          <a:p>
-            <a:pPr lvl="1"/>
+              <a:t>100 iterations, </a:t>
+            </a:r>
+            <a:r>
+              <a:rPr lang="el-GR" dirty="0" smtClean="0"/>
+              <a:t>μ</a:t>
+            </a:r>
             <a:r>
               <a:rPr lang="en-GB" dirty="0" smtClean="0"/>
-              <a:t>They do say use of time dependant PDE is not crucial</a:t>
+              <a:t> = </a:t>
+            </a:r>
+            <a:r>
+              <a:rPr lang="en-GB" dirty="0" smtClean="0"/>
+              <a:t>15000</a:t>
+            </a:r>
+            <a:endParaRPr lang="en-GB" dirty="0"/>
+          </a:p>
+        </p:txBody>
+      </p:sp>
+      <p:sp>
+        <p:nvSpPr>
+          <p:cNvPr id="12" name="Rectangle 11"/>
+          <p:cNvSpPr/>
+          <p:nvPr/>
+        </p:nvSpPr>
+        <p:spPr>
+          <a:xfrm>
+            <a:off x="1475656" y="6228020"/>
+            <a:ext cx="2054024" cy="369332"/>
+          </a:xfrm>
+          <a:prstGeom prst="rect">
+            <a:avLst/>
+          </a:prstGeom>
+        </p:spPr>
+        <p:txBody>
+          <a:bodyPr wrap="none">
+            <a:spAutoFit/>
+          </a:bodyPr>
+          <a:lstStyle/>
+          <a:p>
+            <a:r>
+              <a:rPr lang="en-GB" dirty="0" smtClean="0"/>
+              <a:t>100 iterations, </a:t>
+            </a:r>
+            <a:r>
+              <a:rPr lang="el-GR" dirty="0" smtClean="0"/>
+              <a:t>μ</a:t>
+            </a:r>
+            <a:r>
+              <a:rPr lang="en-GB" dirty="0" smtClean="0"/>
+              <a:t> = </a:t>
+            </a:r>
+            <a:r>
+              <a:rPr lang="en-GB" dirty="0" smtClean="0"/>
+              <a:t>1</a:t>
             </a:r>
             <a:endParaRPr lang="en-GB" dirty="0"/>
           </a:p>
@@ -3712,6 +4025,861 @@
 </file>
 
 <file path=ppt/slides/slide14.xml><?xml version="1.0" encoding="utf-8"?>
+<p:sld xmlns:a="http://schemas.openxmlformats.org/drawingml/2006/main" xmlns:r="http://schemas.openxmlformats.org/officeDocument/2006/relationships" xmlns:p="http://schemas.openxmlformats.org/presentationml/2006/main">
+  <p:cSld>
+    <p:spTree>
+      <p:nvGrpSpPr>
+        <p:cNvPr id="1" name=""/>
+        <p:cNvGrpSpPr/>
+        <p:nvPr/>
+      </p:nvGrpSpPr>
+      <p:grpSpPr>
+        <a:xfrm>
+          <a:off x="0" y="0"/>
+          <a:ext cx="0" cy="0"/>
+          <a:chOff x="0" y="0"/>
+          <a:chExt cx="0" cy="0"/>
+        </a:xfrm>
+      </p:grpSpPr>
+      <p:sp>
+        <p:nvSpPr>
+          <p:cNvPr id="2" name="Title 1"/>
+          <p:cNvSpPr>
+            <a:spLocks noGrp="1"/>
+          </p:cNvSpPr>
+          <p:nvPr>
+            <p:ph type="title"/>
+          </p:nvPr>
+        </p:nvSpPr>
+        <p:spPr/>
+        <p:txBody>
+          <a:bodyPr>
+            <a:normAutofit/>
+          </a:bodyPr>
+          <a:lstStyle/>
+          <a:p>
+            <a:r>
+              <a:rPr lang="en-GB" dirty="0" smtClean="0"/>
+              <a:t>Results – Gradients</a:t>
+            </a:r>
+            <a:endParaRPr lang="en-GB" dirty="0"/>
+          </a:p>
+        </p:txBody>
+      </p:sp>
+      <p:sp>
+        <p:nvSpPr>
+          <p:cNvPr id="10" name="Rectangle 9"/>
+          <p:cNvSpPr/>
+          <p:nvPr/>
+        </p:nvSpPr>
+        <p:spPr>
+          <a:xfrm>
+            <a:off x="3419872" y="6165304"/>
+            <a:ext cx="1819985" cy="369332"/>
+          </a:xfrm>
+          <a:prstGeom prst="rect">
+            <a:avLst/>
+          </a:prstGeom>
+        </p:spPr>
+        <p:txBody>
+          <a:bodyPr wrap="none">
+            <a:spAutoFit/>
+          </a:bodyPr>
+          <a:lstStyle/>
+          <a:p>
+            <a:r>
+              <a:rPr lang="en-GB" dirty="0" smtClean="0"/>
+              <a:t>5</a:t>
+            </a:r>
+            <a:r>
+              <a:rPr lang="en-GB" dirty="0" smtClean="0"/>
+              <a:t> iterations, </a:t>
+            </a:r>
+            <a:r>
+              <a:rPr lang="el-GR" dirty="0" smtClean="0"/>
+              <a:t>μ</a:t>
+            </a:r>
+            <a:r>
+              <a:rPr lang="en-GB" dirty="0" smtClean="0"/>
+              <a:t> = </a:t>
+            </a:r>
+            <a:r>
+              <a:rPr lang="en-GB" dirty="0" smtClean="0"/>
+              <a:t>1</a:t>
+            </a:r>
+            <a:endParaRPr lang="en-GB" dirty="0"/>
+          </a:p>
+        </p:txBody>
+      </p:sp>
+      <p:pic>
+        <p:nvPicPr>
+          <p:cNvPr id="3074" name="Picture 2" descr="C:\Users\ames\Documents\activecontnoedge\figures\grad_shapes_mu_1_n_5_contour.png"/>
+          <p:cNvPicPr>
+            <a:picLocks noChangeAspect="1" noChangeArrowheads="1"/>
+          </p:cNvPicPr>
+          <p:nvPr/>
+        </p:nvPicPr>
+        <p:blipFill>
+          <a:blip r:embed="rId2" cstate="print"/>
+          <a:srcRect/>
+          <a:stretch>
+            <a:fillRect/>
+          </a:stretch>
+        </p:blipFill>
+        <p:spPr bwMode="auto">
+          <a:xfrm>
+            <a:off x="4572000" y="3539512"/>
+            <a:ext cx="3384376" cy="2553784"/>
+          </a:xfrm>
+          <a:prstGeom prst="rect">
+            <a:avLst/>
+          </a:prstGeom>
+          <a:noFill/>
+        </p:spPr>
+      </p:pic>
+      <p:pic>
+        <p:nvPicPr>
+          <p:cNvPr id="3075" name="Picture 3" descr="C:\Users\ames\Documents\activecontnoedge\test-images\grad-shapes.png"/>
+          <p:cNvPicPr>
+            <a:picLocks noChangeAspect="1" noChangeArrowheads="1"/>
+          </p:cNvPicPr>
+          <p:nvPr/>
+        </p:nvPicPr>
+        <p:blipFill>
+          <a:blip r:embed="rId3" cstate="print"/>
+          <a:srcRect/>
+          <a:stretch>
+            <a:fillRect/>
+          </a:stretch>
+        </p:blipFill>
+        <p:spPr bwMode="auto">
+          <a:xfrm>
+            <a:off x="1331640" y="3717032"/>
+            <a:ext cx="1996598" cy="1996598"/>
+          </a:xfrm>
+          <a:prstGeom prst="rect">
+            <a:avLst/>
+          </a:prstGeom>
+          <a:noFill/>
+        </p:spPr>
+      </p:pic>
+      <p:pic>
+        <p:nvPicPr>
+          <p:cNvPr id="3076" name="Picture 4" descr="C:\Users\ames\Documents\activecontnoedge\test-images\grad_circle.png"/>
+          <p:cNvPicPr>
+            <a:picLocks noChangeAspect="1" noChangeArrowheads="1"/>
+          </p:cNvPicPr>
+          <p:nvPr/>
+        </p:nvPicPr>
+        <p:blipFill>
+          <a:blip r:embed="rId4" cstate="print"/>
+          <a:srcRect/>
+          <a:stretch>
+            <a:fillRect/>
+          </a:stretch>
+        </p:blipFill>
+        <p:spPr bwMode="auto">
+          <a:xfrm>
+            <a:off x="1619672" y="1628800"/>
+            <a:ext cx="1688976" cy="1688976"/>
+          </a:xfrm>
+          <a:prstGeom prst="rect">
+            <a:avLst/>
+          </a:prstGeom>
+          <a:noFill/>
+        </p:spPr>
+      </p:pic>
+      <p:pic>
+        <p:nvPicPr>
+          <p:cNvPr id="3077" name="Picture 5" descr="C:\Users\ames\Documents\activecontnoedge\figures\grad_circle_mu_1_n_5_contour.png"/>
+          <p:cNvPicPr>
+            <a:picLocks noChangeAspect="1" noChangeArrowheads="1"/>
+          </p:cNvPicPr>
+          <p:nvPr/>
+        </p:nvPicPr>
+        <p:blipFill>
+          <a:blip r:embed="rId5" cstate="print"/>
+          <a:srcRect/>
+          <a:stretch>
+            <a:fillRect/>
+          </a:stretch>
+        </p:blipFill>
+        <p:spPr bwMode="auto">
+          <a:xfrm>
+            <a:off x="4572000" y="1190451"/>
+            <a:ext cx="3348326" cy="2526581"/>
+          </a:xfrm>
+          <a:prstGeom prst="rect">
+            <a:avLst/>
+          </a:prstGeom>
+          <a:noFill/>
+        </p:spPr>
+      </p:pic>
+      <p:cxnSp>
+        <p:nvCxnSpPr>
+          <p:cNvPr id="13" name="Straight Arrow Connector 12"/>
+          <p:cNvCxnSpPr/>
+          <p:nvPr/>
+        </p:nvCxnSpPr>
+        <p:spPr>
+          <a:xfrm>
+            <a:off x="4067944" y="2564904"/>
+            <a:ext cx="792088" cy="0"/>
+          </a:xfrm>
+          <a:prstGeom prst="straightConnector1">
+            <a:avLst/>
+          </a:prstGeom>
+          <a:ln w="57150">
+            <a:solidFill>
+              <a:schemeClr val="tx1"/>
+            </a:solidFill>
+            <a:tailEnd type="arrow"/>
+          </a:ln>
+        </p:spPr>
+        <p:style>
+          <a:lnRef idx="1">
+            <a:schemeClr val="accent1"/>
+          </a:lnRef>
+          <a:fillRef idx="0">
+            <a:schemeClr val="accent1"/>
+          </a:fillRef>
+          <a:effectRef idx="0">
+            <a:schemeClr val="accent1"/>
+          </a:effectRef>
+          <a:fontRef idx="minor">
+            <a:schemeClr val="tx1"/>
+          </a:fontRef>
+        </p:style>
+      </p:cxnSp>
+      <p:cxnSp>
+        <p:nvCxnSpPr>
+          <p:cNvPr id="14" name="Straight Arrow Connector 13"/>
+          <p:cNvCxnSpPr/>
+          <p:nvPr/>
+        </p:nvCxnSpPr>
+        <p:spPr>
+          <a:xfrm>
+            <a:off x="4067944" y="4797152"/>
+            <a:ext cx="792088" cy="0"/>
+          </a:xfrm>
+          <a:prstGeom prst="straightConnector1">
+            <a:avLst/>
+          </a:prstGeom>
+          <a:ln w="57150">
+            <a:solidFill>
+              <a:schemeClr val="tx1"/>
+            </a:solidFill>
+            <a:tailEnd type="arrow"/>
+          </a:ln>
+        </p:spPr>
+        <p:style>
+          <a:lnRef idx="1">
+            <a:schemeClr val="accent1"/>
+          </a:lnRef>
+          <a:fillRef idx="0">
+            <a:schemeClr val="accent1"/>
+          </a:fillRef>
+          <a:effectRef idx="0">
+            <a:schemeClr val="accent1"/>
+          </a:effectRef>
+          <a:fontRef idx="minor">
+            <a:schemeClr val="tx1"/>
+          </a:fontRef>
+        </p:style>
+      </p:cxnSp>
+    </p:spTree>
+  </p:cSld>
+  <p:clrMapOvr>
+    <a:masterClrMapping/>
+  </p:clrMapOvr>
+  <p:timing>
+    <p:tnLst>
+      <p:par>
+        <p:cTn id="1" dur="indefinite" restart="never" nodeType="tmRoot"/>
+      </p:par>
+    </p:tnLst>
+  </p:timing>
+</p:sld>
+</file>
+
+<file path=ppt/slides/slide15.xml><?xml version="1.0" encoding="utf-8"?>
+<p:sld xmlns:a="http://schemas.openxmlformats.org/drawingml/2006/main" xmlns:r="http://schemas.openxmlformats.org/officeDocument/2006/relationships" xmlns:p="http://schemas.openxmlformats.org/presentationml/2006/main">
+  <p:cSld>
+    <p:spTree>
+      <p:nvGrpSpPr>
+        <p:cNvPr id="1" name=""/>
+        <p:cNvGrpSpPr/>
+        <p:nvPr/>
+      </p:nvGrpSpPr>
+      <p:grpSpPr>
+        <a:xfrm>
+          <a:off x="0" y="0"/>
+          <a:ext cx="0" cy="0"/>
+          <a:chOff x="0" y="0"/>
+          <a:chExt cx="0" cy="0"/>
+        </a:xfrm>
+      </p:grpSpPr>
+      <p:pic>
+        <p:nvPicPr>
+          <p:cNvPr id="4102" name="Picture 6" descr="C:\Users\ames\Documents\activecontnoedge\figures\mines_mu_50000_n_100_initial_outside_contour.png"/>
+          <p:cNvPicPr>
+            <a:picLocks noChangeAspect="1" noChangeArrowheads="1"/>
+          </p:cNvPicPr>
+          <p:nvPr/>
+        </p:nvPicPr>
+        <p:blipFill>
+          <a:blip r:embed="rId2" cstate="print"/>
+          <a:srcRect/>
+          <a:stretch>
+            <a:fillRect/>
+          </a:stretch>
+        </p:blipFill>
+        <p:spPr bwMode="auto">
+          <a:xfrm>
+            <a:off x="2699793" y="3717032"/>
+            <a:ext cx="3888431" cy="2934133"/>
+          </a:xfrm>
+          <a:prstGeom prst="rect">
+            <a:avLst/>
+          </a:prstGeom>
+          <a:noFill/>
+        </p:spPr>
+      </p:pic>
+      <p:pic>
+        <p:nvPicPr>
+          <p:cNvPr id="15" name="Picture 2" descr="C:\Users\ames\Documents\activecontnoedge\test-images\mines.png"/>
+          <p:cNvPicPr>
+            <a:picLocks noChangeAspect="1" noChangeArrowheads="1"/>
+          </p:cNvPicPr>
+          <p:nvPr/>
+        </p:nvPicPr>
+        <p:blipFill>
+          <a:blip r:embed="rId3" cstate="print"/>
+          <a:srcRect/>
+          <a:stretch>
+            <a:fillRect/>
+          </a:stretch>
+        </p:blipFill>
+        <p:spPr bwMode="auto">
+          <a:xfrm>
+            <a:off x="395536" y="4005064"/>
+            <a:ext cx="1944216" cy="2286508"/>
+          </a:xfrm>
+          <a:prstGeom prst="rect">
+            <a:avLst/>
+          </a:prstGeom>
+          <a:noFill/>
+        </p:spPr>
+      </p:pic>
+      <p:pic>
+        <p:nvPicPr>
+          <p:cNvPr id="16" name="Picture 2" descr="C:\Users\ames\Documents\activecontnoedge\test-images\mines.png"/>
+          <p:cNvPicPr>
+            <a:picLocks noChangeAspect="1" noChangeArrowheads="1"/>
+          </p:cNvPicPr>
+          <p:nvPr/>
+        </p:nvPicPr>
+        <p:blipFill>
+          <a:blip r:embed="rId3" cstate="print"/>
+          <a:srcRect/>
+          <a:stretch>
+            <a:fillRect/>
+          </a:stretch>
+        </p:blipFill>
+        <p:spPr bwMode="auto">
+          <a:xfrm>
+            <a:off x="395536" y="1378800"/>
+            <a:ext cx="1944216" cy="2286508"/>
+          </a:xfrm>
+          <a:prstGeom prst="rect">
+            <a:avLst/>
+          </a:prstGeom>
+          <a:noFill/>
+        </p:spPr>
+      </p:pic>
+      <p:sp>
+        <p:nvSpPr>
+          <p:cNvPr id="2" name="Title 1"/>
+          <p:cNvSpPr>
+            <a:spLocks noGrp="1"/>
+          </p:cNvSpPr>
+          <p:nvPr>
+            <p:ph type="title"/>
+          </p:nvPr>
+        </p:nvSpPr>
+        <p:spPr/>
+        <p:txBody>
+          <a:bodyPr>
+            <a:normAutofit/>
+          </a:bodyPr>
+          <a:lstStyle/>
+          <a:p>
+            <a:r>
+              <a:rPr lang="en-GB" dirty="0" smtClean="0"/>
+              <a:t>Results – Initial Level Set Functions</a:t>
+            </a:r>
+            <a:endParaRPr lang="en-GB" dirty="0"/>
+          </a:p>
+        </p:txBody>
+      </p:sp>
+      <p:sp>
+        <p:nvSpPr>
+          <p:cNvPr id="10" name="Rectangle 9"/>
+          <p:cNvSpPr/>
+          <p:nvPr/>
+        </p:nvSpPr>
+        <p:spPr>
+          <a:xfrm>
+            <a:off x="3419872" y="6444044"/>
+            <a:ext cx="2522101" cy="369332"/>
+          </a:xfrm>
+          <a:prstGeom prst="rect">
+            <a:avLst/>
+          </a:prstGeom>
+        </p:spPr>
+        <p:txBody>
+          <a:bodyPr wrap="none">
+            <a:spAutoFit/>
+          </a:bodyPr>
+          <a:lstStyle/>
+          <a:p>
+            <a:r>
+              <a:rPr lang="en-GB" dirty="0" smtClean="0"/>
+              <a:t>100 iterations, </a:t>
+            </a:r>
+            <a:r>
+              <a:rPr lang="el-GR" dirty="0" smtClean="0"/>
+              <a:t>μ</a:t>
+            </a:r>
+            <a:r>
+              <a:rPr lang="en-GB" dirty="0" smtClean="0"/>
+              <a:t> = </a:t>
+            </a:r>
+            <a:r>
+              <a:rPr lang="en-GB" dirty="0" smtClean="0"/>
+              <a:t>50000</a:t>
+            </a:r>
+            <a:endParaRPr lang="en-GB" dirty="0"/>
+          </a:p>
+        </p:txBody>
+      </p:sp>
+      <p:cxnSp>
+        <p:nvCxnSpPr>
+          <p:cNvPr id="18" name="Straight Arrow Connector 17"/>
+          <p:cNvCxnSpPr/>
+          <p:nvPr/>
+        </p:nvCxnSpPr>
+        <p:spPr>
+          <a:xfrm>
+            <a:off x="2555776" y="4797152"/>
+            <a:ext cx="792088" cy="0"/>
+          </a:xfrm>
+          <a:prstGeom prst="straightConnector1">
+            <a:avLst/>
+          </a:prstGeom>
+          <a:ln w="57150">
+            <a:solidFill>
+              <a:schemeClr val="tx1"/>
+            </a:solidFill>
+            <a:tailEnd type="arrow"/>
+          </a:ln>
+        </p:spPr>
+        <p:style>
+          <a:lnRef idx="1">
+            <a:schemeClr val="accent1"/>
+          </a:lnRef>
+          <a:fillRef idx="0">
+            <a:schemeClr val="accent1"/>
+          </a:fillRef>
+          <a:effectRef idx="0">
+            <a:schemeClr val="accent1"/>
+          </a:effectRef>
+          <a:fontRef idx="minor">
+            <a:schemeClr val="tx1"/>
+          </a:fontRef>
+        </p:style>
+      </p:cxnSp>
+      <p:pic>
+        <p:nvPicPr>
+          <p:cNvPr id="4099" name="Picture 3" descr="C:\Users\ames\Documents\activecontnoedge\figures\mines_mu_50000_n_100_contour.png"/>
+          <p:cNvPicPr>
+            <a:picLocks noChangeAspect="1" noChangeArrowheads="1"/>
+          </p:cNvPicPr>
+          <p:nvPr/>
+        </p:nvPicPr>
+        <p:blipFill>
+          <a:blip r:embed="rId4" cstate="print"/>
+          <a:srcRect/>
+          <a:stretch>
+            <a:fillRect/>
+          </a:stretch>
+        </p:blipFill>
+        <p:spPr bwMode="auto">
+          <a:xfrm>
+            <a:off x="2699793" y="1052736"/>
+            <a:ext cx="3888431" cy="2934133"/>
+          </a:xfrm>
+          <a:prstGeom prst="rect">
+            <a:avLst/>
+          </a:prstGeom>
+          <a:noFill/>
+        </p:spPr>
+      </p:pic>
+      <p:cxnSp>
+        <p:nvCxnSpPr>
+          <p:cNvPr id="17" name="Straight Arrow Connector 16"/>
+          <p:cNvCxnSpPr/>
+          <p:nvPr/>
+        </p:nvCxnSpPr>
+        <p:spPr>
+          <a:xfrm>
+            <a:off x="2555776" y="2564904"/>
+            <a:ext cx="792088" cy="0"/>
+          </a:xfrm>
+          <a:prstGeom prst="straightConnector1">
+            <a:avLst/>
+          </a:prstGeom>
+          <a:ln w="57150">
+            <a:solidFill>
+              <a:schemeClr val="tx1"/>
+            </a:solidFill>
+            <a:tailEnd type="arrow"/>
+          </a:ln>
+        </p:spPr>
+        <p:style>
+          <a:lnRef idx="1">
+            <a:schemeClr val="accent1"/>
+          </a:lnRef>
+          <a:fillRef idx="0">
+            <a:schemeClr val="accent1"/>
+          </a:fillRef>
+          <a:effectRef idx="0">
+            <a:schemeClr val="accent1"/>
+          </a:effectRef>
+          <a:fontRef idx="minor">
+            <a:schemeClr val="tx1"/>
+          </a:fontRef>
+        </p:style>
+      </p:cxnSp>
+      <p:pic>
+        <p:nvPicPr>
+          <p:cNvPr id="4101" name="Picture 5" descr="C:\Users\ames\Documents\activecontnoedge\figures\mines_mu_50000_n_100_initial_outside_thresh.png"/>
+          <p:cNvPicPr>
+            <a:picLocks noChangeAspect="1" noChangeArrowheads="1"/>
+          </p:cNvPicPr>
+          <p:nvPr/>
+        </p:nvPicPr>
+        <p:blipFill>
+          <a:blip r:embed="rId5" cstate="print"/>
+          <a:srcRect l="19457"/>
+          <a:stretch>
+            <a:fillRect/>
+          </a:stretch>
+        </p:blipFill>
+        <p:spPr bwMode="auto">
+          <a:xfrm>
+            <a:off x="6012160" y="3735227"/>
+            <a:ext cx="3131840" cy="2934133"/>
+          </a:xfrm>
+          <a:prstGeom prst="rect">
+            <a:avLst/>
+          </a:prstGeom>
+          <a:noFill/>
+        </p:spPr>
+      </p:pic>
+      <p:pic>
+        <p:nvPicPr>
+          <p:cNvPr id="4100" name="Picture 4" descr="C:\Users\ames\Documents\activecontnoedge\figures\mines_mu_50000_n_100_thresh.png"/>
+          <p:cNvPicPr>
+            <a:picLocks noChangeAspect="1" noChangeArrowheads="1"/>
+          </p:cNvPicPr>
+          <p:nvPr/>
+        </p:nvPicPr>
+        <p:blipFill>
+          <a:blip r:embed="rId6" cstate="print"/>
+          <a:srcRect l="19457"/>
+          <a:stretch>
+            <a:fillRect/>
+          </a:stretch>
+        </p:blipFill>
+        <p:spPr bwMode="auto">
+          <a:xfrm>
+            <a:off x="6012160" y="1052736"/>
+            <a:ext cx="3131840" cy="2934133"/>
+          </a:xfrm>
+          <a:prstGeom prst="rect">
+            <a:avLst/>
+          </a:prstGeom>
+          <a:noFill/>
+        </p:spPr>
+      </p:pic>
+      <p:sp>
+        <p:nvSpPr>
+          <p:cNvPr id="19" name="Rectangle 18"/>
+          <p:cNvSpPr/>
+          <p:nvPr/>
+        </p:nvSpPr>
+        <p:spPr>
+          <a:xfrm>
+            <a:off x="611560" y="2204864"/>
+            <a:ext cx="936104" cy="864096"/>
+          </a:xfrm>
+          <a:prstGeom prst="rect">
+            <a:avLst/>
+          </a:prstGeom>
+          <a:noFill/>
+          <a:ln w="9525">
+            <a:solidFill>
+              <a:srgbClr val="FF0000"/>
+            </a:solidFill>
+          </a:ln>
+        </p:spPr>
+        <p:style>
+          <a:lnRef idx="2">
+            <a:schemeClr val="accent1">
+              <a:shade val="50000"/>
+            </a:schemeClr>
+          </a:lnRef>
+          <a:fillRef idx="1">
+            <a:schemeClr val="accent1"/>
+          </a:fillRef>
+          <a:effectRef idx="0">
+            <a:schemeClr val="accent1"/>
+          </a:effectRef>
+          <a:fontRef idx="minor">
+            <a:schemeClr val="lt1"/>
+          </a:fontRef>
+        </p:style>
+        <p:txBody>
+          <a:bodyPr rtlCol="0" anchor="ctr"/>
+          <a:lstStyle/>
+          <a:p>
+            <a:pPr algn="ctr"/>
+            <a:endParaRPr lang="en-GB"/>
+          </a:p>
+        </p:txBody>
+      </p:sp>
+      <p:sp>
+        <p:nvSpPr>
+          <p:cNvPr id="20" name="Rectangle 19"/>
+          <p:cNvSpPr/>
+          <p:nvPr/>
+        </p:nvSpPr>
+        <p:spPr>
+          <a:xfrm>
+            <a:off x="683568" y="4149080"/>
+            <a:ext cx="504056" cy="360040"/>
+          </a:xfrm>
+          <a:prstGeom prst="rect">
+            <a:avLst/>
+          </a:prstGeom>
+          <a:noFill/>
+          <a:ln w="9525">
+            <a:solidFill>
+              <a:srgbClr val="FF0000"/>
+            </a:solidFill>
+          </a:ln>
+        </p:spPr>
+        <p:style>
+          <a:lnRef idx="2">
+            <a:schemeClr val="accent1">
+              <a:shade val="50000"/>
+            </a:schemeClr>
+          </a:lnRef>
+          <a:fillRef idx="1">
+            <a:schemeClr val="accent1"/>
+          </a:fillRef>
+          <a:effectRef idx="0">
+            <a:schemeClr val="accent1"/>
+          </a:effectRef>
+          <a:fontRef idx="minor">
+            <a:schemeClr val="lt1"/>
+          </a:fontRef>
+        </p:style>
+        <p:txBody>
+          <a:bodyPr rtlCol="0" anchor="ctr"/>
+          <a:lstStyle/>
+          <a:p>
+            <a:pPr algn="ctr"/>
+            <a:endParaRPr lang="en-GB"/>
+          </a:p>
+        </p:txBody>
+      </p:sp>
+    </p:spTree>
+  </p:cSld>
+  <p:clrMapOvr>
+    <a:masterClrMapping/>
+  </p:clrMapOvr>
+  <p:timing>
+    <p:tnLst>
+      <p:par>
+        <p:cTn id="1" dur="indefinite" restart="never" nodeType="tmRoot"/>
+      </p:par>
+    </p:tnLst>
+  </p:timing>
+</p:sld>
+</file>
+
+<file path=ppt/slides/slide16.xml><?xml version="1.0" encoding="utf-8"?>
+<p:sld xmlns:a="http://schemas.openxmlformats.org/drawingml/2006/main" xmlns:r="http://schemas.openxmlformats.org/officeDocument/2006/relationships" xmlns:p="http://schemas.openxmlformats.org/presentationml/2006/main">
+  <p:cSld>
+    <p:spTree>
+      <p:nvGrpSpPr>
+        <p:cNvPr id="1" name=""/>
+        <p:cNvGrpSpPr/>
+        <p:nvPr/>
+      </p:nvGrpSpPr>
+      <p:grpSpPr>
+        <a:xfrm>
+          <a:off x="0" y="0"/>
+          <a:ext cx="0" cy="0"/>
+          <a:chOff x="0" y="0"/>
+          <a:chExt cx="0" cy="0"/>
+        </a:xfrm>
+      </p:grpSpPr>
+      <p:sp>
+        <p:nvSpPr>
+          <p:cNvPr id="4" name="Title 3"/>
+          <p:cNvSpPr>
+            <a:spLocks noGrp="1"/>
+          </p:cNvSpPr>
+          <p:nvPr>
+            <p:ph type="ctrTitle"/>
+          </p:nvPr>
+        </p:nvSpPr>
+        <p:spPr/>
+        <p:txBody>
+          <a:bodyPr/>
+          <a:lstStyle/>
+          <a:p>
+            <a:r>
+              <a:rPr lang="en-GB" dirty="0" smtClean="0"/>
+              <a:t>Demo</a:t>
+            </a:r>
+            <a:endParaRPr lang="en-GB" dirty="0"/>
+          </a:p>
+        </p:txBody>
+      </p:sp>
+      <p:sp>
+        <p:nvSpPr>
+          <p:cNvPr id="5" name="Subtitle 4"/>
+          <p:cNvSpPr>
+            <a:spLocks noGrp="1"/>
+          </p:cNvSpPr>
+          <p:nvPr>
+            <p:ph type="subTitle" idx="1"/>
+          </p:nvPr>
+        </p:nvSpPr>
+        <p:spPr/>
+        <p:txBody>
+          <a:bodyPr/>
+          <a:lstStyle/>
+          <a:p>
+            <a:endParaRPr lang="en-GB"/>
+          </a:p>
+        </p:txBody>
+      </p:sp>
+    </p:spTree>
+  </p:cSld>
+  <p:clrMapOvr>
+    <a:masterClrMapping/>
+  </p:clrMapOvr>
+  <p:timing>
+    <p:tnLst>
+      <p:par>
+        <p:cTn id="1" dur="indefinite" restart="never" nodeType="tmRoot"/>
+      </p:par>
+    </p:tnLst>
+  </p:timing>
+</p:sld>
+</file>
+
+<file path=ppt/slides/slide17.xml><?xml version="1.0" encoding="utf-8"?>
+<p:sld xmlns:a="http://schemas.openxmlformats.org/drawingml/2006/main" xmlns:r="http://schemas.openxmlformats.org/officeDocument/2006/relationships" xmlns:p="http://schemas.openxmlformats.org/presentationml/2006/main">
+  <p:cSld>
+    <p:spTree>
+      <p:nvGrpSpPr>
+        <p:cNvPr id="1" name=""/>
+        <p:cNvGrpSpPr/>
+        <p:nvPr/>
+      </p:nvGrpSpPr>
+      <p:grpSpPr>
+        <a:xfrm>
+          <a:off x="0" y="0"/>
+          <a:ext cx="0" cy="0"/>
+          <a:chOff x="0" y="0"/>
+          <a:chExt cx="0" cy="0"/>
+        </a:xfrm>
+      </p:grpSpPr>
+      <p:sp>
+        <p:nvSpPr>
+          <p:cNvPr id="2" name="Title 1"/>
+          <p:cNvSpPr>
+            <a:spLocks noGrp="1"/>
+          </p:cNvSpPr>
+          <p:nvPr>
+            <p:ph type="title"/>
+          </p:nvPr>
+        </p:nvSpPr>
+        <p:spPr/>
+        <p:txBody>
+          <a:bodyPr/>
+          <a:lstStyle/>
+          <a:p>
+            <a:r>
+              <a:rPr lang="en-GB" dirty="0" smtClean="0"/>
+              <a:t>Extensions</a:t>
+            </a:r>
+            <a:endParaRPr lang="en-GB" dirty="0"/>
+          </a:p>
+        </p:txBody>
+      </p:sp>
+      <p:sp>
+        <p:nvSpPr>
+          <p:cNvPr id="3" name="Content Placeholder 2"/>
+          <p:cNvSpPr>
+            <a:spLocks noGrp="1"/>
+          </p:cNvSpPr>
+          <p:nvPr>
+            <p:ph idx="1"/>
+          </p:nvPr>
+        </p:nvSpPr>
+        <p:spPr/>
+        <p:txBody>
+          <a:bodyPr/>
+          <a:lstStyle/>
+          <a:p>
+            <a:r>
+              <a:rPr lang="en-GB" dirty="0" smtClean="0"/>
+              <a:t>Solve time dependant PDE</a:t>
+            </a:r>
+          </a:p>
+          <a:p>
+            <a:pPr lvl="1"/>
+            <a:r>
+              <a:rPr lang="en-GB" dirty="0" smtClean="0"/>
+              <a:t>They do say use of time dependant PDE is not crucial</a:t>
+            </a:r>
+            <a:endParaRPr lang="en-GB" dirty="0"/>
+          </a:p>
+        </p:txBody>
+      </p:sp>
+    </p:spTree>
+  </p:cSld>
+  <p:clrMapOvr>
+    <a:masterClrMapping/>
+  </p:clrMapOvr>
+  <p:timing>
+    <p:tnLst>
+      <p:par>
+        <p:cTn id="1" dur="indefinite" restart="never" nodeType="tmRoot"/>
+      </p:par>
+    </p:tnLst>
+  </p:timing>
+</p:sld>
+</file>
+
+<file path=ppt/slides/slide18.xml><?xml version="1.0" encoding="utf-8"?>
 <p:sld xmlns:a="http://schemas.openxmlformats.org/drawingml/2006/main" xmlns:r="http://schemas.openxmlformats.org/officeDocument/2006/relationships" xmlns:p="http://schemas.openxmlformats.org/presentationml/2006/main">
   <p:cSld>
     <p:spTree>

</xml_diff>

<commit_message>
Added stuff to do with noise
</commit_message>
<xml_diff>
--- a/michael-activecont.pptx
+++ b/michael-activecont.pptx
@@ -20,9 +20,10 @@
     <p:sldId id="273" r:id="rId14"/>
     <p:sldId id="274" r:id="rId15"/>
     <p:sldId id="275" r:id="rId16"/>
-    <p:sldId id="276" r:id="rId17"/>
-    <p:sldId id="258" r:id="rId18"/>
-    <p:sldId id="268" r:id="rId19"/>
+    <p:sldId id="277" r:id="rId17"/>
+    <p:sldId id="276" r:id="rId18"/>
+    <p:sldId id="258" r:id="rId19"/>
+    <p:sldId id="268" r:id="rId20"/>
   </p:sldIdLst>
   <p:sldSz cx="9144000" cy="6858000" type="screen4x3"/>
   <p:notesSz cx="6858000" cy="9144000"/>
@@ -4893,24 +4894,56 @@
           <a:chExt cx="0" cy="0"/>
         </a:xfrm>
       </p:grpSpPr>
-      <p:sp>
-        <p:nvSpPr>
-          <p:cNvPr id="4" name="Title 3"/>
-          <p:cNvSpPr>
-            <a:spLocks noGrp="1"/>
-          </p:cNvSpPr>
-          <p:nvPr>
-            <p:ph type="ctrTitle"/>
+      <p:pic>
+        <p:nvPicPr>
+          <p:cNvPr id="1026" name="Picture 2" descr="C:\Users\ames\Documents\activecontnoedge\figures\mines_nosie_width_20.png"/>
+          <p:cNvPicPr>
+            <a:picLocks noChangeAspect="1" noChangeArrowheads="1"/>
+          </p:cNvPicPr>
+          <p:nvPr/>
+        </p:nvPicPr>
+        <p:blipFill>
+          <a:blip r:embed="rId2" cstate="print"/>
+          <a:srcRect l="19102" t="6757" r="20986" b="3600"/>
+          <a:stretch>
+            <a:fillRect/>
+          </a:stretch>
+        </p:blipFill>
+        <p:spPr bwMode="auto">
+          <a:xfrm>
+            <a:off x="492232" y="1988840"/>
+            <a:ext cx="3071656" cy="3467998"/>
+          </a:xfrm>
+          <a:prstGeom prst="rect">
+            <a:avLst/>
+          </a:prstGeom>
+          <a:noFill/>
+        </p:spPr>
+      </p:pic>
+      <p:sp>
+        <p:nvSpPr>
+          <p:cNvPr id="2" name="Title 1"/>
+          <p:cNvSpPr>
+            <a:spLocks noGrp="1"/>
+          </p:cNvSpPr>
+          <p:nvPr>
+            <p:ph type="title"/>
           </p:nvPr>
         </p:nvSpPr>
         <p:spPr/>
         <p:txBody>
-          <a:bodyPr/>
+          <a:bodyPr>
+            <a:normAutofit/>
+          </a:bodyPr>
           <a:lstStyle/>
           <a:p>
             <a:r>
               <a:rPr lang="en-GB" dirty="0" smtClean="0"/>
-              <a:t>Demo</a:t>
+              <a:t>Results </a:t>
+            </a:r>
+            <a:r>
+              <a:rPr lang="en-GB" dirty="0" smtClean="0"/>
+              <a:t>– Noise</a:t>
             </a:r>
             <a:endParaRPr lang="en-GB" dirty="0"/>
           </a:p>
@@ -4918,23 +4951,165 @@
       </p:sp>
       <p:sp>
         <p:nvSpPr>
-          <p:cNvPr id="5" name="Subtitle 4"/>
-          <p:cNvSpPr>
-            <a:spLocks noGrp="1"/>
-          </p:cNvSpPr>
-          <p:nvPr>
-            <p:ph type="subTitle" idx="1"/>
-          </p:nvPr>
-        </p:nvSpPr>
-        <p:spPr/>
-        <p:txBody>
-          <a:bodyPr/>
-          <a:lstStyle/>
-          <a:p>
+          <p:cNvPr id="10" name="Rectangle 9"/>
+          <p:cNvSpPr/>
+          <p:nvPr/>
+        </p:nvSpPr>
+        <p:spPr>
+          <a:xfrm>
+            <a:off x="467544" y="5733256"/>
+            <a:ext cx="8352928" cy="646331"/>
+          </a:xfrm>
+          <a:prstGeom prst="rect">
+            <a:avLst/>
+          </a:prstGeom>
+        </p:spPr>
+        <p:txBody>
+          <a:bodyPr wrap="square">
+            <a:spAutoFit/>
+          </a:bodyPr>
+          <a:lstStyle/>
+          <a:p>
+            <a:pPr algn="ctr"/>
+            <a:r>
+              <a:rPr lang="en-GB" dirty="0" smtClean="0"/>
+              <a:t>100 iterations, </a:t>
+            </a:r>
+            <a:r>
+              <a:rPr lang="el-GR" dirty="0" smtClean="0"/>
+              <a:t>μ</a:t>
+            </a:r>
+            <a:r>
+              <a:rPr lang="en-GB" dirty="0" smtClean="0"/>
+              <a:t> = </a:t>
+            </a:r>
+            <a:r>
+              <a:rPr lang="en-GB" dirty="0" smtClean="0"/>
+              <a:t>50000</a:t>
+            </a:r>
+          </a:p>
+          <a:p>
+            <a:pPr algn="ctr"/>
+            <a:r>
+              <a:rPr lang="en-GB" dirty="0" smtClean="0"/>
+              <a:t>A</a:t>
+            </a:r>
+            <a:r>
+              <a:rPr lang="en-GB" dirty="0" smtClean="0"/>
+              <a:t>dditive Gaussian noise: mean = 0, std deviation = 20 (approx 0.1% of image mean)</a:t>
+            </a:r>
+            <a:endParaRPr lang="en-GB" dirty="0"/>
+          </a:p>
+        </p:txBody>
+      </p:sp>
+      <p:cxnSp>
+        <p:nvCxnSpPr>
+          <p:cNvPr id="17" name="Straight Arrow Connector 16"/>
+          <p:cNvCxnSpPr/>
+          <p:nvPr/>
+        </p:nvCxnSpPr>
+        <p:spPr>
+          <a:xfrm>
+            <a:off x="3995936" y="3429000"/>
+            <a:ext cx="792088" cy="0"/>
+          </a:xfrm>
+          <a:prstGeom prst="straightConnector1">
+            <a:avLst/>
+          </a:prstGeom>
+          <a:ln w="57150">
+            <a:solidFill>
+              <a:schemeClr val="tx1"/>
+            </a:solidFill>
+            <a:tailEnd type="arrow"/>
+          </a:ln>
+        </p:spPr>
+        <p:style>
+          <a:lnRef idx="1">
+            <a:schemeClr val="accent1"/>
+          </a:lnRef>
+          <a:fillRef idx="0">
+            <a:schemeClr val="accent1"/>
+          </a:fillRef>
+          <a:effectRef idx="0">
+            <a:schemeClr val="accent1"/>
+          </a:effectRef>
+          <a:fontRef idx="minor">
+            <a:schemeClr val="tx1"/>
+          </a:fontRef>
+        </p:style>
+      </p:cxnSp>
+      <p:sp>
+        <p:nvSpPr>
+          <p:cNvPr id="19" name="Rectangle 18"/>
+          <p:cNvSpPr/>
+          <p:nvPr/>
+        </p:nvSpPr>
+        <p:spPr>
+          <a:xfrm>
+            <a:off x="1187624" y="3140968"/>
+            <a:ext cx="1224136" cy="1296144"/>
+          </a:xfrm>
+          <a:prstGeom prst="rect">
+            <a:avLst/>
+          </a:prstGeom>
+          <a:noFill/>
+          <a:ln w="9525">
+            <a:solidFill>
+              <a:srgbClr val="FF0000"/>
+            </a:solidFill>
+          </a:ln>
+        </p:spPr>
+        <p:style>
+          <a:lnRef idx="2">
+            <a:schemeClr val="accent1">
+              <a:shade val="50000"/>
+            </a:schemeClr>
+          </a:lnRef>
+          <a:fillRef idx="1">
+            <a:schemeClr val="accent1"/>
+          </a:fillRef>
+          <a:effectRef idx="0">
+            <a:schemeClr val="accent1"/>
+          </a:effectRef>
+          <a:fontRef idx="minor">
+            <a:schemeClr val="lt1"/>
+          </a:fontRef>
+        </p:style>
+        <p:txBody>
+          <a:bodyPr rtlCol="0" anchor="ctr"/>
+          <a:lstStyle/>
+          <a:p>
+            <a:pPr algn="ctr"/>
             <a:endParaRPr lang="en-GB"/>
           </a:p>
         </p:txBody>
       </p:sp>
+      <p:pic>
+        <p:nvPicPr>
+          <p:cNvPr id="1028" name="Picture 4" descr="C:\Users\ames\Documents\activecontnoedge\figures\mines_nosie_width_20_mu_50000_n100_contour.png"/>
+          <p:cNvPicPr>
+            <a:picLocks noChangeAspect="1" noChangeArrowheads="1"/>
+          </p:cNvPicPr>
+          <p:nvPr/>
+        </p:nvPicPr>
+        <p:blipFill>
+          <a:blip r:embed="rId3" cstate="print"/>
+          <a:srcRect l="20961" t="5556" r="20350" b="3704"/>
+          <a:stretch>
+            <a:fillRect/>
+          </a:stretch>
+        </p:blipFill>
+        <p:spPr bwMode="auto">
+          <a:xfrm>
+            <a:off x="5148064" y="1916832"/>
+            <a:ext cx="3024336" cy="3528392"/>
+          </a:xfrm>
+          <a:prstGeom prst="rect">
+            <a:avLst/>
+          </a:prstGeom>
+          <a:noFill/>
+        </p:spPr>
+      </p:pic>
     </p:spTree>
   </p:cSld>
   <p:clrMapOvr>
@@ -4969,12 +5144,12 @@
       </p:grpSpPr>
       <p:sp>
         <p:nvSpPr>
-          <p:cNvPr id="2" name="Title 1"/>
-          <p:cNvSpPr>
-            <a:spLocks noGrp="1"/>
-          </p:cNvSpPr>
-          <p:nvPr>
-            <p:ph type="title"/>
+          <p:cNvPr id="4" name="Title 3"/>
+          <p:cNvSpPr>
+            <a:spLocks noGrp="1"/>
+          </p:cNvSpPr>
+          <p:nvPr>
+            <p:ph type="ctrTitle"/>
           </p:nvPr>
         </p:nvSpPr>
         <p:spPr/>
@@ -4984,7 +5159,7 @@
           <a:p>
             <a:r>
               <a:rPr lang="en-GB" dirty="0" smtClean="0"/>
-              <a:t>Extensions</a:t>
+              <a:t>Demo</a:t>
             </a:r>
             <a:endParaRPr lang="en-GB" dirty="0"/>
           </a:p>
@@ -4992,12 +5167,12 @@
       </p:sp>
       <p:sp>
         <p:nvSpPr>
-          <p:cNvPr id="3" name="Content Placeholder 2"/>
-          <p:cNvSpPr>
-            <a:spLocks noGrp="1"/>
-          </p:cNvSpPr>
-          <p:nvPr>
-            <p:ph idx="1"/>
+          <p:cNvPr id="5" name="Subtitle 4"/>
+          <p:cNvSpPr>
+            <a:spLocks noGrp="1"/>
+          </p:cNvSpPr>
+          <p:nvPr>
+            <p:ph type="subTitle" idx="1"/>
           </p:nvPr>
         </p:nvSpPr>
         <p:spPr/>
@@ -5005,18 +5180,7 @@
           <a:bodyPr/>
           <a:lstStyle/>
           <a:p>
-            <a:r>
-              <a:rPr lang="en-GB" dirty="0" smtClean="0"/>
-              <a:t>Solve time dependant PDE</a:t>
-            </a:r>
-          </a:p>
-          <a:p>
-            <a:pPr lvl="1"/>
-            <a:r>
-              <a:rPr lang="en-GB" dirty="0" smtClean="0"/>
-              <a:t>They do say use of time dependant PDE is not crucial</a:t>
-            </a:r>
-            <a:endParaRPr lang="en-GB" dirty="0"/>
+            <a:endParaRPr lang="en-GB"/>
           </a:p>
         </p:txBody>
       </p:sp>
@@ -5036,6 +5200,91 @@
 </file>
 
 <file path=ppt/slides/slide18.xml><?xml version="1.0" encoding="utf-8"?>
+<p:sld xmlns:a="http://schemas.openxmlformats.org/drawingml/2006/main" xmlns:r="http://schemas.openxmlformats.org/officeDocument/2006/relationships" xmlns:p="http://schemas.openxmlformats.org/presentationml/2006/main">
+  <p:cSld>
+    <p:spTree>
+      <p:nvGrpSpPr>
+        <p:cNvPr id="1" name=""/>
+        <p:cNvGrpSpPr/>
+        <p:nvPr/>
+      </p:nvGrpSpPr>
+      <p:grpSpPr>
+        <a:xfrm>
+          <a:off x="0" y="0"/>
+          <a:ext cx="0" cy="0"/>
+          <a:chOff x="0" y="0"/>
+          <a:chExt cx="0" cy="0"/>
+        </a:xfrm>
+      </p:grpSpPr>
+      <p:sp>
+        <p:nvSpPr>
+          <p:cNvPr id="2" name="Title 1"/>
+          <p:cNvSpPr>
+            <a:spLocks noGrp="1"/>
+          </p:cNvSpPr>
+          <p:nvPr>
+            <p:ph type="title"/>
+          </p:nvPr>
+        </p:nvSpPr>
+        <p:spPr/>
+        <p:txBody>
+          <a:bodyPr/>
+          <a:lstStyle/>
+          <a:p>
+            <a:r>
+              <a:rPr lang="en-GB" dirty="0" smtClean="0"/>
+              <a:t>Extensions</a:t>
+            </a:r>
+            <a:endParaRPr lang="en-GB" dirty="0"/>
+          </a:p>
+        </p:txBody>
+      </p:sp>
+      <p:sp>
+        <p:nvSpPr>
+          <p:cNvPr id="3" name="Content Placeholder 2"/>
+          <p:cNvSpPr>
+            <a:spLocks noGrp="1"/>
+          </p:cNvSpPr>
+          <p:nvPr>
+            <p:ph idx="1"/>
+          </p:nvPr>
+        </p:nvSpPr>
+        <p:spPr/>
+        <p:txBody>
+          <a:bodyPr/>
+          <a:lstStyle/>
+          <a:p>
+            <a:r>
+              <a:rPr lang="en-GB" dirty="0" smtClean="0"/>
+              <a:t>Solve time dependant PDE</a:t>
+            </a:r>
+          </a:p>
+          <a:p>
+            <a:pPr lvl="1"/>
+            <a:r>
+              <a:rPr lang="en-GB" dirty="0" smtClean="0"/>
+              <a:t>They do say use of time dependant PDE is not crucial</a:t>
+            </a:r>
+            <a:endParaRPr lang="en-GB" dirty="0"/>
+          </a:p>
+        </p:txBody>
+      </p:sp>
+    </p:spTree>
+  </p:cSld>
+  <p:clrMapOvr>
+    <a:masterClrMapping/>
+  </p:clrMapOvr>
+  <p:timing>
+    <p:tnLst>
+      <p:par>
+        <p:cTn id="1" dur="indefinite" restart="never" nodeType="tmRoot"/>
+      </p:par>
+    </p:tnLst>
+  </p:timing>
+</p:sld>
+</file>
+
+<file path=ppt/slides/slide19.xml><?xml version="1.0" encoding="utf-8"?>
 <p:sld xmlns:a="http://schemas.openxmlformats.org/drawingml/2006/main" xmlns:r="http://schemas.openxmlformats.org/officeDocument/2006/relationships" xmlns:p="http://schemas.openxmlformats.org/presentationml/2006/main">
   <p:cSld>
     <p:spTree>

</xml_diff>

<commit_message>
Almost finished my slides
</commit_message>
<xml_diff>
--- a/michael-activecont.pptx
+++ b/michael-activecont.pptx
@@ -4,26 +4,31 @@
   <p:sldMasterIdLst>
     <p:sldMasterId id="2147483648" r:id="rId1"/>
   </p:sldMasterIdLst>
+  <p:notesMasterIdLst>
+    <p:notesMasterId r:id="rId23"/>
+  </p:notesMasterIdLst>
   <p:sldIdLst>
     <p:sldId id="256" r:id="rId2"/>
-    <p:sldId id="259" r:id="rId3"/>
-    <p:sldId id="260" r:id="rId4"/>
-    <p:sldId id="261" r:id="rId5"/>
-    <p:sldId id="264" r:id="rId6"/>
-    <p:sldId id="262" r:id="rId7"/>
-    <p:sldId id="265" r:id="rId8"/>
-    <p:sldId id="270" r:id="rId9"/>
-    <p:sldId id="266" r:id="rId10"/>
-    <p:sldId id="269" r:id="rId11"/>
-    <p:sldId id="271" r:id="rId12"/>
+    <p:sldId id="260" r:id="rId3"/>
+    <p:sldId id="261" r:id="rId4"/>
+    <p:sldId id="264" r:id="rId5"/>
+    <p:sldId id="262" r:id="rId6"/>
+    <p:sldId id="265" r:id="rId7"/>
+    <p:sldId id="270" r:id="rId8"/>
+    <p:sldId id="266" r:id="rId9"/>
+    <p:sldId id="269" r:id="rId10"/>
+    <p:sldId id="271" r:id="rId11"/>
+    <p:sldId id="280" r:id="rId12"/>
     <p:sldId id="272" r:id="rId13"/>
     <p:sldId id="273" r:id="rId14"/>
     <p:sldId id="274" r:id="rId15"/>
     <p:sldId id="275" r:id="rId16"/>
     <p:sldId id="277" r:id="rId17"/>
     <p:sldId id="276" r:id="rId18"/>
-    <p:sldId id="258" r:id="rId19"/>
-    <p:sldId id="268" r:id="rId20"/>
+    <p:sldId id="278" r:id="rId19"/>
+    <p:sldId id="279" r:id="rId20"/>
+    <p:sldId id="258" r:id="rId21"/>
+    <p:sldId id="268" r:id="rId22"/>
   </p:sldIdLst>
   <p:sldSz cx="9144000" cy="6858000" type="screen4x3"/>
   <p:notesSz cx="6858000" cy="9144000"/>
@@ -125,6 +130,434 @@
 </p:presentation>
 </file>
 
+<file path=ppt/notesMasters/notesMaster1.xml><?xml version="1.0" encoding="utf-8"?>
+<p:notesMaster xmlns:a="http://schemas.openxmlformats.org/drawingml/2006/main" xmlns:r="http://schemas.openxmlformats.org/officeDocument/2006/relationships" xmlns:p="http://schemas.openxmlformats.org/presentationml/2006/main">
+  <p:cSld>
+    <p:bg>
+      <p:bgRef idx="1001">
+        <a:schemeClr val="bg1"/>
+      </p:bgRef>
+    </p:bg>
+    <p:spTree>
+      <p:nvGrpSpPr>
+        <p:cNvPr id="1" name=""/>
+        <p:cNvGrpSpPr/>
+        <p:nvPr/>
+      </p:nvGrpSpPr>
+      <p:grpSpPr>
+        <a:xfrm>
+          <a:off x="0" y="0"/>
+          <a:ext cx="0" cy="0"/>
+          <a:chOff x="0" y="0"/>
+          <a:chExt cx="0" cy="0"/>
+        </a:xfrm>
+      </p:grpSpPr>
+      <p:sp>
+        <p:nvSpPr>
+          <p:cNvPr id="2" name="Header Placeholder 1"/>
+          <p:cNvSpPr>
+            <a:spLocks noGrp="1"/>
+          </p:cNvSpPr>
+          <p:nvPr>
+            <p:ph type="hdr" sz="quarter"/>
+          </p:nvPr>
+        </p:nvSpPr>
+        <p:spPr>
+          <a:xfrm>
+            <a:off x="0" y="0"/>
+            <a:ext cx="2971800" cy="457200"/>
+          </a:xfrm>
+          <a:prstGeom prst="rect">
+            <a:avLst/>
+          </a:prstGeom>
+        </p:spPr>
+        <p:txBody>
+          <a:bodyPr vert="horz" lIns="91440" tIns="45720" rIns="91440" bIns="45720" rtlCol="0"/>
+          <a:lstStyle>
+            <a:lvl1pPr algn="l">
+              <a:defRPr sz="1200"/>
+            </a:lvl1pPr>
+          </a:lstStyle>
+          <a:p>
+            <a:endParaRPr lang="en-GB"/>
+          </a:p>
+        </p:txBody>
+      </p:sp>
+      <p:sp>
+        <p:nvSpPr>
+          <p:cNvPr id="3" name="Date Placeholder 2"/>
+          <p:cNvSpPr>
+            <a:spLocks noGrp="1"/>
+          </p:cNvSpPr>
+          <p:nvPr>
+            <p:ph type="dt" idx="1"/>
+          </p:nvPr>
+        </p:nvSpPr>
+        <p:spPr>
+          <a:xfrm>
+            <a:off x="3884613" y="0"/>
+            <a:ext cx="2971800" cy="457200"/>
+          </a:xfrm>
+          <a:prstGeom prst="rect">
+            <a:avLst/>
+          </a:prstGeom>
+        </p:spPr>
+        <p:txBody>
+          <a:bodyPr vert="horz" lIns="91440" tIns="45720" rIns="91440" bIns="45720" rtlCol="0"/>
+          <a:lstStyle>
+            <a:lvl1pPr algn="r">
+              <a:defRPr sz="1200"/>
+            </a:lvl1pPr>
+          </a:lstStyle>
+          <a:p>
+            <a:fld id="{EC603A51-B07E-4859-BC84-4E08B68D3C45}" type="datetimeFigureOut">
+              <a:rPr lang="en-GB" smtClean="0"/>
+              <a:t>20/02/2012</a:t>
+            </a:fld>
+            <a:endParaRPr lang="en-GB"/>
+          </a:p>
+        </p:txBody>
+      </p:sp>
+      <p:sp>
+        <p:nvSpPr>
+          <p:cNvPr id="4" name="Slide Image Placeholder 3"/>
+          <p:cNvSpPr>
+            <a:spLocks noGrp="1" noRot="1" noChangeAspect="1"/>
+          </p:cNvSpPr>
+          <p:nvPr>
+            <p:ph type="sldImg" idx="2"/>
+          </p:nvPr>
+        </p:nvSpPr>
+        <p:spPr>
+          <a:xfrm>
+            <a:off x="1143000" y="685800"/>
+            <a:ext cx="4572000" cy="3429000"/>
+          </a:xfrm>
+          <a:prstGeom prst="rect">
+            <a:avLst/>
+          </a:prstGeom>
+          <a:noFill/>
+          <a:ln w="12700">
+            <a:solidFill>
+              <a:prstClr val="black"/>
+            </a:solidFill>
+          </a:ln>
+        </p:spPr>
+        <p:txBody>
+          <a:bodyPr vert="horz" lIns="91440" tIns="45720" rIns="91440" bIns="45720" rtlCol="0" anchor="ctr"/>
+          <a:lstStyle/>
+          <a:p>
+            <a:endParaRPr lang="en-GB"/>
+          </a:p>
+        </p:txBody>
+      </p:sp>
+      <p:sp>
+        <p:nvSpPr>
+          <p:cNvPr id="5" name="Notes Placeholder 4"/>
+          <p:cNvSpPr>
+            <a:spLocks noGrp="1"/>
+          </p:cNvSpPr>
+          <p:nvPr>
+            <p:ph type="body" sz="quarter" idx="3"/>
+          </p:nvPr>
+        </p:nvSpPr>
+        <p:spPr>
+          <a:xfrm>
+            <a:off x="685800" y="4343400"/>
+            <a:ext cx="5486400" cy="4114800"/>
+          </a:xfrm>
+          <a:prstGeom prst="rect">
+            <a:avLst/>
+          </a:prstGeom>
+        </p:spPr>
+        <p:txBody>
+          <a:bodyPr vert="horz" lIns="91440" tIns="45720" rIns="91440" bIns="45720" rtlCol="0">
+            <a:normAutofit/>
+          </a:bodyPr>
+          <a:lstStyle/>
+          <a:p>
+            <a:pPr lvl="0"/>
+            <a:r>
+              <a:rPr lang="en-US" smtClean="0"/>
+              <a:t>Click to edit Master text styles</a:t>
+            </a:r>
+          </a:p>
+          <a:p>
+            <a:pPr lvl="1"/>
+            <a:r>
+              <a:rPr lang="en-US" smtClean="0"/>
+              <a:t>Second level</a:t>
+            </a:r>
+          </a:p>
+          <a:p>
+            <a:pPr lvl="2"/>
+            <a:r>
+              <a:rPr lang="en-US" smtClean="0"/>
+              <a:t>Third level</a:t>
+            </a:r>
+          </a:p>
+          <a:p>
+            <a:pPr lvl="3"/>
+            <a:r>
+              <a:rPr lang="en-US" smtClean="0"/>
+              <a:t>Fourth level</a:t>
+            </a:r>
+          </a:p>
+          <a:p>
+            <a:pPr lvl="4"/>
+            <a:r>
+              <a:rPr lang="en-US" smtClean="0"/>
+              <a:t>Fifth level</a:t>
+            </a:r>
+            <a:endParaRPr lang="en-GB"/>
+          </a:p>
+        </p:txBody>
+      </p:sp>
+      <p:sp>
+        <p:nvSpPr>
+          <p:cNvPr id="6" name="Footer Placeholder 5"/>
+          <p:cNvSpPr>
+            <a:spLocks noGrp="1"/>
+          </p:cNvSpPr>
+          <p:nvPr>
+            <p:ph type="ftr" sz="quarter" idx="4"/>
+          </p:nvPr>
+        </p:nvSpPr>
+        <p:spPr>
+          <a:xfrm>
+            <a:off x="0" y="8685213"/>
+            <a:ext cx="2971800" cy="457200"/>
+          </a:xfrm>
+          <a:prstGeom prst="rect">
+            <a:avLst/>
+          </a:prstGeom>
+        </p:spPr>
+        <p:txBody>
+          <a:bodyPr vert="horz" lIns="91440" tIns="45720" rIns="91440" bIns="45720" rtlCol="0" anchor="b"/>
+          <a:lstStyle>
+            <a:lvl1pPr algn="l">
+              <a:defRPr sz="1200"/>
+            </a:lvl1pPr>
+          </a:lstStyle>
+          <a:p>
+            <a:endParaRPr lang="en-GB"/>
+          </a:p>
+        </p:txBody>
+      </p:sp>
+      <p:sp>
+        <p:nvSpPr>
+          <p:cNvPr id="7" name="Slide Number Placeholder 6"/>
+          <p:cNvSpPr>
+            <a:spLocks noGrp="1"/>
+          </p:cNvSpPr>
+          <p:nvPr>
+            <p:ph type="sldNum" sz="quarter" idx="5"/>
+          </p:nvPr>
+        </p:nvSpPr>
+        <p:spPr>
+          <a:xfrm>
+            <a:off x="3884613" y="8685213"/>
+            <a:ext cx="2971800" cy="457200"/>
+          </a:xfrm>
+          <a:prstGeom prst="rect">
+            <a:avLst/>
+          </a:prstGeom>
+        </p:spPr>
+        <p:txBody>
+          <a:bodyPr vert="horz" lIns="91440" tIns="45720" rIns="91440" bIns="45720" rtlCol="0" anchor="b"/>
+          <a:lstStyle>
+            <a:lvl1pPr algn="r">
+              <a:defRPr sz="1200"/>
+            </a:lvl1pPr>
+          </a:lstStyle>
+          <a:p>
+            <a:fld id="{29C6938F-570E-4474-B3D0-F0BA64B8A867}" type="slidenum">
+              <a:rPr lang="en-GB" smtClean="0"/>
+              <a:t>‹#›</a:t>
+            </a:fld>
+            <a:endParaRPr lang="en-GB"/>
+          </a:p>
+        </p:txBody>
+      </p:sp>
+    </p:spTree>
+  </p:cSld>
+  <p:clrMap bg1="lt1" tx1="dk1" bg2="lt2" tx2="dk2" accent1="accent1" accent2="accent2" accent3="accent3" accent4="accent4" accent5="accent5" accent6="accent6" hlink="hlink" folHlink="folHlink"/>
+  <p:notesStyle>
+    <a:lvl1pPr marL="0" algn="l" defTabSz="914400" rtl="0" eaLnBrk="1" latinLnBrk="0" hangingPunct="1">
+      <a:defRPr sz="1200" kern="1200">
+        <a:solidFill>
+          <a:schemeClr val="tx1"/>
+        </a:solidFill>
+        <a:latin typeface="+mn-lt"/>
+        <a:ea typeface="+mn-ea"/>
+        <a:cs typeface="+mn-cs"/>
+      </a:defRPr>
+    </a:lvl1pPr>
+    <a:lvl2pPr marL="457200" algn="l" defTabSz="914400" rtl="0" eaLnBrk="1" latinLnBrk="0" hangingPunct="1">
+      <a:defRPr sz="1200" kern="1200">
+        <a:solidFill>
+          <a:schemeClr val="tx1"/>
+        </a:solidFill>
+        <a:latin typeface="+mn-lt"/>
+        <a:ea typeface="+mn-ea"/>
+        <a:cs typeface="+mn-cs"/>
+      </a:defRPr>
+    </a:lvl2pPr>
+    <a:lvl3pPr marL="914400" algn="l" defTabSz="914400" rtl="0" eaLnBrk="1" latinLnBrk="0" hangingPunct="1">
+      <a:defRPr sz="1200" kern="1200">
+        <a:solidFill>
+          <a:schemeClr val="tx1"/>
+        </a:solidFill>
+        <a:latin typeface="+mn-lt"/>
+        <a:ea typeface="+mn-ea"/>
+        <a:cs typeface="+mn-cs"/>
+      </a:defRPr>
+    </a:lvl3pPr>
+    <a:lvl4pPr marL="1371600" algn="l" defTabSz="914400" rtl="0" eaLnBrk="1" latinLnBrk="0" hangingPunct="1">
+      <a:defRPr sz="1200" kern="1200">
+        <a:solidFill>
+          <a:schemeClr val="tx1"/>
+        </a:solidFill>
+        <a:latin typeface="+mn-lt"/>
+        <a:ea typeface="+mn-ea"/>
+        <a:cs typeface="+mn-cs"/>
+      </a:defRPr>
+    </a:lvl4pPr>
+    <a:lvl5pPr marL="1828800" algn="l" defTabSz="914400" rtl="0" eaLnBrk="1" latinLnBrk="0" hangingPunct="1">
+      <a:defRPr sz="1200" kern="1200">
+        <a:solidFill>
+          <a:schemeClr val="tx1"/>
+        </a:solidFill>
+        <a:latin typeface="+mn-lt"/>
+        <a:ea typeface="+mn-ea"/>
+        <a:cs typeface="+mn-cs"/>
+      </a:defRPr>
+    </a:lvl5pPr>
+    <a:lvl6pPr marL="2286000" algn="l" defTabSz="914400" rtl="0" eaLnBrk="1" latinLnBrk="0" hangingPunct="1">
+      <a:defRPr sz="1200" kern="1200">
+        <a:solidFill>
+          <a:schemeClr val="tx1"/>
+        </a:solidFill>
+        <a:latin typeface="+mn-lt"/>
+        <a:ea typeface="+mn-ea"/>
+        <a:cs typeface="+mn-cs"/>
+      </a:defRPr>
+    </a:lvl6pPr>
+    <a:lvl7pPr marL="2743200" algn="l" defTabSz="914400" rtl="0" eaLnBrk="1" latinLnBrk="0" hangingPunct="1">
+      <a:defRPr sz="1200" kern="1200">
+        <a:solidFill>
+          <a:schemeClr val="tx1"/>
+        </a:solidFill>
+        <a:latin typeface="+mn-lt"/>
+        <a:ea typeface="+mn-ea"/>
+        <a:cs typeface="+mn-cs"/>
+      </a:defRPr>
+    </a:lvl7pPr>
+    <a:lvl8pPr marL="3200400" algn="l" defTabSz="914400" rtl="0" eaLnBrk="1" latinLnBrk="0" hangingPunct="1">
+      <a:defRPr sz="1200" kern="1200">
+        <a:solidFill>
+          <a:schemeClr val="tx1"/>
+        </a:solidFill>
+        <a:latin typeface="+mn-lt"/>
+        <a:ea typeface="+mn-ea"/>
+        <a:cs typeface="+mn-cs"/>
+      </a:defRPr>
+    </a:lvl8pPr>
+    <a:lvl9pPr marL="3657600" algn="l" defTabSz="914400" rtl="0" eaLnBrk="1" latinLnBrk="0" hangingPunct="1">
+      <a:defRPr sz="1200" kern="1200">
+        <a:solidFill>
+          <a:schemeClr val="tx1"/>
+        </a:solidFill>
+        <a:latin typeface="+mn-lt"/>
+        <a:ea typeface="+mn-ea"/>
+        <a:cs typeface="+mn-cs"/>
+      </a:defRPr>
+    </a:lvl9pPr>
+  </p:notesStyle>
+</p:notesMaster>
+</file>
+
+<file path=ppt/notesSlides/notesSlide1.xml><?xml version="1.0" encoding="utf-8"?>
+<p:notes xmlns:a="http://schemas.openxmlformats.org/drawingml/2006/main" xmlns:r="http://schemas.openxmlformats.org/officeDocument/2006/relationships" xmlns:p="http://schemas.openxmlformats.org/presentationml/2006/main">
+  <p:cSld>
+    <p:spTree>
+      <p:nvGrpSpPr>
+        <p:cNvPr id="1" name=""/>
+        <p:cNvGrpSpPr/>
+        <p:nvPr/>
+      </p:nvGrpSpPr>
+      <p:grpSpPr>
+        <a:xfrm>
+          <a:off x="0" y="0"/>
+          <a:ext cx="0" cy="0"/>
+          <a:chOff x="0" y="0"/>
+          <a:chExt cx="0" cy="0"/>
+        </a:xfrm>
+      </p:grpSpPr>
+      <p:sp>
+        <p:nvSpPr>
+          <p:cNvPr id="2" name="Slide Image Placeholder 1"/>
+          <p:cNvSpPr>
+            <a:spLocks noGrp="1" noRot="1" noChangeAspect="1"/>
+          </p:cNvSpPr>
+          <p:nvPr>
+            <p:ph type="sldImg"/>
+          </p:nvPr>
+        </p:nvSpPr>
+        <p:spPr/>
+      </p:sp>
+      <p:sp>
+        <p:nvSpPr>
+          <p:cNvPr id="3" name="Notes Placeholder 2"/>
+          <p:cNvSpPr>
+            <a:spLocks noGrp="1"/>
+          </p:cNvSpPr>
+          <p:nvPr>
+            <p:ph type="body" idx="1"/>
+          </p:nvPr>
+        </p:nvSpPr>
+        <p:spPr/>
+        <p:txBody>
+          <a:bodyPr>
+            <a:normAutofit/>
+          </a:bodyPr>
+          <a:lstStyle/>
+          <a:p>
+            <a:endParaRPr lang="en-GB" dirty="0"/>
+          </a:p>
+        </p:txBody>
+      </p:sp>
+      <p:sp>
+        <p:nvSpPr>
+          <p:cNvPr id="4" name="Slide Number Placeholder 3"/>
+          <p:cNvSpPr>
+            <a:spLocks noGrp="1"/>
+          </p:cNvSpPr>
+          <p:nvPr>
+            <p:ph type="sldNum" sz="quarter" idx="10"/>
+          </p:nvPr>
+        </p:nvSpPr>
+        <p:spPr/>
+        <p:txBody>
+          <a:bodyPr/>
+          <a:lstStyle/>
+          <a:p>
+            <a:fld id="{29C6938F-570E-4474-B3D0-F0BA64B8A867}" type="slidenum">
+              <a:rPr lang="en-GB" smtClean="0"/>
+              <a:t>8</a:t>
+            </a:fld>
+            <a:endParaRPr lang="en-GB"/>
+          </a:p>
+        </p:txBody>
+      </p:sp>
+    </p:spTree>
+  </p:cSld>
+  <p:clrMapOvr>
+    <a:masterClrMapping/>
+  </p:clrMapOvr>
+</p:notes>
+</file>
+
 <file path=ppt/slideLayouts/slideLayout1.xml><?xml version="1.0" encoding="utf-8"?>
 <p:sldLayout xmlns:a="http://schemas.openxmlformats.org/drawingml/2006/main" xmlns:r="http://schemas.openxmlformats.org/officeDocument/2006/relationships" xmlns:p="http://schemas.openxmlformats.org/presentationml/2006/main" type="title" preserve="1">
   <p:cSld name="Title Slide">
@@ -307,7 +740,7 @@
             <a:fld id="{95BA9808-D7C6-4089-A934-D002E447D2F3}" type="datetimeFigureOut">
               <a:rPr lang="en-GB" smtClean="0"/>
               <a:pPr/>
-              <a:t>19/02/2012</a:t>
+              <a:t>20/02/2012</a:t>
             </a:fld>
             <a:endParaRPr lang="en-GB"/>
           </a:p>
@@ -474,7 +907,7 @@
             <a:fld id="{95BA9808-D7C6-4089-A934-D002E447D2F3}" type="datetimeFigureOut">
               <a:rPr lang="en-GB" smtClean="0"/>
               <a:pPr/>
-              <a:t>19/02/2012</a:t>
+              <a:t>20/02/2012</a:t>
             </a:fld>
             <a:endParaRPr lang="en-GB"/>
           </a:p>
@@ -651,7 +1084,7 @@
             <a:fld id="{95BA9808-D7C6-4089-A934-D002E447D2F3}" type="datetimeFigureOut">
               <a:rPr lang="en-GB" smtClean="0"/>
               <a:pPr/>
-              <a:t>19/02/2012</a:t>
+              <a:t>20/02/2012</a:t>
             </a:fld>
             <a:endParaRPr lang="en-GB"/>
           </a:p>
@@ -818,7 +1251,7 @@
             <a:fld id="{95BA9808-D7C6-4089-A934-D002E447D2F3}" type="datetimeFigureOut">
               <a:rPr lang="en-GB" smtClean="0"/>
               <a:pPr/>
-              <a:t>19/02/2012</a:t>
+              <a:t>20/02/2012</a:t>
             </a:fld>
             <a:endParaRPr lang="en-GB"/>
           </a:p>
@@ -1061,7 +1494,7 @@
             <a:fld id="{95BA9808-D7C6-4089-A934-D002E447D2F3}" type="datetimeFigureOut">
               <a:rPr lang="en-GB" smtClean="0"/>
               <a:pPr/>
-              <a:t>19/02/2012</a:t>
+              <a:t>20/02/2012</a:t>
             </a:fld>
             <a:endParaRPr lang="en-GB"/>
           </a:p>
@@ -1346,7 +1779,7 @@
             <a:fld id="{95BA9808-D7C6-4089-A934-D002E447D2F3}" type="datetimeFigureOut">
               <a:rPr lang="en-GB" smtClean="0"/>
               <a:pPr/>
-              <a:t>19/02/2012</a:t>
+              <a:t>20/02/2012</a:t>
             </a:fld>
             <a:endParaRPr lang="en-GB"/>
           </a:p>
@@ -1765,7 +2198,7 @@
             <a:fld id="{95BA9808-D7C6-4089-A934-D002E447D2F3}" type="datetimeFigureOut">
               <a:rPr lang="en-GB" smtClean="0"/>
               <a:pPr/>
-              <a:t>19/02/2012</a:t>
+              <a:t>20/02/2012</a:t>
             </a:fld>
             <a:endParaRPr lang="en-GB"/>
           </a:p>
@@ -1880,7 +2313,7 @@
             <a:fld id="{95BA9808-D7C6-4089-A934-D002E447D2F3}" type="datetimeFigureOut">
               <a:rPr lang="en-GB" smtClean="0"/>
               <a:pPr/>
-              <a:t>19/02/2012</a:t>
+              <a:t>20/02/2012</a:t>
             </a:fld>
             <a:endParaRPr lang="en-GB"/>
           </a:p>
@@ -1972,7 +2405,7 @@
             <a:fld id="{95BA9808-D7C6-4089-A934-D002E447D2F3}" type="datetimeFigureOut">
               <a:rPr lang="en-GB" smtClean="0"/>
               <a:pPr/>
-              <a:t>19/02/2012</a:t>
+              <a:t>20/02/2012</a:t>
             </a:fld>
             <a:endParaRPr lang="en-GB"/>
           </a:p>
@@ -2246,7 +2679,7 @@
             <a:fld id="{95BA9808-D7C6-4089-A934-D002E447D2F3}" type="datetimeFigureOut">
               <a:rPr lang="en-GB" smtClean="0"/>
               <a:pPr/>
-              <a:t>19/02/2012</a:t>
+              <a:t>20/02/2012</a:t>
             </a:fld>
             <a:endParaRPr lang="en-GB"/>
           </a:p>
@@ -2496,7 +2929,7 @@
             <a:fld id="{95BA9808-D7C6-4089-A934-D002E447D2F3}" type="datetimeFigureOut">
               <a:rPr lang="en-GB" smtClean="0"/>
               <a:pPr/>
-              <a:t>19/02/2012</a:t>
+              <a:t>20/02/2012</a:t>
             </a:fld>
             <a:endParaRPr lang="en-GB"/>
           </a:p>
@@ -2706,7 +3139,7 @@
             <a:fld id="{95BA9808-D7C6-4089-A934-D002E447D2F3}" type="datetimeFigureOut">
               <a:rPr lang="en-GB" smtClean="0"/>
               <a:pPr/>
-              <a:t>19/02/2012</a:t>
+              <a:t>20/02/2012</a:t>
             </a:fld>
             <a:endParaRPr lang="en-GB"/>
           </a:p>
@@ -3158,7 +3591,7 @@
             <a:spLocks noGrp="1"/>
           </p:cNvSpPr>
           <p:nvPr>
-            <p:ph type="title"/>
+            <p:ph type="ctrTitle"/>
           </p:nvPr>
         </p:nvSpPr>
         <p:spPr/>
@@ -3168,7 +3601,7 @@
           <a:p>
             <a:r>
               <a:rPr lang="en-GB" dirty="0" smtClean="0"/>
-              <a:t>Implementation</a:t>
+              <a:t>Results</a:t>
             </a:r>
             <a:endParaRPr lang="en-GB" dirty="0"/>
           </a:p>
@@ -3176,325 +3609,19 @@
       </p:sp>
       <p:sp>
         <p:nvSpPr>
-          <p:cNvPr id="3" name="Content Placeholder 2"/>
-          <p:cNvSpPr>
-            <a:spLocks noGrp="1"/>
-          </p:cNvSpPr>
-          <p:nvPr>
-            <p:ph idx="1"/>
-          </p:nvPr>
-        </p:nvSpPr>
-        <p:spPr>
-          <a:xfrm>
-            <a:off x="467544" y="1628800"/>
-            <a:ext cx="8229600" cy="4525963"/>
-          </a:xfrm>
-        </p:spPr>
+          <p:cNvPr id="3" name="Subtitle 2"/>
+          <p:cNvSpPr>
+            <a:spLocks noGrp="1"/>
+          </p:cNvSpPr>
+          <p:nvPr>
+            <p:ph type="subTitle" idx="1"/>
+          </p:nvPr>
+        </p:nvSpPr>
+        <p:spPr/>
         <p:txBody>
           <a:bodyPr/>
           <a:lstStyle/>
           <a:p>
-            <a:r>
-              <a:rPr lang="en-GB" dirty="0" smtClean="0"/>
-              <a:t>Gradient given by:</a:t>
-            </a:r>
-            <a:endParaRPr lang="en-GB" dirty="0"/>
-          </a:p>
-        </p:txBody>
-      </p:sp>
-      <p:pic>
-        <p:nvPicPr>
-          <p:cNvPr id="1027" name="Picture 3"/>
-          <p:cNvPicPr>
-            <a:picLocks noChangeAspect="1" noChangeArrowheads="1"/>
-          </p:cNvPicPr>
-          <p:nvPr/>
-        </p:nvPicPr>
-        <p:blipFill>
-          <a:blip r:embed="rId2" cstate="print"/>
-          <a:srcRect/>
-          <a:stretch>
-            <a:fillRect/>
-          </a:stretch>
-        </p:blipFill>
-        <p:spPr bwMode="auto">
-          <a:xfrm>
-            <a:off x="323528" y="2276872"/>
-            <a:ext cx="8599457" cy="4032448"/>
-          </a:xfrm>
-          <a:prstGeom prst="rect">
-            <a:avLst/>
-          </a:prstGeom>
-          <a:noFill/>
-          <a:ln w="9525">
-            <a:noFill/>
-            <a:miter lim="800000"/>
-            <a:headEnd/>
-            <a:tailEnd/>
-          </a:ln>
-        </p:spPr>
-      </p:pic>
-      <p:sp>
-        <p:nvSpPr>
-          <p:cNvPr id="6" name="Rectangle 5"/>
-          <p:cNvSpPr/>
-          <p:nvPr/>
-        </p:nvSpPr>
-        <p:spPr>
-          <a:xfrm>
-            <a:off x="539552" y="4581128"/>
-            <a:ext cx="8136904" cy="1656184"/>
-          </a:xfrm>
-          <a:prstGeom prst="rect">
-            <a:avLst/>
-          </a:prstGeom>
-          <a:solidFill>
-            <a:schemeClr val="bg1"/>
-          </a:solidFill>
-          <a:ln>
-            <a:solidFill>
-              <a:schemeClr val="tx1"/>
-            </a:solidFill>
-          </a:ln>
-        </p:spPr>
-        <p:style>
-          <a:lnRef idx="2">
-            <a:schemeClr val="accent1">
-              <a:shade val="50000"/>
-            </a:schemeClr>
-          </a:lnRef>
-          <a:fillRef idx="1">
-            <a:schemeClr val="accent1"/>
-          </a:fillRef>
-          <a:effectRef idx="0">
-            <a:schemeClr val="accent1"/>
-          </a:effectRef>
-          <a:fontRef idx="minor">
-            <a:schemeClr val="lt1"/>
-          </a:fontRef>
-        </p:style>
-        <p:txBody>
-          <a:bodyPr rtlCol="0" anchor="t"/>
-          <a:lstStyle/>
-          <a:p>
-            <a:pPr>
-              <a:buFont typeface="Arial" pitchFamily="34" charset="0"/>
-              <a:buChar char="•"/>
-            </a:pPr>
-            <a:r>
-              <a:rPr lang="en-GB" sz="2800" dirty="0">
-                <a:solidFill>
-                  <a:schemeClr val="tx1"/>
-                </a:solidFill>
-              </a:rPr>
-              <a:t> </a:t>
-            </a:r>
-            <a:r>
-              <a:rPr lang="en-GB" sz="2800" dirty="0" smtClean="0">
-                <a:solidFill>
-                  <a:schemeClr val="tx1"/>
-                </a:solidFill>
-              </a:rPr>
-              <a:t>Functions of the mean values of the image inside the contour and outside the contour (c</a:t>
-            </a:r>
-            <a:r>
-              <a:rPr lang="en-GB" sz="2800" baseline="-25000" dirty="0" smtClean="0">
-                <a:solidFill>
-                  <a:schemeClr val="tx1"/>
-                </a:solidFill>
-              </a:rPr>
-              <a:t>1 </a:t>
-            </a:r>
-            <a:r>
-              <a:rPr lang="en-GB" sz="2800" dirty="0" smtClean="0">
-                <a:solidFill>
-                  <a:schemeClr val="tx1"/>
-                </a:solidFill>
-              </a:rPr>
-              <a:t>and c</a:t>
-            </a:r>
-            <a:r>
-              <a:rPr lang="en-GB" sz="2800" baseline="-25000" dirty="0" smtClean="0">
-                <a:solidFill>
-                  <a:schemeClr val="tx1"/>
-                </a:solidFill>
-              </a:rPr>
-              <a:t>2</a:t>
-            </a:r>
-            <a:r>
-              <a:rPr lang="en-GB" sz="2800" dirty="0" smtClean="0">
-                <a:solidFill>
-                  <a:schemeClr val="tx1"/>
-                </a:solidFill>
-              </a:rPr>
-              <a:t>)</a:t>
-            </a:r>
-          </a:p>
-          <a:p>
-            <a:pPr>
-              <a:buFont typeface="Arial" pitchFamily="34" charset="0"/>
-              <a:buChar char="•"/>
-            </a:pPr>
-            <a:r>
-              <a:rPr lang="en-GB" sz="2800" b="1" dirty="0" smtClean="0">
-                <a:solidFill>
-                  <a:schemeClr val="tx1"/>
-                </a:solidFill>
-              </a:rPr>
-              <a:t> </a:t>
-            </a:r>
-            <a:r>
-              <a:rPr lang="el-GR" sz="2800" b="1" dirty="0" smtClean="0">
-                <a:solidFill>
-                  <a:schemeClr val="tx1"/>
-                </a:solidFill>
-              </a:rPr>
-              <a:t>λ</a:t>
-            </a:r>
-            <a:r>
-              <a:rPr lang="en-GB" sz="2800" b="1" baseline="-25000" dirty="0" smtClean="0">
-                <a:solidFill>
-                  <a:schemeClr val="tx1"/>
-                </a:solidFill>
-              </a:rPr>
-              <a:t>1</a:t>
-            </a:r>
-            <a:r>
-              <a:rPr lang="en-GB" sz="2800" b="1" dirty="0" smtClean="0">
-                <a:solidFill>
-                  <a:schemeClr val="tx1"/>
-                </a:solidFill>
-              </a:rPr>
-              <a:t> = </a:t>
-            </a:r>
-            <a:r>
-              <a:rPr lang="el-GR" sz="2800" b="1" dirty="0" smtClean="0">
-                <a:solidFill>
-                  <a:schemeClr val="tx1"/>
-                </a:solidFill>
-              </a:rPr>
-              <a:t>λ</a:t>
-            </a:r>
-            <a:r>
-              <a:rPr lang="en-GB" sz="2800" b="1" baseline="-25000" dirty="0">
-                <a:solidFill>
-                  <a:schemeClr val="tx1"/>
-                </a:solidFill>
-              </a:rPr>
-              <a:t>2</a:t>
-            </a:r>
-            <a:r>
-              <a:rPr lang="en-GB" sz="2800" b="1" dirty="0" smtClean="0">
-                <a:solidFill>
-                  <a:schemeClr val="tx1"/>
-                </a:solidFill>
-              </a:rPr>
-              <a:t> </a:t>
-            </a:r>
-            <a:r>
-              <a:rPr lang="en-GB" sz="2800" dirty="0" smtClean="0">
-                <a:solidFill>
-                  <a:schemeClr val="tx1"/>
-                </a:solidFill>
-              </a:rPr>
-              <a:t>= 1 in our implementation</a:t>
-            </a:r>
-            <a:endParaRPr lang="en-GB" sz="2800" b="1" dirty="0">
-              <a:solidFill>
-                <a:schemeClr val="tx1"/>
-              </a:solidFill>
-            </a:endParaRPr>
-          </a:p>
-        </p:txBody>
-      </p:sp>
-      <p:sp>
-        <p:nvSpPr>
-          <p:cNvPr id="9" name="Rectangle 8"/>
-          <p:cNvSpPr/>
-          <p:nvPr/>
-        </p:nvSpPr>
-        <p:spPr>
-          <a:xfrm>
-            <a:off x="5868144" y="2492896"/>
-            <a:ext cx="2592288" cy="792088"/>
-          </a:xfrm>
-          <a:prstGeom prst="rect">
-            <a:avLst/>
-          </a:prstGeom>
-          <a:noFill/>
-          <a:ln w="76200">
-            <a:solidFill>
-              <a:srgbClr val="FF0000"/>
-            </a:solidFill>
-          </a:ln>
-        </p:spPr>
-        <p:style>
-          <a:lnRef idx="2">
-            <a:schemeClr val="accent1">
-              <a:shade val="50000"/>
-            </a:schemeClr>
-          </a:lnRef>
-          <a:fillRef idx="1">
-            <a:schemeClr val="accent1"/>
-          </a:fillRef>
-          <a:effectRef idx="0">
-            <a:schemeClr val="accent1"/>
-          </a:effectRef>
-          <a:fontRef idx="minor">
-            <a:schemeClr val="lt1"/>
-          </a:fontRef>
-        </p:style>
-        <p:txBody>
-          <a:bodyPr rtlCol="0" anchor="ctr"/>
-          <a:lstStyle/>
-          <a:p>
-            <a:pPr algn="ctr"/>
-            <a:endParaRPr lang="en-GB"/>
-          </a:p>
-        </p:txBody>
-      </p:sp>
-      <p:sp>
-        <p:nvSpPr>
-          <p:cNvPr id="10" name="Rectangle 9"/>
-          <p:cNvSpPr/>
-          <p:nvPr/>
-        </p:nvSpPr>
-        <p:spPr>
-          <a:xfrm>
-            <a:off x="2843808" y="3573016"/>
-            <a:ext cx="2592288" cy="792088"/>
-          </a:xfrm>
-          <a:prstGeom prst="rect">
-            <a:avLst/>
-          </a:prstGeom>
-          <a:noFill/>
-          <a:ln w="76200">
-            <a:solidFill>
-              <a:srgbClr val="FF0000"/>
-            </a:solidFill>
-          </a:ln>
-        </p:spPr>
-        <p:style>
-          <a:lnRef idx="2">
-            <a:schemeClr val="accent1">
-              <a:shade val="50000"/>
-            </a:schemeClr>
-          </a:lnRef>
-          <a:fillRef idx="1">
-            <a:schemeClr val="accent1"/>
-          </a:fillRef>
-          <a:effectRef idx="0">
-            <a:schemeClr val="accent1"/>
-          </a:effectRef>
-          <a:fontRef idx="minor">
-            <a:schemeClr val="lt1"/>
-          </a:fontRef>
-        </p:style>
-        <p:txBody>
-          <a:bodyPr rtlCol="0" anchor="ctr"/>
-          <a:lstStyle/>
-          <a:p>
-            <a:pPr algn="ctr"/>
             <a:endParaRPr lang="en-GB"/>
           </a:p>
         </p:txBody>
@@ -3556,20 +3683,114 @@
       </p:sp>
       <p:sp>
         <p:nvSpPr>
-          <p:cNvPr id="3" name="Subtitle 2"/>
-          <p:cNvSpPr>
-            <a:spLocks noGrp="1"/>
-          </p:cNvSpPr>
-          <p:nvPr>
-            <p:ph type="subTitle" idx="1"/>
-          </p:nvPr>
-        </p:nvSpPr>
-        <p:spPr/>
-        <p:txBody>
-          <a:bodyPr/>
-          <a:lstStyle/>
-          <a:p>
-            <a:endParaRPr lang="en-GB"/>
+          <p:cNvPr id="6" name="Content Placeholder 2"/>
+          <p:cNvSpPr txBox="1">
+            <a:spLocks/>
+          </p:cNvSpPr>
+          <p:nvPr/>
+        </p:nvSpPr>
+        <p:spPr>
+          <a:xfrm>
+            <a:off x="457200" y="3789040"/>
+            <a:ext cx="8229600" cy="2337123"/>
+          </a:xfrm>
+          <a:prstGeom prst="rect">
+            <a:avLst/>
+          </a:prstGeom>
+        </p:spPr>
+        <p:txBody>
+          <a:bodyPr vert="horz" lIns="91440" tIns="45720" rIns="91440" bIns="45720" rtlCol="0">
+            <a:normAutofit/>
+          </a:bodyPr>
+          <a:lstStyle/>
+          <a:p>
+            <a:pPr marL="0" marR="0" lvl="0" indent="0" algn="ctr" defTabSz="914400" rtl="0" eaLnBrk="1" fontAlgn="auto" latinLnBrk="0" hangingPunct="1">
+              <a:lnSpc>
+                <a:spcPct val="100000"/>
+              </a:lnSpc>
+              <a:spcBef>
+                <a:spcPct val="20000"/>
+              </a:spcBef>
+              <a:spcAft>
+                <a:spcPts val="0"/>
+              </a:spcAft>
+              <a:buClrTx/>
+              <a:buSzTx/>
+              <a:buFont typeface="Arial" pitchFamily="34" charset="0"/>
+              <a:buNone/>
+              <a:tabLst/>
+              <a:defRPr/>
+            </a:pPr>
+            <a:r>
+              <a:rPr kumimoji="0" lang="en-GB" sz="3200" b="1" i="0" u="none" strike="noStrike" kern="1200" cap="none" spc="0" normalizeH="0" baseline="0" noProof="0" dirty="0" smtClean="0">
+                <a:ln>
+                  <a:noFill/>
+                </a:ln>
+                <a:effectLst/>
+                <a:uLnTx/>
+                <a:uFillTx/>
+                <a:latin typeface="+mn-lt"/>
+                <a:ea typeface="+mn-ea"/>
+                <a:cs typeface="+mn-cs"/>
+              </a:rPr>
+              <a:t>NB: We cheated</a:t>
+            </a:r>
+            <a:r>
+              <a:rPr kumimoji="0" lang="en-GB" sz="3200" b="1" i="0" u="none" strike="noStrike" kern="1200" cap="none" spc="0" normalizeH="0" noProof="0" dirty="0" smtClean="0">
+                <a:ln>
+                  <a:noFill/>
+                </a:ln>
+                <a:effectLst/>
+                <a:uLnTx/>
+                <a:uFillTx/>
+                <a:latin typeface="+mn-lt"/>
+                <a:ea typeface="+mn-ea"/>
+                <a:cs typeface="+mn-cs"/>
+              </a:rPr>
+              <a:t> - </a:t>
+            </a:r>
+            <a:r>
+              <a:rPr kumimoji="0" lang="en-GB" sz="2800" b="0" i="0" u="none" strike="noStrike" kern="1200" cap="none" spc="0" normalizeH="0" baseline="0" noProof="0" dirty="0" smtClean="0">
+                <a:ln>
+                  <a:noFill/>
+                </a:ln>
+                <a:effectLst/>
+                <a:uLnTx/>
+                <a:uFillTx/>
+                <a:latin typeface="+mn-lt"/>
+                <a:ea typeface="+mn-ea"/>
+                <a:cs typeface="+mn-cs"/>
+              </a:rPr>
+              <a:t>Re-implemented existing </a:t>
+            </a:r>
+            <a:r>
+              <a:rPr kumimoji="0" lang="en-GB" sz="2800" b="0" i="0" u="none" strike="noStrike" kern="1200" cap="none" spc="0" normalizeH="0" baseline="0" noProof="0" dirty="0" err="1" smtClean="0">
+                <a:ln>
+                  <a:noFill/>
+                </a:ln>
+                <a:effectLst/>
+                <a:uLnTx/>
+                <a:uFillTx/>
+                <a:latin typeface="+mn-lt"/>
+                <a:ea typeface="+mn-ea"/>
+                <a:cs typeface="+mn-cs"/>
+              </a:rPr>
+              <a:t>Matlab</a:t>
+            </a:r>
+            <a:r>
+              <a:rPr kumimoji="0" lang="en-GB" sz="2800" b="0" i="0" u="none" strike="noStrike" kern="1200" cap="none" spc="0" normalizeH="0" baseline="0" noProof="0" dirty="0" smtClean="0">
+                <a:ln>
+                  <a:noFill/>
+                </a:ln>
+                <a:effectLst/>
+                <a:uLnTx/>
+                <a:uFillTx/>
+                <a:latin typeface="+mn-lt"/>
+                <a:ea typeface="+mn-ea"/>
+                <a:cs typeface="+mn-cs"/>
+              </a:rPr>
+              <a:t> code in Python</a:t>
+            </a:r>
           </a:p>
         </p:txBody>
       </p:sp>
@@ -4939,11 +5160,7 @@
           <a:p>
             <a:r>
               <a:rPr lang="en-GB" dirty="0" smtClean="0"/>
-              <a:t>Results </a:t>
-            </a:r>
-            <a:r>
-              <a:rPr lang="en-GB" dirty="0" smtClean="0"/>
-              <a:t>– Noise</a:t>
+              <a:t>Results – Noise</a:t>
             </a:r>
             <a:endParaRPr lang="en-GB" dirty="0"/>
           </a:p>
@@ -4981,22 +5198,14 @@
             </a:r>
             <a:r>
               <a:rPr lang="en-GB" dirty="0" smtClean="0"/>
-              <a:t> = </a:t>
-            </a:r>
+              <a:t> = 50000</a:t>
+            </a:r>
+          </a:p>
+          <a:p>
+            <a:pPr algn="ctr"/>
             <a:r>
               <a:rPr lang="en-GB" dirty="0" smtClean="0"/>
-              <a:t>50000</a:t>
-            </a:r>
-          </a:p>
-          <a:p>
-            <a:pPr algn="ctr"/>
-            <a:r>
-              <a:rPr lang="en-GB" dirty="0" smtClean="0"/>
-              <a:t>A</a:t>
-            </a:r>
-            <a:r>
-              <a:rPr lang="en-GB" dirty="0" smtClean="0"/>
-              <a:t>dditive Gaussian noise: mean = 0, std deviation = 20 (approx 0.1% of image mean)</a:t>
+              <a:t>Additive Gaussian noise: mean = 0, std deviation = 20 (approx 0.1% of image mean)</a:t>
             </a:r>
             <a:endParaRPr lang="en-GB" dirty="0"/>
           </a:p>
@@ -5228,44 +5437,73 @@
         </p:nvSpPr>
         <p:spPr/>
         <p:txBody>
+          <a:bodyPr>
+            <a:normAutofit fontScale="90000"/>
+          </a:bodyPr>
+          <a:lstStyle/>
+          <a:p>
+            <a:r>
+              <a:rPr lang="en-GB" dirty="0" smtClean="0"/>
+              <a:t>Why Active Contours Without Edges?</a:t>
+            </a:r>
+            <a:endParaRPr lang="en-GB" dirty="0"/>
+          </a:p>
+        </p:txBody>
+      </p:sp>
+      <p:sp>
+        <p:nvSpPr>
+          <p:cNvPr id="3" name="Content Placeholder 2"/>
+          <p:cNvSpPr>
+            <a:spLocks noGrp="1"/>
+          </p:cNvSpPr>
+          <p:nvPr>
+            <p:ph idx="1"/>
+          </p:nvPr>
+        </p:nvSpPr>
+        <p:spPr/>
+        <p:txBody>
           <a:bodyPr/>
           <a:lstStyle/>
           <a:p>
             <a:r>
               <a:rPr lang="en-GB" dirty="0" smtClean="0"/>
-              <a:t>Extensions</a:t>
-            </a:r>
-            <a:endParaRPr lang="en-GB" dirty="0"/>
-          </a:p>
-        </p:txBody>
-      </p:sp>
-      <p:sp>
-        <p:nvSpPr>
-          <p:cNvPr id="3" name="Content Placeholder 2"/>
-          <p:cNvSpPr>
-            <a:spLocks noGrp="1"/>
-          </p:cNvSpPr>
-          <p:nvPr>
-            <p:ph idx="1"/>
-          </p:nvPr>
-        </p:nvSpPr>
-        <p:spPr/>
-        <p:txBody>
-          <a:bodyPr/>
-          <a:lstStyle/>
-          <a:p>
+              <a:t>Advantages:</a:t>
+            </a:r>
+          </a:p>
+          <a:p>
+            <a:pPr lvl="1"/>
             <a:r>
               <a:rPr lang="en-GB" dirty="0" smtClean="0"/>
-              <a:t>Solve time dependant PDE</a:t>
+              <a:t>Responds well to noise (no noise reduction required)</a:t>
             </a:r>
           </a:p>
           <a:p>
             <a:pPr lvl="1"/>
             <a:r>
               <a:rPr lang="en-GB" dirty="0" smtClean="0"/>
-              <a:t>They do say use of time dependant PDE is not crucial</a:t>
-            </a:r>
-            <a:endParaRPr lang="en-GB" dirty="0"/>
+              <a:t>Extracts groupings of objects well</a:t>
+            </a:r>
+          </a:p>
+          <a:p>
+            <a:pPr lvl="1"/>
+            <a:r>
+              <a:rPr lang="en-GB" dirty="0" smtClean="0"/>
+              <a:t>Objects need not be defined by edges</a:t>
+            </a:r>
+          </a:p>
+          <a:p>
+            <a:pPr lvl="1"/>
+            <a:r>
+              <a:rPr lang="en-GB" dirty="0" smtClean="0"/>
+              <a:t>Exact placement of initial contour not critical</a:t>
+            </a:r>
+          </a:p>
+          <a:p>
+            <a:pPr lvl="1"/>
+            <a:r>
+              <a:rPr lang="en-GB" dirty="0" smtClean="0"/>
+              <a:t>Extracts multiple separate objects with one contour</a:t>
+            </a:r>
           </a:p>
         </p:txBody>
       </p:sp>
@@ -5274,13 +5512,6 @@
   <p:clrMapOvr>
     <a:masterClrMapping/>
   </p:clrMapOvr>
-  <p:timing>
-    <p:tnLst>
-      <p:par>
-        <p:cTn id="1" dur="indefinite" restart="never" nodeType="tmRoot"/>
-      </p:par>
-    </p:tnLst>
-  </p:timing>
 </p:sld>
 </file>
 
@@ -5313,37 +5544,59 @@
         </p:nvSpPr>
         <p:spPr/>
         <p:txBody>
+          <a:bodyPr>
+            <a:normAutofit fontScale="90000"/>
+          </a:bodyPr>
+          <a:lstStyle/>
+          <a:p>
+            <a:r>
+              <a:rPr lang="en-GB" dirty="0" smtClean="0"/>
+              <a:t>Why Active Contours Without Edges?</a:t>
+            </a:r>
+            <a:endParaRPr lang="en-GB" dirty="0"/>
+          </a:p>
+        </p:txBody>
+      </p:sp>
+      <p:sp>
+        <p:nvSpPr>
+          <p:cNvPr id="3" name="Content Placeholder 2"/>
+          <p:cNvSpPr>
+            <a:spLocks noGrp="1"/>
+          </p:cNvSpPr>
+          <p:nvPr>
+            <p:ph idx="1"/>
+          </p:nvPr>
+        </p:nvSpPr>
+        <p:spPr/>
+        <p:txBody>
           <a:bodyPr/>
           <a:lstStyle/>
           <a:p>
             <a:r>
               <a:rPr lang="en-GB" dirty="0" smtClean="0"/>
-              <a:t>References</a:t>
-            </a:r>
-            <a:endParaRPr lang="en-GB" dirty="0"/>
-          </a:p>
-        </p:txBody>
-      </p:sp>
-      <p:sp>
-        <p:nvSpPr>
-          <p:cNvPr id="3" name="Content Placeholder 2"/>
-          <p:cNvSpPr>
-            <a:spLocks noGrp="1"/>
-          </p:cNvSpPr>
-          <p:nvPr>
-            <p:ph idx="1"/>
-          </p:nvPr>
-        </p:nvSpPr>
-        <p:spPr/>
-        <p:txBody>
-          <a:bodyPr/>
-          <a:lstStyle/>
-          <a:p>
+              <a:t>Disadvantages:</a:t>
+            </a:r>
+          </a:p>
+          <a:p>
+            <a:pPr lvl="1"/>
             <a:r>
               <a:rPr lang="en-GB" dirty="0" smtClean="0"/>
-              <a:t>[1] - </a:t>
-            </a:r>
-            <a:endParaRPr lang="en-GB" dirty="0"/>
+              <a:t>Computation time</a:t>
+            </a:r>
+          </a:p>
+          <a:p>
+            <a:pPr lvl="1"/>
+            <a:r>
+              <a:rPr lang="en-GB" dirty="0" smtClean="0"/>
+              <a:t>Extracts multiple separate objects with one contour</a:t>
+            </a:r>
+          </a:p>
+          <a:p>
+            <a:pPr lvl="1"/>
+            <a:r>
+              <a:rPr lang="en-GB" dirty="0" smtClean="0"/>
+              <a:t>Good parameters for different situations vary significantly</a:t>
+            </a:r>
           </a:p>
         </p:txBody>
       </p:sp>
@@ -5352,13 +5605,6 @@
   <p:clrMapOvr>
     <a:masterClrMapping/>
   </p:clrMapOvr>
-  <p:timing>
-    <p:tnLst>
-      <p:par>
-        <p:cTn id="1" dur="indefinite" restart="never" nodeType="tmRoot"/>
-      </p:par>
-    </p:tnLst>
-  </p:timing>
 </p:sld>
 </file>
 
@@ -5396,7 +5642,7 @@
           <a:p>
             <a:r>
               <a:rPr lang="en-GB" dirty="0" smtClean="0"/>
-              <a:t>Implementation</a:t>
+              <a:t>Algorithm</a:t>
             </a:r>
             <a:endParaRPr lang="en-GB" dirty="0"/>
           </a:p>
@@ -5418,107 +5664,12 @@
           <a:lstStyle/>
           <a:p>
             <a:r>
-              <a:rPr lang="en-GB" b="1" dirty="0" smtClean="0"/>
-              <a:t>We cheated</a:t>
-            </a:r>
-          </a:p>
-          <a:p>
-            <a:pPr lvl="1"/>
-            <a:r>
               <a:rPr lang="en-GB" dirty="0" smtClean="0"/>
-              <a:t>Re-implemented existing </a:t>
-            </a:r>
-            <a:r>
-              <a:rPr lang="en-GB" dirty="0" err="1" smtClean="0"/>
-              <a:t>Matlab</a:t>
+              <a:t>Want </a:t>
             </a:r>
             <a:r>
               <a:rPr lang="en-GB" dirty="0" smtClean="0"/>
-              <a:t> code in Python</a:t>
-            </a:r>
-          </a:p>
-        </p:txBody>
-      </p:sp>
-    </p:spTree>
-  </p:cSld>
-  <p:clrMapOvr>
-    <a:masterClrMapping/>
-  </p:clrMapOvr>
-  <p:timing>
-    <p:tnLst>
-      <p:par>
-        <p:cTn id="1" dur="indefinite" restart="never" nodeType="tmRoot"/>
-      </p:par>
-    </p:tnLst>
-  </p:timing>
-</p:sld>
-</file>
-
-<file path=ppt/slides/slide3.xml><?xml version="1.0" encoding="utf-8"?>
-<p:sld xmlns:a="http://schemas.openxmlformats.org/drawingml/2006/main" xmlns:r="http://schemas.openxmlformats.org/officeDocument/2006/relationships" xmlns:p="http://schemas.openxmlformats.org/presentationml/2006/main">
-  <p:cSld>
-    <p:spTree>
-      <p:nvGrpSpPr>
-        <p:cNvPr id="1" name=""/>
-        <p:cNvGrpSpPr/>
-        <p:nvPr/>
-      </p:nvGrpSpPr>
-      <p:grpSpPr>
-        <a:xfrm>
-          <a:off x="0" y="0"/>
-          <a:ext cx="0" cy="0"/>
-          <a:chOff x="0" y="0"/>
-          <a:chExt cx="0" cy="0"/>
-        </a:xfrm>
-      </p:grpSpPr>
-      <p:sp>
-        <p:nvSpPr>
-          <p:cNvPr id="2" name="Title 1"/>
-          <p:cNvSpPr>
-            <a:spLocks noGrp="1"/>
-          </p:cNvSpPr>
-          <p:nvPr>
-            <p:ph type="title"/>
-          </p:nvPr>
-        </p:nvSpPr>
-        <p:spPr/>
-        <p:txBody>
-          <a:bodyPr/>
-          <a:lstStyle/>
-          <a:p>
-            <a:r>
-              <a:rPr lang="en-GB" dirty="0" smtClean="0"/>
-              <a:t>Implementation</a:t>
-            </a:r>
-            <a:endParaRPr lang="en-GB" dirty="0"/>
-          </a:p>
-        </p:txBody>
-      </p:sp>
-      <p:sp>
-        <p:nvSpPr>
-          <p:cNvPr id="3" name="Content Placeholder 2"/>
-          <p:cNvSpPr>
-            <a:spLocks noGrp="1"/>
-          </p:cNvSpPr>
-          <p:nvPr>
-            <p:ph idx="1"/>
-          </p:nvPr>
-        </p:nvSpPr>
-        <p:spPr/>
-        <p:txBody>
-          <a:bodyPr/>
-          <a:lstStyle/>
-          <a:p>
-            <a:r>
-              <a:rPr lang="en-GB" dirty="0" smtClean="0"/>
-              <a:t>Algorithm:</a:t>
-            </a:r>
-          </a:p>
-          <a:p>
-            <a:pPr lvl="1"/>
-            <a:r>
-              <a:rPr lang="en-GB" dirty="0" smtClean="0"/>
-              <a:t>Want to minimize energy</a:t>
+              <a:t>to minimize energy</a:t>
             </a:r>
           </a:p>
           <a:p>
@@ -5539,7 +5690,7 @@
         </p:nvGrpSpPr>
         <p:grpSpPr>
           <a:xfrm>
-            <a:off x="4355976" y="2795827"/>
+            <a:off x="4644008" y="2984467"/>
             <a:ext cx="4320480" cy="3873533"/>
             <a:chOff x="4067944" y="2276872"/>
             <a:chExt cx="4176464" cy="3744416"/>
@@ -6106,6 +6257,310 @@
           </p:txBody>
         </p:sp>
       </p:grpSp>
+      <p:pic>
+        <p:nvPicPr>
+          <p:cNvPr id="17410" name="Picture 2" descr="The gradient descent algorithm in action. (1: contour)"/>
+          <p:cNvPicPr>
+            <a:picLocks noChangeAspect="1" noChangeArrowheads="1"/>
+          </p:cNvPicPr>
+          <p:nvPr/>
+        </p:nvPicPr>
+        <p:blipFill>
+          <a:blip r:embed="rId2" cstate="print"/>
+          <a:srcRect b="32259"/>
+          <a:stretch>
+            <a:fillRect/>
+          </a:stretch>
+        </p:blipFill>
+        <p:spPr bwMode="auto">
+          <a:xfrm>
+            <a:off x="395536" y="3429000"/>
+            <a:ext cx="3955660" cy="2664296"/>
+          </a:xfrm>
+          <a:prstGeom prst="rect">
+            <a:avLst/>
+          </a:prstGeom>
+          <a:noFill/>
+        </p:spPr>
+      </p:pic>
+    </p:spTree>
+  </p:cSld>
+  <p:clrMapOvr>
+    <a:masterClrMapping/>
+  </p:clrMapOvr>
+  <p:timing>
+    <p:tnLst>
+      <p:par>
+        <p:cTn id="1" dur="indefinite" restart="never" nodeType="tmRoot"/>
+      </p:par>
+    </p:tnLst>
+  </p:timing>
+</p:sld>
+</file>
+
+<file path=ppt/slides/slide20.xml><?xml version="1.0" encoding="utf-8"?>
+<p:sld xmlns:a="http://schemas.openxmlformats.org/drawingml/2006/main" xmlns:r="http://schemas.openxmlformats.org/officeDocument/2006/relationships" xmlns:p="http://schemas.openxmlformats.org/presentationml/2006/main">
+  <p:cSld>
+    <p:spTree>
+      <p:nvGrpSpPr>
+        <p:cNvPr id="1" name=""/>
+        <p:cNvGrpSpPr/>
+        <p:nvPr/>
+      </p:nvGrpSpPr>
+      <p:grpSpPr>
+        <a:xfrm>
+          <a:off x="0" y="0"/>
+          <a:ext cx="0" cy="0"/>
+          <a:chOff x="0" y="0"/>
+          <a:chExt cx="0" cy="0"/>
+        </a:xfrm>
+      </p:grpSpPr>
+      <p:sp>
+        <p:nvSpPr>
+          <p:cNvPr id="2" name="Title 1"/>
+          <p:cNvSpPr>
+            <a:spLocks noGrp="1"/>
+          </p:cNvSpPr>
+          <p:nvPr>
+            <p:ph type="title"/>
+          </p:nvPr>
+        </p:nvSpPr>
+        <p:spPr/>
+        <p:txBody>
+          <a:bodyPr/>
+          <a:lstStyle/>
+          <a:p>
+            <a:r>
+              <a:rPr lang="en-GB" dirty="0" smtClean="0"/>
+              <a:t>Extensions</a:t>
+            </a:r>
+            <a:endParaRPr lang="en-GB" dirty="0"/>
+          </a:p>
+        </p:txBody>
+      </p:sp>
+      <p:sp>
+        <p:nvSpPr>
+          <p:cNvPr id="3" name="Content Placeholder 2"/>
+          <p:cNvSpPr>
+            <a:spLocks noGrp="1"/>
+          </p:cNvSpPr>
+          <p:nvPr>
+            <p:ph idx="1"/>
+          </p:nvPr>
+        </p:nvSpPr>
+        <p:spPr/>
+        <p:txBody>
+          <a:bodyPr/>
+          <a:lstStyle/>
+          <a:p>
+            <a:r>
+              <a:rPr lang="en-GB" dirty="0" smtClean="0"/>
+              <a:t>Solve time dependant PDE</a:t>
+            </a:r>
+          </a:p>
+          <a:p>
+            <a:pPr lvl="1"/>
+            <a:r>
+              <a:rPr lang="en-GB" dirty="0" smtClean="0"/>
+              <a:t>They do say use of time dependant PDE is not crucial</a:t>
+            </a:r>
+            <a:endParaRPr lang="en-GB" dirty="0"/>
+          </a:p>
+        </p:txBody>
+      </p:sp>
+    </p:spTree>
+  </p:cSld>
+  <p:clrMapOvr>
+    <a:masterClrMapping/>
+  </p:clrMapOvr>
+  <p:timing>
+    <p:tnLst>
+      <p:par>
+        <p:cTn id="1" dur="indefinite" restart="never" nodeType="tmRoot"/>
+      </p:par>
+    </p:tnLst>
+  </p:timing>
+</p:sld>
+</file>
+
+<file path=ppt/slides/slide21.xml><?xml version="1.0" encoding="utf-8"?>
+<p:sld xmlns:a="http://schemas.openxmlformats.org/drawingml/2006/main" xmlns:r="http://schemas.openxmlformats.org/officeDocument/2006/relationships" xmlns:p="http://schemas.openxmlformats.org/presentationml/2006/main">
+  <p:cSld>
+    <p:spTree>
+      <p:nvGrpSpPr>
+        <p:cNvPr id="1" name=""/>
+        <p:cNvGrpSpPr/>
+        <p:nvPr/>
+      </p:nvGrpSpPr>
+      <p:grpSpPr>
+        <a:xfrm>
+          <a:off x="0" y="0"/>
+          <a:ext cx="0" cy="0"/>
+          <a:chOff x="0" y="0"/>
+          <a:chExt cx="0" cy="0"/>
+        </a:xfrm>
+      </p:grpSpPr>
+      <p:sp>
+        <p:nvSpPr>
+          <p:cNvPr id="2" name="Title 1"/>
+          <p:cNvSpPr>
+            <a:spLocks noGrp="1"/>
+          </p:cNvSpPr>
+          <p:nvPr>
+            <p:ph type="title"/>
+          </p:nvPr>
+        </p:nvSpPr>
+        <p:spPr/>
+        <p:txBody>
+          <a:bodyPr/>
+          <a:lstStyle/>
+          <a:p>
+            <a:r>
+              <a:rPr lang="en-GB" dirty="0" smtClean="0"/>
+              <a:t>References</a:t>
+            </a:r>
+            <a:endParaRPr lang="en-GB" dirty="0"/>
+          </a:p>
+        </p:txBody>
+      </p:sp>
+      <p:sp>
+        <p:nvSpPr>
+          <p:cNvPr id="3" name="Content Placeholder 2"/>
+          <p:cNvSpPr>
+            <a:spLocks noGrp="1"/>
+          </p:cNvSpPr>
+          <p:nvPr>
+            <p:ph idx="1"/>
+          </p:nvPr>
+        </p:nvSpPr>
+        <p:spPr/>
+        <p:txBody>
+          <a:bodyPr/>
+          <a:lstStyle/>
+          <a:p>
+            <a:r>
+              <a:rPr lang="en-GB" dirty="0" smtClean="0"/>
+              <a:t>[1] - </a:t>
+            </a:r>
+            <a:endParaRPr lang="en-GB" dirty="0"/>
+          </a:p>
+        </p:txBody>
+      </p:sp>
+    </p:spTree>
+  </p:cSld>
+  <p:clrMapOvr>
+    <a:masterClrMapping/>
+  </p:clrMapOvr>
+  <p:timing>
+    <p:tnLst>
+      <p:par>
+        <p:cTn id="1" dur="indefinite" restart="never" nodeType="tmRoot"/>
+      </p:par>
+    </p:tnLst>
+  </p:timing>
+</p:sld>
+</file>
+
+<file path=ppt/slides/slide3.xml><?xml version="1.0" encoding="utf-8"?>
+<p:sld xmlns:a="http://schemas.openxmlformats.org/drawingml/2006/main" xmlns:r="http://schemas.openxmlformats.org/officeDocument/2006/relationships" xmlns:p="http://schemas.openxmlformats.org/presentationml/2006/main">
+  <p:cSld>
+    <p:spTree>
+      <p:nvGrpSpPr>
+        <p:cNvPr id="1" name=""/>
+        <p:cNvGrpSpPr/>
+        <p:nvPr/>
+      </p:nvGrpSpPr>
+      <p:grpSpPr>
+        <a:xfrm>
+          <a:off x="0" y="0"/>
+          <a:ext cx="0" cy="0"/>
+          <a:chOff x="0" y="0"/>
+          <a:chExt cx="0" cy="0"/>
+        </a:xfrm>
+      </p:grpSpPr>
+      <p:sp>
+        <p:nvSpPr>
+          <p:cNvPr id="2" name="Title 1"/>
+          <p:cNvSpPr>
+            <a:spLocks noGrp="1"/>
+          </p:cNvSpPr>
+          <p:nvPr>
+            <p:ph type="title"/>
+          </p:nvPr>
+        </p:nvSpPr>
+        <p:spPr/>
+        <p:txBody>
+          <a:bodyPr/>
+          <a:lstStyle/>
+          <a:p>
+            <a:r>
+              <a:rPr lang="en-GB" dirty="0" smtClean="0"/>
+              <a:t>Algorithm</a:t>
+            </a:r>
+            <a:endParaRPr lang="en-GB" dirty="0"/>
+          </a:p>
+        </p:txBody>
+      </p:sp>
+      <p:pic>
+        <p:nvPicPr>
+          <p:cNvPr id="1027" name="Picture 3"/>
+          <p:cNvPicPr>
+            <a:picLocks noChangeAspect="1" noChangeArrowheads="1"/>
+          </p:cNvPicPr>
+          <p:nvPr/>
+        </p:nvPicPr>
+        <p:blipFill>
+          <a:blip r:embed="rId2" cstate="print"/>
+          <a:srcRect b="44643"/>
+          <a:stretch>
+            <a:fillRect/>
+          </a:stretch>
+        </p:blipFill>
+        <p:spPr bwMode="auto">
+          <a:xfrm>
+            <a:off x="323528" y="2276872"/>
+            <a:ext cx="8599457" cy="2232248"/>
+          </a:xfrm>
+          <a:prstGeom prst="rect">
+            <a:avLst/>
+          </a:prstGeom>
+          <a:noFill/>
+          <a:ln w="9525">
+            <a:noFill/>
+            <a:miter lim="800000"/>
+            <a:headEnd/>
+            <a:tailEnd/>
+          </a:ln>
+        </p:spPr>
+      </p:pic>
+      <p:sp>
+        <p:nvSpPr>
+          <p:cNvPr id="26" name="Content Placeholder 2"/>
+          <p:cNvSpPr>
+            <a:spLocks noGrp="1"/>
+          </p:cNvSpPr>
+          <p:nvPr>
+            <p:ph idx="1"/>
+          </p:nvPr>
+        </p:nvSpPr>
+        <p:spPr>
+          <a:xfrm>
+            <a:off x="467544" y="1628800"/>
+            <a:ext cx="8229600" cy="4525963"/>
+          </a:xfrm>
+        </p:spPr>
+        <p:txBody>
+          <a:bodyPr/>
+          <a:lstStyle/>
+          <a:p>
+            <a:r>
+              <a:rPr lang="en-GB" dirty="0" smtClean="0"/>
+              <a:t>Gradient given by:</a:t>
+            </a:r>
+            <a:endParaRPr lang="en-GB" dirty="0"/>
+          </a:p>
+        </p:txBody>
+      </p:sp>
     </p:spTree>
   </p:cSld>
   <p:clrMapOvr>
@@ -6155,7 +6610,35 @@
           <a:p>
             <a:r>
               <a:rPr lang="en-GB" dirty="0" smtClean="0"/>
-              <a:t>Implementation</a:t>
+              <a:t>Algorithm</a:t>
+            </a:r>
+            <a:endParaRPr lang="en-GB" dirty="0"/>
+          </a:p>
+        </p:txBody>
+      </p:sp>
+      <p:sp>
+        <p:nvSpPr>
+          <p:cNvPr id="3" name="Content Placeholder 2"/>
+          <p:cNvSpPr>
+            <a:spLocks noGrp="1"/>
+          </p:cNvSpPr>
+          <p:nvPr>
+            <p:ph idx="1"/>
+          </p:nvPr>
+        </p:nvSpPr>
+        <p:spPr>
+          <a:xfrm>
+            <a:off x="467544" y="1628800"/>
+            <a:ext cx="8229600" cy="4525963"/>
+          </a:xfrm>
+        </p:spPr>
+        <p:txBody>
+          <a:bodyPr/>
+          <a:lstStyle/>
+          <a:p>
+            <a:r>
+              <a:rPr lang="en-GB" dirty="0" smtClean="0"/>
+              <a:t>Gradient given by:</a:t>
             </a:r>
             <a:endParaRPr lang="en-GB" dirty="0"/>
           </a:p>
@@ -6171,7 +6654,7 @@
         </p:nvPicPr>
         <p:blipFill>
           <a:blip r:embed="rId2" cstate="print"/>
-          <a:srcRect b="44643"/>
+          <a:srcRect/>
           <a:stretch>
             <a:fillRect/>
           </a:stretch>
@@ -6179,7 +6662,7 @@
         <p:spPr bwMode="auto">
           <a:xfrm>
             <a:off x="323528" y="2276872"/>
-            <a:ext cx="8599457" cy="2232248"/>
+            <a:ext cx="8599457" cy="4032448"/>
           </a:xfrm>
           <a:prstGeom prst="rect">
             <a:avLst/>
@@ -6195,32 +6678,229 @@
       </p:pic>
       <p:sp>
         <p:nvSpPr>
-          <p:cNvPr id="26" name="Content Placeholder 2"/>
-          <p:cNvSpPr>
-            <a:spLocks noGrp="1"/>
-          </p:cNvSpPr>
-          <p:nvPr>
-            <p:ph idx="1"/>
-          </p:nvPr>
+          <p:cNvPr id="5" name="Rectangle 4"/>
+          <p:cNvSpPr/>
+          <p:nvPr/>
         </p:nvSpPr>
         <p:spPr>
           <a:xfrm>
-            <a:off x="467544" y="1628800"/>
-            <a:ext cx="8229600" cy="4525963"/>
-          </a:xfrm>
-        </p:spPr>
-        <p:txBody>
-          <a:bodyPr/>
-          <a:lstStyle/>
-          <a:p>
-            <a:r>
-              <a:rPr lang="en-GB" dirty="0" smtClean="0"/>
-              <a:t>Gradient given by:</a:t>
-            </a:r>
-            <a:endParaRPr lang="en-GB" dirty="0"/>
-          </a:p>
-        </p:txBody>
-      </p:sp>
+            <a:off x="1619672" y="2492896"/>
+            <a:ext cx="1008112" cy="864096"/>
+          </a:xfrm>
+          <a:prstGeom prst="rect">
+            <a:avLst/>
+          </a:prstGeom>
+          <a:noFill/>
+          <a:ln w="76200">
+            <a:solidFill>
+              <a:srgbClr val="FF0000"/>
+            </a:solidFill>
+          </a:ln>
+        </p:spPr>
+        <p:style>
+          <a:lnRef idx="2">
+            <a:schemeClr val="accent1">
+              <a:shade val="50000"/>
+            </a:schemeClr>
+          </a:lnRef>
+          <a:fillRef idx="1">
+            <a:schemeClr val="accent1"/>
+          </a:fillRef>
+          <a:effectRef idx="0">
+            <a:schemeClr val="accent1"/>
+          </a:effectRef>
+          <a:fontRef idx="minor">
+            <a:schemeClr val="lt1"/>
+          </a:fontRef>
+        </p:style>
+        <p:txBody>
+          <a:bodyPr rtlCol="0" anchor="ctr"/>
+          <a:lstStyle/>
+          <a:p>
+            <a:pPr algn="ctr"/>
+            <a:endParaRPr lang="en-GB"/>
+          </a:p>
+        </p:txBody>
+      </p:sp>
+      <p:sp>
+        <p:nvSpPr>
+          <p:cNvPr id="6" name="Rectangle 5"/>
+          <p:cNvSpPr/>
+          <p:nvPr/>
+        </p:nvSpPr>
+        <p:spPr>
+          <a:xfrm>
+            <a:off x="539552" y="3645024"/>
+            <a:ext cx="8136904" cy="2592288"/>
+          </a:xfrm>
+          <a:prstGeom prst="rect">
+            <a:avLst/>
+          </a:prstGeom>
+          <a:solidFill>
+            <a:schemeClr val="bg1"/>
+          </a:solidFill>
+          <a:ln>
+            <a:solidFill>
+              <a:schemeClr val="tx1"/>
+            </a:solidFill>
+          </a:ln>
+        </p:spPr>
+        <p:style>
+          <a:lnRef idx="2">
+            <a:schemeClr val="accent1">
+              <a:shade val="50000"/>
+            </a:schemeClr>
+          </a:lnRef>
+          <a:fillRef idx="1">
+            <a:schemeClr val="accent1"/>
+          </a:fillRef>
+          <a:effectRef idx="0">
+            <a:schemeClr val="accent1"/>
+          </a:effectRef>
+          <a:fontRef idx="minor">
+            <a:schemeClr val="lt1"/>
+          </a:fontRef>
+        </p:style>
+        <p:txBody>
+          <a:bodyPr rtlCol="0" anchor="t"/>
+          <a:lstStyle/>
+          <a:p>
+            <a:pPr>
+              <a:buFont typeface="Arial" pitchFamily="34" charset="0"/>
+              <a:buChar char="•"/>
+            </a:pPr>
+            <a:r>
+              <a:rPr lang="en-GB" sz="2800" dirty="0">
+                <a:solidFill>
+                  <a:schemeClr val="tx1"/>
+                </a:solidFill>
+              </a:rPr>
+              <a:t> </a:t>
+            </a:r>
+            <a:r>
+              <a:rPr lang="en-GB" sz="2800" dirty="0" smtClean="0">
+                <a:solidFill>
+                  <a:schemeClr val="tx1"/>
+                </a:solidFill>
+              </a:rPr>
+              <a:t>Regularized Dirac delta function:</a:t>
+            </a:r>
+          </a:p>
+          <a:p>
+            <a:pPr>
+              <a:buFontTx/>
+              <a:buChar char="-"/>
+            </a:pPr>
+            <a:endParaRPr lang="en-GB" sz="2800" dirty="0">
+              <a:solidFill>
+                <a:schemeClr val="tx1"/>
+              </a:solidFill>
+            </a:endParaRPr>
+          </a:p>
+          <a:p>
+            <a:pPr>
+              <a:buFontTx/>
+              <a:buChar char="-"/>
+            </a:pPr>
+            <a:endParaRPr lang="en-GB" sz="2800" dirty="0" smtClean="0">
+              <a:solidFill>
+                <a:schemeClr val="tx1"/>
+              </a:solidFill>
+            </a:endParaRPr>
+          </a:p>
+          <a:p>
+            <a:pPr>
+              <a:buFontTx/>
+              <a:buChar char="-"/>
+            </a:pPr>
+            <a:endParaRPr lang="en-GB" sz="2800" dirty="0" smtClean="0">
+              <a:solidFill>
+                <a:schemeClr val="tx1"/>
+              </a:solidFill>
+            </a:endParaRPr>
+          </a:p>
+          <a:p>
+            <a:pPr>
+              <a:buFont typeface="Arial" pitchFamily="34" charset="0"/>
+              <a:buChar char="•"/>
+            </a:pPr>
+            <a:r>
+              <a:rPr lang="en-GB" sz="2800" dirty="0">
+                <a:solidFill>
+                  <a:schemeClr val="tx1"/>
+                </a:solidFill>
+              </a:rPr>
+              <a:t> </a:t>
+            </a:r>
+            <a:r>
+              <a:rPr lang="el-GR" sz="2800" b="1" dirty="0" smtClean="0">
+                <a:solidFill>
+                  <a:schemeClr val="tx1"/>
+                </a:solidFill>
+              </a:rPr>
+              <a:t>ε</a:t>
+            </a:r>
+            <a:r>
+              <a:rPr lang="en-GB" sz="2800" dirty="0" smtClean="0">
+                <a:solidFill>
+                  <a:schemeClr val="tx1"/>
+                </a:solidFill>
+              </a:rPr>
+              <a:t> is set to 1.0 for our experiments</a:t>
+            </a:r>
+          </a:p>
+          <a:p>
+            <a:pPr>
+              <a:buFontTx/>
+              <a:buChar char="-"/>
+            </a:pPr>
+            <a:endParaRPr lang="en-GB" sz="2800" dirty="0" smtClean="0">
+              <a:solidFill>
+                <a:schemeClr val="tx1"/>
+              </a:solidFill>
+            </a:endParaRPr>
+          </a:p>
+          <a:p>
+            <a:endParaRPr lang="en-GB" sz="2800" dirty="0">
+              <a:solidFill>
+                <a:schemeClr val="tx1"/>
+              </a:solidFill>
+            </a:endParaRPr>
+          </a:p>
+        </p:txBody>
+      </p:sp>
+      <p:pic>
+        <p:nvPicPr>
+          <p:cNvPr id="7" name="Picture 3"/>
+          <p:cNvPicPr>
+            <a:picLocks noChangeAspect="1" noChangeArrowheads="1"/>
+          </p:cNvPicPr>
+          <p:nvPr/>
+        </p:nvPicPr>
+        <p:blipFill>
+          <a:blip r:embed="rId3" cstate="print"/>
+          <a:srcRect/>
+          <a:stretch>
+            <a:fillRect/>
+          </a:stretch>
+        </p:blipFill>
+        <p:spPr bwMode="auto">
+          <a:xfrm>
+            <a:off x="2771800" y="4071245"/>
+            <a:ext cx="3312368" cy="1301971"/>
+          </a:xfrm>
+          <a:prstGeom prst="rect">
+            <a:avLst/>
+          </a:prstGeom>
+          <a:noFill/>
+          <a:ln w="9525">
+            <a:noFill/>
+            <a:miter lim="800000"/>
+            <a:headEnd/>
+            <a:tailEnd/>
+          </a:ln>
+        </p:spPr>
+      </p:pic>
     </p:spTree>
   </p:cSld>
   <p:clrMapOvr>
@@ -6270,7 +6950,7 @@
           <a:p>
             <a:r>
               <a:rPr lang="en-GB" dirty="0" smtClean="0"/>
-              <a:t>Implementation</a:t>
+              <a:t>Algorithm</a:t>
             </a:r>
             <a:endParaRPr lang="en-GB" dirty="0"/>
           </a:p>
@@ -6344,8 +7024,8 @@
         </p:nvSpPr>
         <p:spPr>
           <a:xfrm>
-            <a:off x="1619672" y="2492896"/>
-            <a:ext cx="1008112" cy="864096"/>
+            <a:off x="2771800" y="2276872"/>
+            <a:ext cx="2448272" cy="1296144"/>
           </a:xfrm>
           <a:prstGeom prst="rect">
             <a:avLst/>
@@ -6430,7 +7110,7 @@
               <a:buChar char="•"/>
             </a:pPr>
             <a:r>
-              <a:rPr lang="en-GB" sz="2800" dirty="0">
+              <a:rPr lang="en-GB" sz="2800" dirty="0" smtClean="0">
                 <a:solidFill>
                   <a:schemeClr val="tx1"/>
                 </a:solidFill>
@@ -6438,129 +7118,39 @@
               <a:t> </a:t>
             </a:r>
             <a:r>
+              <a:rPr lang="en-GB" sz="2800" b="1" dirty="0" smtClean="0">
+                <a:solidFill>
+                  <a:schemeClr val="tx1"/>
+                </a:solidFill>
+              </a:rPr>
+              <a:t>Curvature</a:t>
+            </a:r>
+            <a:r>
               <a:rPr lang="en-GB" sz="2800" dirty="0" smtClean="0">
                 <a:solidFill>
                   <a:schemeClr val="tx1"/>
                 </a:solidFill>
               </a:rPr>
-              <a:t>Regularized Dirac delta function:</a:t>
-            </a:r>
-          </a:p>
-          <a:p>
-            <a:pPr>
-              <a:buFontTx/>
-              <a:buChar char="-"/>
-            </a:pPr>
-            <a:endParaRPr lang="en-GB" sz="2800" dirty="0">
+              <a:t> of level-set function</a:t>
+            </a:r>
+            <a:endParaRPr lang="en-GB" sz="2800" b="1" dirty="0" smtClean="0">
               <a:solidFill>
                 <a:schemeClr val="tx1"/>
               </a:solidFill>
             </a:endParaRPr>
           </a:p>
           <a:p>
-            <a:pPr>
-              <a:buFontTx/>
-              <a:buChar char="-"/>
-            </a:pPr>
-            <a:endParaRPr lang="en-GB" sz="2800" dirty="0" smtClean="0">
-              <a:solidFill>
-                <a:schemeClr val="tx1"/>
-              </a:solidFill>
-            </a:endParaRPr>
-          </a:p>
-          <a:p>
-            <a:pPr>
-              <a:buFontTx/>
-              <a:buChar char="-"/>
-            </a:pPr>
-            <a:endParaRPr lang="en-GB" sz="2800" dirty="0" smtClean="0">
-              <a:solidFill>
-                <a:schemeClr val="tx1"/>
-              </a:solidFill>
-            </a:endParaRPr>
-          </a:p>
-          <a:p>
-            <a:pPr>
-              <a:buFont typeface="Arial" pitchFamily="34" charset="0"/>
-              <a:buChar char="•"/>
-            </a:pPr>
-            <a:r>
-              <a:rPr lang="en-GB" sz="2800" dirty="0">
-                <a:solidFill>
-                  <a:schemeClr val="tx1"/>
-                </a:solidFill>
-              </a:rPr>
-              <a:t> </a:t>
-            </a:r>
-            <a:r>
-              <a:rPr lang="el-GR" sz="2800" b="1" dirty="0" smtClean="0">
-                <a:solidFill>
-                  <a:schemeClr val="tx1"/>
-                </a:solidFill>
-              </a:rPr>
-              <a:t>ε</a:t>
-            </a:r>
             <a:r>
               <a:rPr lang="en-GB" sz="2800" dirty="0" smtClean="0">
                 <a:solidFill>
                   <a:schemeClr val="tx1"/>
                 </a:solidFill>
               </a:rPr>
-              <a:t> is set to 1.0 for our experiments</a:t>
-            </a:r>
-          </a:p>
-          <a:p>
-            <a:pPr>
-              <a:buFontTx/>
-              <a:buChar char="-"/>
-            </a:pPr>
-            <a:endParaRPr lang="en-GB" sz="2800" dirty="0" smtClean="0">
-              <a:solidFill>
-                <a:schemeClr val="tx1"/>
-              </a:solidFill>
-            </a:endParaRPr>
-          </a:p>
-          <a:p>
-            <a:endParaRPr lang="en-GB" sz="2800" dirty="0">
-              <a:solidFill>
-                <a:schemeClr val="tx1"/>
-              </a:solidFill>
-            </a:endParaRPr>
-          </a:p>
-        </p:txBody>
-      </p:sp>
-      <p:pic>
-        <p:nvPicPr>
-          <p:cNvPr id="7" name="Picture 3"/>
-          <p:cNvPicPr>
-            <a:picLocks noChangeAspect="1" noChangeArrowheads="1"/>
-          </p:cNvPicPr>
-          <p:nvPr/>
-        </p:nvPicPr>
-        <p:blipFill>
-          <a:blip r:embed="rId3" cstate="print"/>
-          <a:srcRect/>
-          <a:stretch>
-            <a:fillRect/>
-          </a:stretch>
-        </p:blipFill>
-        <p:spPr bwMode="auto">
-          <a:xfrm>
-            <a:off x="2771800" y="4071245"/>
-            <a:ext cx="3312368" cy="1301971"/>
-          </a:xfrm>
-          <a:prstGeom prst="rect">
-            <a:avLst/>
-          </a:prstGeom>
-          <a:noFill/>
-          <a:ln w="9525">
-            <a:noFill/>
-            <a:miter lim="800000"/>
-            <a:headEnd/>
-            <a:tailEnd/>
-          </a:ln>
-        </p:spPr>
-      </p:pic>
+              <a:t>Biases contour towards surrounding larger objects rather than lots of small ones</a:t>
+            </a:r>
+          </a:p>
+        </p:txBody>
+      </p:sp>
     </p:spTree>
   </p:cSld>
   <p:clrMapOvr>
@@ -6610,7 +7200,7 @@
           <a:p>
             <a:r>
               <a:rPr lang="en-GB" dirty="0" smtClean="0"/>
-              <a:t>Implementation</a:t>
+              <a:t>Algorithm</a:t>
             </a:r>
             <a:endParaRPr lang="en-GB" dirty="0"/>
           </a:p>
@@ -6770,6 +7360,97 @@
               <a:buChar char="•"/>
             </a:pPr>
             <a:r>
+              <a:rPr lang="en-GB" sz="2800" dirty="0">
+                <a:solidFill>
+                  <a:schemeClr val="tx1"/>
+                </a:solidFill>
+              </a:rPr>
+              <a:t> </a:t>
+            </a:r>
+            <a:r>
+              <a:rPr lang="en-GB" sz="2800" dirty="0" smtClean="0">
+                <a:solidFill>
+                  <a:schemeClr val="tx1"/>
+                </a:solidFill>
+              </a:rPr>
+              <a:t>So </a:t>
+            </a:r>
+            <a:r>
+              <a:rPr lang="en-GB" sz="2800" b="1" dirty="0" smtClean="0">
+                <a:solidFill>
+                  <a:schemeClr val="tx1"/>
+                </a:solidFill>
+              </a:rPr>
+              <a:t>larger </a:t>
+            </a:r>
+            <a:r>
+              <a:rPr lang="el-GR" sz="2800" b="1" dirty="0" smtClean="0">
+                <a:solidFill>
+                  <a:schemeClr val="tx1"/>
+                </a:solidFill>
+              </a:rPr>
+              <a:t>μ</a:t>
+            </a:r>
+            <a:r>
+              <a:rPr lang="en-GB" sz="2800" dirty="0" smtClean="0">
+                <a:solidFill>
+                  <a:schemeClr val="tx1"/>
+                </a:solidFill>
+              </a:rPr>
+              <a:t> means larger objects (or </a:t>
+            </a:r>
+            <a:r>
+              <a:rPr lang="en-GB" sz="2800" b="1" dirty="0" smtClean="0">
+                <a:solidFill>
+                  <a:schemeClr val="tx1"/>
+                </a:solidFill>
+              </a:rPr>
+              <a:t>groupings of objects</a:t>
+            </a:r>
+            <a:r>
+              <a:rPr lang="en-GB" sz="2800" dirty="0" smtClean="0">
+                <a:solidFill>
+                  <a:schemeClr val="tx1"/>
+                </a:solidFill>
+              </a:rPr>
+              <a:t>) are selected and </a:t>
+            </a:r>
+            <a:r>
+              <a:rPr lang="en-GB" sz="2800" b="1" dirty="0" smtClean="0">
+                <a:solidFill>
+                  <a:schemeClr val="tx1"/>
+                </a:solidFill>
+              </a:rPr>
+              <a:t>smaller points are rejected </a:t>
+            </a:r>
+            <a:r>
+              <a:rPr lang="en-GB" sz="2800" dirty="0" smtClean="0">
+                <a:solidFill>
+                  <a:schemeClr val="tx1"/>
+                </a:solidFill>
+              </a:rPr>
+              <a:t>– useful for </a:t>
+            </a:r>
+            <a:r>
+              <a:rPr lang="en-GB" sz="2800" b="1" dirty="0" smtClean="0">
+                <a:solidFill>
+                  <a:schemeClr val="tx1"/>
+                </a:solidFill>
+              </a:rPr>
+              <a:t>countering noise</a:t>
+            </a:r>
+            <a:endParaRPr lang="en-GB" sz="2800" dirty="0" smtClean="0">
+              <a:solidFill>
+                <a:schemeClr val="tx1"/>
+              </a:solidFill>
+            </a:endParaRPr>
+          </a:p>
+          <a:p>
+            <a:pPr>
+              <a:buFont typeface="Arial" pitchFamily="34" charset="0"/>
+              <a:buChar char="•"/>
+            </a:pPr>
+            <a:r>
               <a:rPr lang="en-GB" sz="2800" dirty="0" smtClean="0">
                 <a:solidFill>
                   <a:schemeClr val="tx1"/>
@@ -6778,12 +7459,20 @@
               <a:t> </a:t>
             </a:r>
             <a:r>
+              <a:rPr lang="el-GR" sz="2800" b="1" dirty="0" smtClean="0">
+                <a:solidFill>
+                  <a:schemeClr val="tx1"/>
+                </a:solidFill>
+              </a:rPr>
+              <a:t>μ</a:t>
+            </a:r>
+            <a:r>
               <a:rPr lang="en-GB" sz="2800" b="1" dirty="0" smtClean="0">
                 <a:solidFill>
                   <a:schemeClr val="tx1"/>
                 </a:solidFill>
               </a:rPr>
-              <a:t>Curvature</a:t>
+              <a:t> </a:t>
             </a:r>
             <a:r>
               <a:rPr lang="en-GB" sz="2800" dirty="0" smtClean="0">
@@ -6791,23 +7480,13 @@
                   <a:schemeClr val="tx1"/>
                 </a:solidFill>
               </a:rPr>
-              <a:t> of level-set function</a:t>
-            </a:r>
-            <a:endParaRPr lang="en-GB" sz="2800" b="1" dirty="0" smtClean="0">
+              <a:t>set to 1.0 by default in our implementation, but varies throughout our experiments</a:t>
+            </a:r>
+            <a:endParaRPr lang="en-GB" sz="2800" b="1" dirty="0">
               <a:solidFill>
                 <a:schemeClr val="tx1"/>
               </a:solidFill>
             </a:endParaRPr>
-          </a:p>
-          <a:p>
-            <a:r>
-              <a:rPr lang="en-GB" sz="2800" dirty="0" smtClean="0">
-                <a:solidFill>
-                  <a:schemeClr val="tx1"/>
-                </a:solidFill>
-              </a:rPr>
-              <a:t>Biases contour towards surrounding larger objects rather than lots of small ones</a:t>
-            </a:r>
           </a:p>
         </p:txBody>
       </p:sp>
@@ -6860,7 +7539,7 @@
           <a:p>
             <a:r>
               <a:rPr lang="en-GB" dirty="0" smtClean="0"/>
-              <a:t>Implementation</a:t>
+              <a:t>Algorithm</a:t>
             </a:r>
             <a:endParaRPr lang="en-GB" dirty="0"/>
           </a:p>
@@ -6928,22 +7607,24 @@
       </p:pic>
       <p:sp>
         <p:nvSpPr>
-          <p:cNvPr id="5" name="Rectangle 4"/>
+          <p:cNvPr id="6" name="Rectangle 5"/>
           <p:cNvSpPr/>
           <p:nvPr/>
         </p:nvSpPr>
         <p:spPr>
           <a:xfrm>
-            <a:off x="2771800" y="2276872"/>
-            <a:ext cx="2448272" cy="1296144"/>
+            <a:off x="539552" y="3645024"/>
+            <a:ext cx="8136904" cy="2592288"/>
           </a:xfrm>
           <a:prstGeom prst="rect">
             <a:avLst/>
           </a:prstGeom>
-          <a:noFill/>
-          <a:ln w="76200">
+          <a:solidFill>
+            <a:schemeClr val="bg1"/>
+          </a:solidFill>
+          <a:ln>
             <a:solidFill>
-              <a:srgbClr val="FF0000"/>
+              <a:schemeClr val="tx1"/>
             </a:solidFill>
           </a:ln>
         </p:spPr>
@@ -6964,34 +7645,71 @@
           </a:fontRef>
         </p:style>
         <p:txBody>
-          <a:bodyPr rtlCol="0" anchor="ctr"/>
-          <a:lstStyle/>
-          <a:p>
-            <a:pPr algn="ctr"/>
-            <a:endParaRPr lang="en-GB"/>
-          </a:p>
-        </p:txBody>
-      </p:sp>
-      <p:sp>
-        <p:nvSpPr>
-          <p:cNvPr id="6" name="Rectangle 5"/>
+          <a:bodyPr rtlCol="0" anchor="t"/>
+          <a:lstStyle/>
+          <a:p>
+            <a:pPr>
+              <a:buFont typeface="Arial" pitchFamily="34" charset="0"/>
+              <a:buChar char="•"/>
+            </a:pPr>
+            <a:r>
+              <a:rPr lang="en-GB" sz="2800" dirty="0">
+                <a:solidFill>
+                  <a:schemeClr val="tx1"/>
+                </a:solidFill>
+              </a:rPr>
+              <a:t> </a:t>
+            </a:r>
+            <a:r>
+              <a:rPr lang="en-GB" sz="2800" dirty="0" smtClean="0">
+                <a:solidFill>
+                  <a:schemeClr val="tx1"/>
+                </a:solidFill>
+              </a:rPr>
+              <a:t>We do </a:t>
+            </a:r>
+            <a:r>
+              <a:rPr lang="en-GB" sz="2800" b="1" dirty="0" smtClean="0">
+                <a:solidFill>
+                  <a:schemeClr val="tx1"/>
+                </a:solidFill>
+              </a:rPr>
+              <a:t>not</a:t>
+            </a:r>
+            <a:r>
+              <a:rPr lang="en-GB" sz="2800" dirty="0" smtClean="0">
+                <a:solidFill>
+                  <a:schemeClr val="tx1"/>
+                </a:solidFill>
+              </a:rPr>
+              <a:t> solve curvature with respect to time</a:t>
+            </a:r>
+            <a:endParaRPr lang="en-GB" sz="2800" b="1" dirty="0">
+              <a:solidFill>
+                <a:schemeClr val="tx1"/>
+              </a:solidFill>
+            </a:endParaRPr>
+          </a:p>
+        </p:txBody>
+      </p:sp>
+      <p:sp>
+        <p:nvSpPr>
+          <p:cNvPr id="8" name="Rectangle 7"/>
           <p:cNvSpPr/>
           <p:nvPr/>
         </p:nvSpPr>
         <p:spPr>
           <a:xfrm>
-            <a:off x="539552" y="3645024"/>
-            <a:ext cx="8136904" cy="2592288"/>
+            <a:off x="611560" y="2924944"/>
+            <a:ext cx="648072" cy="504056"/>
           </a:xfrm>
           <a:prstGeom prst="rect">
             <a:avLst/>
           </a:prstGeom>
-          <a:solidFill>
-            <a:schemeClr val="bg1"/>
-          </a:solidFill>
-          <a:ln>
+          <a:noFill/>
+          <a:ln w="76200">
             <a:solidFill>
-              <a:schemeClr val="tx1"/>
+              <a:srgbClr val="FF0000"/>
             </a:solidFill>
           </a:ln>
         </p:spPr>
@@ -7012,141 +7730,57 @@
           </a:fontRef>
         </p:style>
         <p:txBody>
-          <a:bodyPr rtlCol="0" anchor="t"/>
-          <a:lstStyle/>
-          <a:p>
-            <a:pPr>
-              <a:buFont typeface="Arial" pitchFamily="34" charset="0"/>
-              <a:buChar char="•"/>
-            </a:pPr>
-            <a:r>
-              <a:rPr lang="en-GB" sz="2800" dirty="0">
-                <a:solidFill>
-                  <a:schemeClr val="tx1"/>
-                </a:solidFill>
-              </a:rPr>
-              <a:t> </a:t>
-            </a:r>
-            <a:r>
-              <a:rPr lang="en-GB" sz="2800" dirty="0" smtClean="0">
-                <a:solidFill>
-                  <a:schemeClr val="tx1"/>
-                </a:solidFill>
-              </a:rPr>
-              <a:t>So </a:t>
-            </a:r>
-            <a:r>
-              <a:rPr lang="en-GB" sz="2800" b="1" dirty="0" smtClean="0">
-                <a:solidFill>
-                  <a:schemeClr val="tx1"/>
-                </a:solidFill>
-              </a:rPr>
-              <a:t>larger </a:t>
-            </a:r>
-            <a:r>
-              <a:rPr lang="el-GR" sz="2800" b="1" dirty="0" smtClean="0">
-                <a:solidFill>
-                  <a:schemeClr val="tx1"/>
-                </a:solidFill>
-              </a:rPr>
-              <a:t>μ</a:t>
-            </a:r>
-            <a:r>
-              <a:rPr lang="en-GB" sz="2800" dirty="0" smtClean="0">
-                <a:solidFill>
-                  <a:schemeClr val="tx1"/>
-                </a:solidFill>
-              </a:rPr>
-              <a:t> means larger objects (or </a:t>
-            </a:r>
-            <a:r>
-              <a:rPr lang="en-GB" sz="2800" b="1" dirty="0" smtClean="0">
-                <a:solidFill>
-                  <a:schemeClr val="tx1"/>
-                </a:solidFill>
-              </a:rPr>
-              <a:t>groupings of objects</a:t>
-            </a:r>
-            <a:r>
-              <a:rPr lang="en-GB" sz="2800" dirty="0" smtClean="0">
-                <a:solidFill>
-                  <a:schemeClr val="tx1"/>
-                </a:solidFill>
-              </a:rPr>
-              <a:t>) are selected and </a:t>
-            </a:r>
-            <a:r>
-              <a:rPr lang="en-GB" sz="2800" b="1" dirty="0" smtClean="0">
-                <a:solidFill>
-                  <a:schemeClr val="tx1"/>
-                </a:solidFill>
-              </a:rPr>
-              <a:t>smaller points are rejected </a:t>
-            </a:r>
-            <a:r>
-              <a:rPr lang="en-GB" sz="2800" dirty="0" smtClean="0">
-                <a:solidFill>
-                  <a:schemeClr val="tx1"/>
-                </a:solidFill>
-              </a:rPr>
-              <a:t>– useful for </a:t>
-            </a:r>
-            <a:r>
-              <a:rPr lang="en-GB" sz="2800" b="1" dirty="0" smtClean="0">
-                <a:solidFill>
-                  <a:schemeClr val="tx1"/>
-                </a:solidFill>
-              </a:rPr>
-              <a:t>countering noise</a:t>
-            </a:r>
-            <a:endParaRPr lang="en-GB" sz="2800" dirty="0" smtClean="0">
-              <a:solidFill>
-                <a:schemeClr val="tx1"/>
-              </a:solidFill>
-            </a:endParaRPr>
-          </a:p>
-          <a:p>
-            <a:pPr>
-              <a:buFont typeface="Arial" pitchFamily="34" charset="0"/>
-              <a:buChar char="•"/>
-            </a:pPr>
-            <a:r>
-              <a:rPr lang="en-GB" sz="2800" dirty="0" smtClean="0">
-                <a:solidFill>
-                  <a:schemeClr val="tx1"/>
-                </a:solidFill>
-              </a:rPr>
-              <a:t> </a:t>
-            </a:r>
-            <a:r>
-              <a:rPr lang="el-GR" sz="2800" b="1" dirty="0" smtClean="0">
-                <a:solidFill>
-                  <a:schemeClr val="tx1"/>
-                </a:solidFill>
-              </a:rPr>
-              <a:t>μ</a:t>
-            </a:r>
-            <a:r>
-              <a:rPr lang="en-GB" sz="2800" b="1" dirty="0" smtClean="0">
-                <a:solidFill>
-                  <a:schemeClr val="tx1"/>
-                </a:solidFill>
-              </a:rPr>
-              <a:t> </a:t>
-            </a:r>
-            <a:r>
-              <a:rPr lang="en-GB" sz="2800" dirty="0" smtClean="0">
-                <a:solidFill>
-                  <a:schemeClr val="tx1"/>
-                </a:solidFill>
-              </a:rPr>
-              <a:t>set to 1.0 by default in our implementation, but varies throughout our experiments</a:t>
-            </a:r>
-            <a:endParaRPr lang="en-GB" sz="2800" b="1" dirty="0">
-              <a:solidFill>
-                <a:schemeClr val="tx1"/>
-              </a:solidFill>
-            </a:endParaRPr>
+          <a:bodyPr rtlCol="0" anchor="ctr"/>
+          <a:lstStyle/>
+          <a:p>
+            <a:pPr algn="ctr"/>
+            <a:endParaRPr lang="en-GB"/>
+          </a:p>
+        </p:txBody>
+      </p:sp>
+      <p:sp>
+        <p:nvSpPr>
+          <p:cNvPr id="9" name="Rectangle 8"/>
+          <p:cNvSpPr/>
+          <p:nvPr/>
+        </p:nvSpPr>
+        <p:spPr>
+          <a:xfrm>
+            <a:off x="2771800" y="2276872"/>
+            <a:ext cx="2448272" cy="1296144"/>
+          </a:xfrm>
+          <a:prstGeom prst="rect">
+            <a:avLst/>
+          </a:prstGeom>
+          <a:noFill/>
+          <a:ln w="76200">
+            <a:solidFill>
+              <a:srgbClr val="FF0000"/>
+            </a:solidFill>
+          </a:ln>
+        </p:spPr>
+        <p:style>
+          <a:lnRef idx="2">
+            <a:schemeClr val="accent1">
+              <a:shade val="50000"/>
+            </a:schemeClr>
+          </a:lnRef>
+          <a:fillRef idx="1">
+            <a:schemeClr val="accent1"/>
+          </a:fillRef>
+          <a:effectRef idx="0">
+            <a:schemeClr val="accent1"/>
+          </a:effectRef>
+          <a:fontRef idx="minor">
+            <a:schemeClr val="lt1"/>
+          </a:fontRef>
+        </p:style>
+        <p:txBody>
+          <a:bodyPr rtlCol="0" anchor="ctr"/>
+          <a:lstStyle/>
+          <a:p>
+            <a:pPr algn="ctr"/>
+            <a:endParaRPr lang="en-GB"/>
           </a:p>
         </p:txBody>
       </p:sp>
@@ -7199,7 +7833,7 @@
           <a:p>
             <a:r>
               <a:rPr lang="en-GB" dirty="0" smtClean="0"/>
-              <a:t>Implementation</a:t>
+              <a:t>Algorithm</a:t>
             </a:r>
             <a:endParaRPr lang="en-GB" dirty="0"/>
           </a:p>
@@ -7242,7 +7876,7 @@
           <p:nvPr/>
         </p:nvPicPr>
         <p:blipFill>
-          <a:blip r:embed="rId2" cstate="print"/>
+          <a:blip r:embed="rId3" cstate="print"/>
           <a:srcRect/>
           <a:stretch>
             <a:fillRect/>
@@ -7267,24 +7901,22 @@
       </p:pic>
       <p:sp>
         <p:nvSpPr>
-          <p:cNvPr id="6" name="Rectangle 5"/>
+          <p:cNvPr id="5" name="Rectangle 4"/>
           <p:cNvSpPr/>
           <p:nvPr/>
         </p:nvSpPr>
         <p:spPr>
           <a:xfrm>
-            <a:off x="539552" y="3645024"/>
-            <a:ext cx="8136904" cy="2592288"/>
+            <a:off x="5148064" y="2492896"/>
+            <a:ext cx="792088" cy="792088"/>
           </a:xfrm>
           <a:prstGeom prst="rect">
             <a:avLst/>
           </a:prstGeom>
-          <a:solidFill>
-            <a:schemeClr val="bg1"/>
-          </a:solidFill>
-          <a:ln>
+          <a:noFill/>
+          <a:ln w="76200">
             <a:solidFill>
-              <a:schemeClr val="tx1"/>
+              <a:srgbClr val="FF0000"/>
             </a:solidFill>
           </a:ln>
         </p:spPr>
@@ -7305,71 +7937,34 @@
           </a:fontRef>
         </p:style>
         <p:txBody>
-          <a:bodyPr rtlCol="0" anchor="t"/>
-          <a:lstStyle/>
-          <a:p>
-            <a:pPr>
-              <a:buFont typeface="Arial" pitchFamily="34" charset="0"/>
-              <a:buChar char="•"/>
-            </a:pPr>
-            <a:r>
-              <a:rPr lang="en-GB" sz="2800" dirty="0">
-                <a:solidFill>
-                  <a:schemeClr val="tx1"/>
-                </a:solidFill>
-              </a:rPr>
-              <a:t> </a:t>
-            </a:r>
-            <a:r>
-              <a:rPr lang="en-GB" sz="2800" dirty="0" smtClean="0">
-                <a:solidFill>
-                  <a:schemeClr val="tx1"/>
-                </a:solidFill>
-              </a:rPr>
-              <a:t>We do </a:t>
-            </a:r>
-            <a:r>
-              <a:rPr lang="en-GB" sz="2800" b="1" dirty="0" smtClean="0">
-                <a:solidFill>
-                  <a:schemeClr val="tx1"/>
-                </a:solidFill>
-              </a:rPr>
-              <a:t>not</a:t>
-            </a:r>
-            <a:r>
-              <a:rPr lang="en-GB" sz="2800" dirty="0" smtClean="0">
-                <a:solidFill>
-                  <a:schemeClr val="tx1"/>
-                </a:solidFill>
-              </a:rPr>
-              <a:t> solve curvature with respect to time</a:t>
-            </a:r>
-            <a:endParaRPr lang="en-GB" sz="2800" b="1" dirty="0">
-              <a:solidFill>
-                <a:schemeClr val="tx1"/>
-              </a:solidFill>
-            </a:endParaRPr>
-          </a:p>
-        </p:txBody>
-      </p:sp>
-      <p:sp>
-        <p:nvSpPr>
-          <p:cNvPr id="8" name="Rectangle 7"/>
+          <a:bodyPr rtlCol="0" anchor="ctr"/>
+          <a:lstStyle/>
+          <a:p>
+            <a:pPr algn="ctr"/>
+            <a:endParaRPr lang="en-GB"/>
+          </a:p>
+        </p:txBody>
+      </p:sp>
+      <p:sp>
+        <p:nvSpPr>
+          <p:cNvPr id="6" name="Rectangle 5"/>
           <p:cNvSpPr/>
           <p:nvPr/>
         </p:nvSpPr>
         <p:spPr>
           <a:xfrm>
-            <a:off x="611560" y="2924944"/>
-            <a:ext cx="648072" cy="504056"/>
+            <a:off x="539552" y="3645024"/>
+            <a:ext cx="8136904" cy="2592288"/>
           </a:xfrm>
           <a:prstGeom prst="rect">
             <a:avLst/>
           </a:prstGeom>
-          <a:noFill/>
-          <a:ln w="76200">
+          <a:solidFill>
+            <a:schemeClr val="bg1"/>
+          </a:solidFill>
+          <a:ln>
             <a:solidFill>
-              <a:srgbClr val="FF0000"/>
+              <a:schemeClr val="tx1"/>
             </a:solidFill>
           </a:ln>
         </p:spPr>
@@ -7390,57 +7985,86 @@
           </a:fontRef>
         </p:style>
         <p:txBody>
-          <a:bodyPr rtlCol="0" anchor="ctr"/>
-          <a:lstStyle/>
-          <a:p>
-            <a:pPr algn="ctr"/>
-            <a:endParaRPr lang="en-GB"/>
-          </a:p>
-        </p:txBody>
-      </p:sp>
-      <p:sp>
-        <p:nvSpPr>
-          <p:cNvPr id="9" name="Rectangle 8"/>
-          <p:cNvSpPr/>
-          <p:nvPr/>
-        </p:nvSpPr>
-        <p:spPr>
-          <a:xfrm>
-            <a:off x="2771800" y="2276872"/>
-            <a:ext cx="2448272" cy="1296144"/>
-          </a:xfrm>
-          <a:prstGeom prst="rect">
-            <a:avLst/>
-          </a:prstGeom>
-          <a:noFill/>
-          <a:ln w="76200">
-            <a:solidFill>
-              <a:srgbClr val="FF0000"/>
-            </a:solidFill>
-          </a:ln>
-        </p:spPr>
-        <p:style>
-          <a:lnRef idx="2">
-            <a:schemeClr val="accent1">
-              <a:shade val="50000"/>
-            </a:schemeClr>
-          </a:lnRef>
-          <a:fillRef idx="1">
-            <a:schemeClr val="accent1"/>
-          </a:fillRef>
-          <a:effectRef idx="0">
-            <a:schemeClr val="accent1"/>
-          </a:effectRef>
-          <a:fontRef idx="minor">
-            <a:schemeClr val="lt1"/>
-          </a:fontRef>
-        </p:style>
-        <p:txBody>
-          <a:bodyPr rtlCol="0" anchor="ctr"/>
-          <a:lstStyle/>
-          <a:p>
-            <a:pPr algn="ctr"/>
-            <a:endParaRPr lang="en-GB"/>
+          <a:bodyPr rtlCol="0" anchor="t"/>
+          <a:lstStyle/>
+          <a:p>
+            <a:pPr>
+              <a:buFont typeface="Arial" pitchFamily="34" charset="0"/>
+              <a:buChar char="•"/>
+            </a:pPr>
+            <a:r>
+              <a:rPr lang="en-GB" sz="2800" dirty="0" smtClean="0">
+                <a:solidFill>
+                  <a:schemeClr val="tx1"/>
+                </a:solidFill>
+              </a:rPr>
+              <a:t> Correction term which pushes the contour towards an object even when curvature is zero or negative</a:t>
+            </a:r>
+          </a:p>
+          <a:p>
+            <a:pPr>
+              <a:buFont typeface="Arial" pitchFamily="34" charset="0"/>
+              <a:buChar char="•"/>
+            </a:pPr>
+            <a:r>
+              <a:rPr lang="en-GB" sz="2800" dirty="0">
+                <a:solidFill>
+                  <a:schemeClr val="tx1"/>
+                </a:solidFill>
+              </a:rPr>
+              <a:t> </a:t>
+            </a:r>
+            <a:r>
+              <a:rPr lang="en-GB" sz="2800" dirty="0" smtClean="0">
+                <a:solidFill>
+                  <a:schemeClr val="tx1"/>
+                </a:solidFill>
+              </a:rPr>
+              <a:t>Originates from simpler models using only curvature</a:t>
+            </a:r>
+          </a:p>
+          <a:p>
+            <a:pPr>
+              <a:buFont typeface="Arial" pitchFamily="34" charset="0"/>
+              <a:buChar char="•"/>
+            </a:pPr>
+            <a:r>
+              <a:rPr lang="en-GB" sz="2800" dirty="0" smtClean="0">
+                <a:solidFill>
+                  <a:schemeClr val="tx1"/>
+                </a:solidFill>
+              </a:rPr>
+              <a:t> </a:t>
+            </a:r>
+            <a:r>
+              <a:rPr lang="en-GB" sz="2800" b="1" dirty="0" smtClean="0">
+                <a:solidFill>
+                  <a:schemeClr val="tx1"/>
+                </a:solidFill>
+              </a:rPr>
+              <a:t>v</a:t>
+            </a:r>
+            <a:r>
+              <a:rPr lang="en-GB" sz="2800" dirty="0">
+                <a:solidFill>
+                  <a:schemeClr val="tx1"/>
+                </a:solidFill>
+              </a:rPr>
+              <a:t> </a:t>
+            </a:r>
+            <a:r>
+              <a:rPr lang="en-GB" sz="2800" dirty="0" smtClean="0">
+                <a:solidFill>
+                  <a:schemeClr val="tx1"/>
+                </a:solidFill>
+              </a:rPr>
+              <a:t>is set to zero in our implementation</a:t>
+            </a:r>
+            <a:endParaRPr lang="en-GB" sz="2800" dirty="0">
+              <a:solidFill>
+                <a:schemeClr val="tx1"/>
+              </a:solidFill>
+            </a:endParaRPr>
           </a:p>
         </p:txBody>
       </p:sp>
@@ -7493,7 +8117,7 @@
           <a:p>
             <a:r>
               <a:rPr lang="en-GB" dirty="0" smtClean="0"/>
-              <a:t>Implementation</a:t>
+              <a:t>Algorithm</a:t>
             </a:r>
             <a:endParaRPr lang="en-GB" dirty="0"/>
           </a:p>
@@ -7561,22 +8185,24 @@
       </p:pic>
       <p:sp>
         <p:nvSpPr>
-          <p:cNvPr id="5" name="Rectangle 4"/>
+          <p:cNvPr id="6" name="Rectangle 5"/>
           <p:cNvSpPr/>
           <p:nvPr/>
         </p:nvSpPr>
         <p:spPr>
           <a:xfrm>
-            <a:off x="5148064" y="2492896"/>
-            <a:ext cx="792088" cy="792088"/>
+            <a:off x="539552" y="4581128"/>
+            <a:ext cx="8136904" cy="1656184"/>
           </a:xfrm>
           <a:prstGeom prst="rect">
             <a:avLst/>
           </a:prstGeom>
-          <a:noFill/>
-          <a:ln w="76200">
+          <a:solidFill>
+            <a:schemeClr val="bg1"/>
+          </a:solidFill>
+          <a:ln>
             <a:solidFill>
-              <a:srgbClr val="FF0000"/>
+              <a:schemeClr val="tx1"/>
             </a:solidFill>
           </a:ln>
         </p:spPr>
@@ -7597,34 +8223,189 @@
           </a:fontRef>
         </p:style>
         <p:txBody>
-          <a:bodyPr rtlCol="0" anchor="ctr"/>
-          <a:lstStyle/>
-          <a:p>
-            <a:pPr algn="ctr"/>
-            <a:endParaRPr lang="en-GB"/>
-          </a:p>
-        </p:txBody>
-      </p:sp>
-      <p:sp>
-        <p:nvSpPr>
-          <p:cNvPr id="6" name="Rectangle 5"/>
+          <a:bodyPr rtlCol="0" anchor="t"/>
+          <a:lstStyle/>
+          <a:p>
+            <a:pPr>
+              <a:buFont typeface="Arial" pitchFamily="34" charset="0"/>
+              <a:buChar char="•"/>
+            </a:pPr>
+            <a:r>
+              <a:rPr lang="en-GB" sz="2800" dirty="0" smtClean="0">
+                <a:solidFill>
+                  <a:schemeClr val="tx1"/>
+                </a:solidFill>
+              </a:rPr>
+              <a:t> Functions of the mean values of the image inside the </a:t>
+            </a:r>
+            <a:r>
+              <a:rPr lang="en-GB" sz="2800" dirty="0" smtClean="0">
+                <a:solidFill>
+                  <a:schemeClr val="tx1"/>
+                </a:solidFill>
+              </a:rPr>
+              <a:t>contour (</a:t>
+            </a:r>
+            <a:r>
+              <a:rPr lang="en-GB" sz="2800" dirty="0" smtClean="0">
+                <a:solidFill>
+                  <a:schemeClr val="tx1"/>
+                </a:solidFill>
+              </a:rPr>
+              <a:t>c</a:t>
+            </a:r>
+            <a:r>
+              <a:rPr lang="en-GB" sz="2800" baseline="-25000" dirty="0" smtClean="0">
+                <a:solidFill>
+                  <a:schemeClr val="tx1"/>
+                </a:solidFill>
+              </a:rPr>
+              <a:t>1</a:t>
+            </a:r>
+            <a:r>
+              <a:rPr lang="en-GB" sz="2800" dirty="0" smtClean="0">
+                <a:solidFill>
+                  <a:schemeClr val="tx1"/>
+                </a:solidFill>
+              </a:rPr>
+              <a:t>) and </a:t>
+            </a:r>
+            <a:r>
+              <a:rPr lang="en-GB" sz="2800" dirty="0" smtClean="0">
+                <a:solidFill>
+                  <a:schemeClr val="tx1"/>
+                </a:solidFill>
+              </a:rPr>
+              <a:t>outside </a:t>
+            </a:r>
+            <a:r>
+              <a:rPr lang="en-GB" sz="2800" dirty="0" smtClean="0">
+                <a:solidFill>
+                  <a:schemeClr val="tx1"/>
+                </a:solidFill>
+              </a:rPr>
+              <a:t>the contour (</a:t>
+            </a:r>
+            <a:r>
+              <a:rPr lang="en-GB" sz="2800" dirty="0" smtClean="0">
+                <a:solidFill>
+                  <a:schemeClr val="tx1"/>
+                </a:solidFill>
+              </a:rPr>
+              <a:t>c</a:t>
+            </a:r>
+            <a:r>
+              <a:rPr lang="en-GB" sz="2800" baseline="-25000" dirty="0" smtClean="0">
+                <a:solidFill>
+                  <a:schemeClr val="tx1"/>
+                </a:solidFill>
+              </a:rPr>
+              <a:t>2</a:t>
+            </a:r>
+            <a:r>
+              <a:rPr lang="en-GB" sz="2800" dirty="0" smtClean="0">
+                <a:solidFill>
+                  <a:schemeClr val="tx1"/>
+                </a:solidFill>
+              </a:rPr>
+              <a:t>)</a:t>
+            </a:r>
+          </a:p>
+          <a:p>
+            <a:pPr>
+              <a:buFont typeface="Arial" pitchFamily="34" charset="0"/>
+              <a:buChar char="•"/>
+            </a:pPr>
+            <a:r>
+              <a:rPr lang="en-GB" sz="2800" b="1" dirty="0" smtClean="0">
+                <a:solidFill>
+                  <a:schemeClr val="tx1"/>
+                </a:solidFill>
+              </a:rPr>
+              <a:t> </a:t>
+            </a:r>
+            <a:r>
+              <a:rPr lang="el-GR" sz="2800" b="1" dirty="0" smtClean="0">
+                <a:solidFill>
+                  <a:schemeClr val="tx1"/>
+                </a:solidFill>
+              </a:rPr>
+              <a:t>λ</a:t>
+            </a:r>
+            <a:r>
+              <a:rPr lang="en-GB" sz="2800" b="1" baseline="-25000" dirty="0" smtClean="0">
+                <a:solidFill>
+                  <a:schemeClr val="tx1"/>
+                </a:solidFill>
+              </a:rPr>
+              <a:t>1</a:t>
+            </a:r>
+            <a:r>
+              <a:rPr lang="en-GB" sz="2800" b="1" dirty="0" smtClean="0">
+                <a:solidFill>
+                  <a:schemeClr val="tx1"/>
+                </a:solidFill>
+              </a:rPr>
+              <a:t> = </a:t>
+            </a:r>
+            <a:r>
+              <a:rPr lang="el-GR" sz="2800" b="1" dirty="0" smtClean="0">
+                <a:solidFill>
+                  <a:schemeClr val="tx1"/>
+                </a:solidFill>
+              </a:rPr>
+              <a:t>λ</a:t>
+            </a:r>
+            <a:r>
+              <a:rPr lang="en-GB" sz="2800" b="1" baseline="-25000" dirty="0" smtClean="0">
+                <a:solidFill>
+                  <a:schemeClr val="tx1"/>
+                </a:solidFill>
+              </a:rPr>
+              <a:t>2</a:t>
+            </a:r>
+            <a:r>
+              <a:rPr lang="en-GB" sz="2800" b="1" dirty="0" smtClean="0">
+                <a:solidFill>
+                  <a:schemeClr val="tx1"/>
+                </a:solidFill>
+              </a:rPr>
+              <a:t> </a:t>
+            </a:r>
+            <a:r>
+              <a:rPr lang="en-GB" sz="2800" dirty="0" smtClean="0">
+                <a:solidFill>
+                  <a:schemeClr val="tx1"/>
+                </a:solidFill>
+              </a:rPr>
+              <a:t>= 1 in our implementation</a:t>
+            </a:r>
+            <a:endParaRPr lang="en-GB" sz="2800" b="1" dirty="0">
+              <a:solidFill>
+                <a:schemeClr val="tx1"/>
+              </a:solidFill>
+            </a:endParaRPr>
+          </a:p>
+        </p:txBody>
+      </p:sp>
+      <p:sp>
+        <p:nvSpPr>
+          <p:cNvPr id="9" name="Rectangle 8"/>
           <p:cNvSpPr/>
           <p:nvPr/>
         </p:nvSpPr>
         <p:spPr>
           <a:xfrm>
-            <a:off x="539552" y="3645024"/>
-            <a:ext cx="8136904" cy="2592288"/>
+            <a:off x="5868144" y="2492896"/>
+            <a:ext cx="2592288" cy="792088"/>
           </a:xfrm>
           <a:prstGeom prst="rect">
             <a:avLst/>
           </a:prstGeom>
-          <a:solidFill>
-            <a:schemeClr val="bg1"/>
-          </a:solidFill>
-          <a:ln>
+          <a:noFill/>
+          <a:ln w="76200">
             <a:solidFill>
-              <a:schemeClr val="tx1"/>
+              <a:srgbClr val="FF0000"/>
             </a:solidFill>
           </a:ln>
         </p:spPr>
@@ -7645,86 +8426,57 @@
           </a:fontRef>
         </p:style>
         <p:txBody>
-          <a:bodyPr rtlCol="0" anchor="t"/>
-          <a:lstStyle/>
-          <a:p>
-            <a:pPr>
-              <a:buFont typeface="Arial" pitchFamily="34" charset="0"/>
-              <a:buChar char="•"/>
-            </a:pPr>
-            <a:r>
-              <a:rPr lang="en-GB" sz="2800" dirty="0" smtClean="0">
-                <a:solidFill>
-                  <a:schemeClr val="tx1"/>
-                </a:solidFill>
-              </a:rPr>
-              <a:t> Correction term which pushes the contour towards an object even when curvature is zero or negative</a:t>
-            </a:r>
-          </a:p>
-          <a:p>
-            <a:pPr>
-              <a:buFont typeface="Arial" pitchFamily="34" charset="0"/>
-              <a:buChar char="•"/>
-            </a:pPr>
-            <a:r>
-              <a:rPr lang="en-GB" sz="2800" dirty="0">
-                <a:solidFill>
-                  <a:schemeClr val="tx1"/>
-                </a:solidFill>
-              </a:rPr>
-              <a:t> </a:t>
-            </a:r>
-            <a:r>
-              <a:rPr lang="en-GB" sz="2800" dirty="0" smtClean="0">
-                <a:solidFill>
-                  <a:schemeClr val="tx1"/>
-                </a:solidFill>
-              </a:rPr>
-              <a:t>Originates from simpler models using only curvature</a:t>
-            </a:r>
-          </a:p>
-          <a:p>
-            <a:pPr>
-              <a:buFont typeface="Arial" pitchFamily="34" charset="0"/>
-              <a:buChar char="•"/>
-            </a:pPr>
-            <a:r>
-              <a:rPr lang="en-GB" sz="2800" dirty="0" smtClean="0">
-                <a:solidFill>
-                  <a:schemeClr val="tx1"/>
-                </a:solidFill>
-              </a:rPr>
-              <a:t> </a:t>
-            </a:r>
-            <a:r>
-              <a:rPr lang="en-GB" sz="2800" b="1" dirty="0" smtClean="0">
-                <a:solidFill>
-                  <a:schemeClr val="tx1"/>
-                </a:solidFill>
-              </a:rPr>
-              <a:t>v</a:t>
-            </a:r>
-            <a:r>
-              <a:rPr lang="en-GB" sz="2800" dirty="0">
-                <a:solidFill>
-                  <a:schemeClr val="tx1"/>
-                </a:solidFill>
-              </a:rPr>
-              <a:t> </a:t>
-            </a:r>
-            <a:r>
-              <a:rPr lang="en-GB" sz="2800" dirty="0" smtClean="0">
-                <a:solidFill>
-                  <a:schemeClr val="tx1"/>
-                </a:solidFill>
-              </a:rPr>
-              <a:t>is set to zero in our implementation</a:t>
-            </a:r>
-            <a:endParaRPr lang="en-GB" sz="2800" dirty="0">
-              <a:solidFill>
-                <a:schemeClr val="tx1"/>
-              </a:solidFill>
-            </a:endParaRPr>
+          <a:bodyPr rtlCol="0" anchor="ctr"/>
+          <a:lstStyle/>
+          <a:p>
+            <a:pPr algn="ctr"/>
+            <a:endParaRPr lang="en-GB"/>
+          </a:p>
+        </p:txBody>
+      </p:sp>
+      <p:sp>
+        <p:nvSpPr>
+          <p:cNvPr id="10" name="Rectangle 9"/>
+          <p:cNvSpPr/>
+          <p:nvPr/>
+        </p:nvSpPr>
+        <p:spPr>
+          <a:xfrm>
+            <a:off x="2843808" y="3573016"/>
+            <a:ext cx="2592288" cy="792088"/>
+          </a:xfrm>
+          <a:prstGeom prst="rect">
+            <a:avLst/>
+          </a:prstGeom>
+          <a:noFill/>
+          <a:ln w="76200">
+            <a:solidFill>
+              <a:srgbClr val="FF0000"/>
+            </a:solidFill>
+          </a:ln>
+        </p:spPr>
+        <p:style>
+          <a:lnRef idx="2">
+            <a:schemeClr val="accent1">
+              <a:shade val="50000"/>
+            </a:schemeClr>
+          </a:lnRef>
+          <a:fillRef idx="1">
+            <a:schemeClr val="accent1"/>
+          </a:fillRef>
+          <a:effectRef idx="0">
+            <a:schemeClr val="accent1"/>
+          </a:effectRef>
+          <a:fontRef idx="minor">
+            <a:schemeClr val="lt1"/>
+          </a:fontRef>
+        </p:style>
+        <p:txBody>
+          <a:bodyPr rtlCol="0" anchor="ctr"/>
+          <a:lstStyle/>
+          <a:p>
+            <a:pPr algn="ctr"/>
+            <a:endParaRPr lang="en-GB"/>
           </a:p>
         </p:txBody>
       </p:sp>
@@ -8024,4 +8776,287 @@
   <a:objectDefaults/>
   <a:extraClrSchemeLst/>
 </a:theme>
+</file>
+
+<file path=ppt/theme/theme2.xml><?xml version="1.0" encoding="utf-8"?>
+<a:theme xmlns:a="http://schemas.openxmlformats.org/drawingml/2006/main" name="Office Theme">
+  <a:themeElements>
+    <a:clrScheme name="Office">
+      <a:dk1>
+        <a:sysClr val="windowText" lastClr="000000"/>
+      </a:dk1>
+      <a:lt1>
+        <a:sysClr val="window" lastClr="FFFFFF"/>
+      </a:lt1>
+      <a:dk2>
+        <a:srgbClr val="1F497D"/>
+      </a:dk2>
+      <a:lt2>
+        <a:srgbClr val="EEECE1"/>
+      </a:lt2>
+      <a:accent1>
+        <a:srgbClr val="4F81BD"/>
+      </a:accent1>
+      <a:accent2>
+        <a:srgbClr val="C0504D"/>
+      </a:accent2>
+      <a:accent3>
+        <a:srgbClr val="9BBB59"/>
+      </a:accent3>
+      <a:accent4>
+        <a:srgbClr val="8064A2"/>
+      </a:accent4>
+      <a:accent5>
+        <a:srgbClr val="4BACC6"/>
+      </a:accent5>
+      <a:accent6>
+        <a:srgbClr val="F79646"/>
+      </a:accent6>
+      <a:hlink>
+        <a:srgbClr val="0000FF"/>
+      </a:hlink>
+      <a:folHlink>
+        <a:srgbClr val="800080"/>
+      </a:folHlink>
+    </a:clrScheme>
+    <a:fontScheme name="Office">
+      <a:majorFont>
+        <a:latin typeface="Calibri"/>
+        <a:ea typeface=""/>
+        <a:cs typeface=""/>
+        <a:font script="Jpan" typeface="ＭＳ Ｐゴシック"/>
+        <a:font script="Hang" typeface="맑은 고딕"/>
+        <a:font script="Hans" typeface="宋体"/>
+        <a:font script="Hant" typeface="新細明體"/>
+        <a:font script="Arab" typeface="Times New Roman"/>
+        <a:font script="Hebr" typeface="Times New Roman"/>
+        <a:font script="Thai" typeface="Angsana New"/>
+        <a:font script="Ethi" typeface="Nyala"/>
+        <a:font script="Beng" typeface="Vrinda"/>
+        <a:font script="Gujr" typeface="Shruti"/>
+        <a:font script="Khmr" typeface="MoolBoran"/>
+        <a:font script="Knda" typeface="Tunga"/>
+        <a:font script="Guru" typeface="Raavi"/>
+        <a:font script="Cans" typeface="Euphemia"/>
+        <a:font script="Cher" typeface="Plantagenet Cherokee"/>
+        <a:font script="Yiii" typeface="Microsoft Yi Baiti"/>
+        <a:font script="Tibt" typeface="Microsoft Himalaya"/>
+        <a:font script="Thaa" typeface="MV Boli"/>
+        <a:font script="Deva" typeface="Mangal"/>
+        <a:font script="Telu" typeface="Gautami"/>
+        <a:font script="Taml" typeface="Latha"/>
+        <a:font script="Syrc" typeface="Estrangelo Edessa"/>
+        <a:font script="Orya" typeface="Kalinga"/>
+        <a:font script="Mlym" typeface="Kartika"/>
+        <a:font script="Laoo" typeface="DokChampa"/>
+        <a:font script="Sinh" typeface="Iskoola Pota"/>
+        <a:font script="Mong" typeface="Mongolian Baiti"/>
+        <a:font script="Viet" typeface="Times New Roman"/>
+        <a:font script="Uigh" typeface="Microsoft Uighur"/>
+      </a:majorFont>
+      <a:minorFont>
+        <a:latin typeface="Calibri"/>
+        <a:ea typeface=""/>
+        <a:cs typeface=""/>
+        <a:font script="Jpan" typeface="ＭＳ Ｐゴシック"/>
+        <a:font script="Hang" typeface="맑은 고딕"/>
+        <a:font script="Hans" typeface="宋体"/>
+        <a:font script="Hant" typeface="新細明體"/>
+        <a:font script="Arab" typeface="Arial"/>
+        <a:font script="Hebr" typeface="Arial"/>
+        <a:font script="Thai" typeface="Cordia New"/>
+        <a:font script="Ethi" typeface="Nyala"/>
+        <a:font script="Beng" typeface="Vrinda"/>
+        <a:font script="Gujr" typeface="Shruti"/>
+        <a:font script="Khmr" typeface="DaunPenh"/>
+        <a:font script="Knda" typeface="Tunga"/>
+        <a:font script="Guru" typeface="Raavi"/>
+        <a:font script="Cans" typeface="Euphemia"/>
+        <a:font script="Cher" typeface="Plantagenet Cherokee"/>
+        <a:font script="Yiii" typeface="Microsoft Yi Baiti"/>
+        <a:font script="Tibt" typeface="Microsoft Himalaya"/>
+        <a:font script="Thaa" typeface="MV Boli"/>
+        <a:font script="Deva" typeface="Mangal"/>
+        <a:font script="Telu" typeface="Gautami"/>
+        <a:font script="Taml" typeface="Latha"/>
+        <a:font script="Syrc" typeface="Estrangelo Edessa"/>
+        <a:font script="Orya" typeface="Kalinga"/>
+        <a:font script="Mlym" typeface="Kartika"/>
+        <a:font script="Laoo" typeface="DokChampa"/>
+        <a:font script="Sinh" typeface="Iskoola Pota"/>
+        <a:font script="Mong" typeface="Mongolian Baiti"/>
+        <a:font script="Viet" typeface="Arial"/>
+        <a:font script="Uigh" typeface="Microsoft Uighur"/>
+      </a:minorFont>
+    </a:fontScheme>
+    <a:fmtScheme name="Office">
+      <a:fillStyleLst>
+        <a:solidFill>
+          <a:schemeClr val="phClr"/>
+        </a:solidFill>
+        <a:gradFill rotWithShape="1">
+          <a:gsLst>
+            <a:gs pos="0">
+              <a:schemeClr val="phClr">
+                <a:tint val="50000"/>
+                <a:satMod val="300000"/>
+              </a:schemeClr>
+            </a:gs>
+            <a:gs pos="35000">
+              <a:schemeClr val="phClr">
+                <a:tint val="37000"/>
+                <a:satMod val="300000"/>
+              </a:schemeClr>
+            </a:gs>
+            <a:gs pos="100000">
+              <a:schemeClr val="phClr">
+                <a:tint val="15000"/>
+                <a:satMod val="350000"/>
+              </a:schemeClr>
+            </a:gs>
+          </a:gsLst>
+          <a:lin ang="16200000" scaled="1"/>
+        </a:gradFill>
+        <a:gradFill rotWithShape="1">
+          <a:gsLst>
+            <a:gs pos="0">
+              <a:schemeClr val="phClr">
+                <a:shade val="51000"/>
+                <a:satMod val="130000"/>
+              </a:schemeClr>
+            </a:gs>
+            <a:gs pos="80000">
+              <a:schemeClr val="phClr">
+                <a:shade val="93000"/>
+                <a:satMod val="130000"/>
+              </a:schemeClr>
+            </a:gs>
+            <a:gs pos="100000">
+              <a:schemeClr val="phClr">
+                <a:shade val="94000"/>
+                <a:satMod val="135000"/>
+              </a:schemeClr>
+            </a:gs>
+          </a:gsLst>
+          <a:lin ang="16200000" scaled="0"/>
+        </a:gradFill>
+      </a:fillStyleLst>
+      <a:lnStyleLst>
+        <a:ln w="9525" cap="flat" cmpd="sng" algn="ctr">
+          <a:solidFill>
+            <a:schemeClr val="phClr">
+              <a:shade val="95000"/>
+              <a:satMod val="105000"/>
+            </a:schemeClr>
+          </a:solidFill>
+          <a:prstDash val="solid"/>
+        </a:ln>
+        <a:ln w="25400" cap="flat" cmpd="sng" algn="ctr">
+          <a:solidFill>
+            <a:schemeClr val="phClr"/>
+          </a:solidFill>
+          <a:prstDash val="solid"/>
+        </a:ln>
+        <a:ln w="38100" cap="flat" cmpd="sng" algn="ctr">
+          <a:solidFill>
+            <a:schemeClr val="phClr"/>
+          </a:solidFill>
+          <a:prstDash val="solid"/>
+        </a:ln>
+      </a:lnStyleLst>
+      <a:effectStyleLst>
+        <a:effectStyle>
+          <a:effectLst>
+            <a:outerShdw blurRad="40000" dist="20000" dir="5400000" rotWithShape="0">
+              <a:srgbClr val="000000">
+                <a:alpha val="38000"/>
+              </a:srgbClr>
+            </a:outerShdw>
+          </a:effectLst>
+        </a:effectStyle>
+        <a:effectStyle>
+          <a:effectLst>
+            <a:outerShdw blurRad="40000" dist="23000" dir="5400000" rotWithShape="0">
+              <a:srgbClr val="000000">
+                <a:alpha val="35000"/>
+              </a:srgbClr>
+            </a:outerShdw>
+          </a:effectLst>
+        </a:effectStyle>
+        <a:effectStyle>
+          <a:effectLst>
+            <a:outerShdw blurRad="40000" dist="23000" dir="5400000" rotWithShape="0">
+              <a:srgbClr val="000000">
+                <a:alpha val="35000"/>
+              </a:srgbClr>
+            </a:outerShdw>
+          </a:effectLst>
+          <a:scene3d>
+            <a:camera prst="orthographicFront">
+              <a:rot lat="0" lon="0" rev="0"/>
+            </a:camera>
+            <a:lightRig rig="threePt" dir="t">
+              <a:rot lat="0" lon="0" rev="1200000"/>
+            </a:lightRig>
+          </a:scene3d>
+          <a:sp3d>
+            <a:bevelT w="63500" h="25400"/>
+          </a:sp3d>
+        </a:effectStyle>
+      </a:effectStyleLst>
+      <a:bgFillStyleLst>
+        <a:solidFill>
+          <a:schemeClr val="phClr"/>
+        </a:solidFill>
+        <a:gradFill rotWithShape="1">
+          <a:gsLst>
+            <a:gs pos="0">
+              <a:schemeClr val="phClr">
+                <a:tint val="40000"/>
+                <a:satMod val="350000"/>
+              </a:schemeClr>
+            </a:gs>
+            <a:gs pos="40000">
+              <a:schemeClr val="phClr">
+                <a:tint val="45000"/>
+                <a:shade val="99000"/>
+                <a:satMod val="350000"/>
+              </a:schemeClr>
+            </a:gs>
+            <a:gs pos="100000">
+              <a:schemeClr val="phClr">
+                <a:shade val="20000"/>
+                <a:satMod val="255000"/>
+              </a:schemeClr>
+            </a:gs>
+          </a:gsLst>
+          <a:path path="circle">
+            <a:fillToRect l="50000" t="-80000" r="50000" b="180000"/>
+          </a:path>
+        </a:gradFill>
+        <a:gradFill rotWithShape="1">
+          <a:gsLst>
+            <a:gs pos="0">
+              <a:schemeClr val="phClr">
+                <a:tint val="80000"/>
+                <a:satMod val="300000"/>
+              </a:schemeClr>
+            </a:gs>
+            <a:gs pos="100000">
+              <a:schemeClr val="phClr">
+                <a:shade val="30000"/>
+                <a:satMod val="200000"/>
+              </a:schemeClr>
+            </a:gs>
+          </a:gsLst>
+          <a:path path="circle">
+            <a:fillToRect l="50000" t="50000" r="50000" b="50000"/>
+          </a:path>
+        </a:gradFill>
+      </a:bgFillStyleLst>
+    </a:fmtScheme>
+  </a:themeElements>
+  <a:objectDefaults/>
+  <a:extraClrSchemeLst/>
+</a:theme>
 </file>
</xml_diff>